<commit_message>
some rework for py files and pptx
</commit_message>
<xml_diff>
--- a/doc/Présentation.pptx
+++ b/doc/Présentation.pptx
@@ -1,11 +1,11 @@
 
 <file path=ppt/presentation.xml><?xml version="1.0" encoding="utf-8"?>
-<p:presentation xmlns:a="http://schemas.openxmlformats.org/drawingml/2006/main" xmlns:r="http://schemas.openxmlformats.org/officeDocument/2006/relationships" xmlns:p="http://schemas.openxmlformats.org/presentationml/2006/main" autoCompressPictures="0">
+<p:presentation xmlns:a="http://schemas.openxmlformats.org/drawingml/2006/main" xmlns:r="http://schemas.openxmlformats.org/officeDocument/2006/relationships" xmlns:p="http://schemas.openxmlformats.org/presentationml/2006/main" showSpecialPlsOnTitleSld="0" autoCompressPictures="0">
   <p:sldMasterIdLst>
     <p:sldMasterId id="2147483648" r:id="rId1"/>
   </p:sldMasterIdLst>
   <p:notesMasterIdLst>
-    <p:notesMasterId r:id="rId9"/>
+    <p:notesMasterId r:id="rId11"/>
   </p:notesMasterIdLst>
   <p:sldIdLst>
     <p:sldId id="256" r:id="rId2"/>
@@ -15,6 +15,8 @@
     <p:sldId id="260" r:id="rId6"/>
     <p:sldId id="261" r:id="rId7"/>
     <p:sldId id="262" r:id="rId8"/>
+    <p:sldId id="263" r:id="rId9"/>
+    <p:sldId id="264" r:id="rId10"/>
   </p:sldIdLst>
   <p:sldSz cx="12192000" cy="6858000"/>
   <p:notesSz cx="6858000" cy="9144000"/>
@@ -207,7 +209,7 @@
           <a:p>
             <a:fld id="{257196CA-1AA5-48F7-AC5A-81C2542B9768}" type="datetimeFigureOut">
               <a:rPr lang="fr-FR" smtClean="0"/>
-              <a:t>24/11/2017</a:t>
+              <a:t>26/11/2017</a:t>
             </a:fld>
             <a:endParaRPr lang="fr-FR"/>
           </a:p>
@@ -737,7 +739,7 @@
           <a:effectLst/>
           <a:extLst>
             <a:ext uri="{91240B29-F687-4f45-9708-019B960494DF}">
-              <a14:hiddenLine xmlns="" xmlns:a14="http://schemas.microsoft.com/office/drawing/2010/main" w="9525">
+              <a14:hiddenLine xmlns:a14="http://schemas.microsoft.com/office/drawing/2010/main" xmlns="" w="9525">
                 <a:solidFill>
                   <a:srgbClr val="000000"/>
                 </a:solidFill>
@@ -925,10 +927,9 @@
           <a:bodyPr/>
           <a:lstStyle/>
           <a:p>
-            <a:fld id="{08B9EBBA-996F-894A-B54A-D6246ED52CEA}" type="datetimeFigureOut">
-              <a:rPr lang="en-US" dirty="0"/>
-              <a:pPr/>
-              <a:t>11/24/2017</a:t>
+            <a:fld id="{2B6BFBFE-4A06-478C-99C2-EFA224401716}" type="datetime1">
+              <a:rPr lang="en-US" smtClean="0"/>
+              <a:t>11/27/2017</a:t>
             </a:fld>
             <a:endParaRPr lang="en-US"/>
           </a:p>
@@ -1238,10 +1239,9 @@
           <a:bodyPr/>
           <a:lstStyle/>
           <a:p>
-            <a:fld id="{18C79C5D-2A6F-F04D-97DA-BEF2467B64E4}" type="datetimeFigureOut">
-              <a:rPr lang="en-US" dirty="0"/>
-              <a:pPr/>
-              <a:t>11/24/2017</a:t>
+            <a:fld id="{672A8A5A-C101-4AB5-827A-8796DD8317EF}" type="datetime1">
+              <a:rPr lang="en-US" smtClean="0"/>
+              <a:t>11/27/2017</a:t>
             </a:fld>
             <a:endParaRPr lang="en-US"/>
           </a:p>
@@ -1722,10 +1722,9 @@
           <a:bodyPr/>
           <a:lstStyle/>
           <a:p>
-            <a:fld id="{8DFA1846-DA80-1C48-A609-854EA85C59AD}" type="datetimeFigureOut">
-              <a:rPr lang="en-US" dirty="0"/>
-              <a:pPr/>
-              <a:t>11/24/2017</a:t>
+            <a:fld id="{20823F57-F983-4054-910D-69A08DC992A1}" type="datetime1">
+              <a:rPr lang="en-US" smtClean="0"/>
+              <a:t>11/27/2017</a:t>
             </a:fld>
             <a:endParaRPr lang="en-US"/>
           </a:p>
@@ -2087,10 +2086,9 @@
           <a:bodyPr/>
           <a:lstStyle/>
           <a:p>
-            <a:fld id="{FBF54567-0DE4-3F47-BF90-CB84690072F9}" type="datetimeFigureOut">
-              <a:rPr lang="en-US" dirty="0"/>
-              <a:pPr/>
-              <a:t>11/24/2017</a:t>
+            <a:fld id="{EC3827D1-58DD-4440-95C2-10AD3D075167}" type="datetime1">
+              <a:rPr lang="en-US" smtClean="0"/>
+              <a:t>11/27/2017</a:t>
             </a:fld>
             <a:endParaRPr lang="en-US"/>
           </a:p>
@@ -2241,7 +2239,7 @@
           <a:ln/>
           <a:extLst>
             <a:ext uri="{91240B29-F687-4f45-9708-019B960494DF}">
-              <a14:hiddenLine xmlns="" xmlns:a14="http://schemas.microsoft.com/office/drawing/2010/main" w="9525">
+              <a14:hiddenLine xmlns:a14="http://schemas.microsoft.com/office/drawing/2010/main" xmlns="" w="9525">
                 <a:solidFill>
                   <a:srgbClr val="000000"/>
                 </a:solidFill>
@@ -2355,10 +2353,9 @@
           <a:bodyPr/>
           <a:lstStyle/>
           <a:p>
-            <a:fld id="{C6C52C72-DE31-F449-A4ED-4C594FD91407}" type="datetimeFigureOut">
-              <a:rPr lang="en-US" dirty="0"/>
-              <a:pPr/>
-              <a:t>11/24/2017</a:t>
+            <a:fld id="{04393047-5A64-421A-A2F4-F924199C43A2}" type="datetime1">
+              <a:rPr lang="en-US" smtClean="0"/>
+              <a:t>11/27/2017</a:t>
             </a:fld>
             <a:endParaRPr lang="en-US"/>
           </a:p>
@@ -2511,7 +2508,7 @@
           <a:ln/>
           <a:extLst>
             <a:ext uri="{91240B29-F687-4f45-9708-019B960494DF}">
-              <a14:hiddenLine xmlns="" xmlns:a14="http://schemas.microsoft.com/office/drawing/2010/main" w="9525">
+              <a14:hiddenLine xmlns:a14="http://schemas.microsoft.com/office/drawing/2010/main" xmlns="" w="9525">
                 <a:solidFill>
                   <a:srgbClr val="000000"/>
                 </a:solidFill>
@@ -2635,10 +2632,9 @@
           <a:bodyPr/>
           <a:lstStyle/>
           <a:p>
-            <a:fld id="{ED62726E-379B-B349-9EED-81ED093FA806}" type="datetimeFigureOut">
-              <a:rPr lang="en-US" dirty="0"/>
-              <a:pPr/>
-              <a:t>11/24/2017</a:t>
+            <a:fld id="{BAF7D709-4636-4904-8A29-2E395C04A691}" type="datetime1">
+              <a:rPr lang="en-US" smtClean="0"/>
+              <a:t>11/27/2017</a:t>
             </a:fld>
             <a:endParaRPr lang="en-US"/>
           </a:p>
@@ -2789,7 +2785,7 @@
           <a:ln/>
           <a:extLst>
             <a:ext uri="{91240B29-F687-4f45-9708-019B960494DF}">
-              <a14:hiddenLine xmlns="" xmlns:a14="http://schemas.microsoft.com/office/drawing/2010/main" w="9525">
+              <a14:hiddenLine xmlns:a14="http://schemas.microsoft.com/office/drawing/2010/main" xmlns="" w="9525">
                 <a:solidFill>
                   <a:srgbClr val="000000"/>
                 </a:solidFill>
@@ -2913,10 +2909,9 @@
           <a:bodyPr/>
           <a:lstStyle/>
           <a:p>
-            <a:fld id="{9B3A1323-8D79-1946-B0D7-40001CF92E9D}" type="datetimeFigureOut">
-              <a:rPr lang="en-US" dirty="0"/>
-              <a:pPr/>
-              <a:t>11/24/2017</a:t>
+            <a:fld id="{8F85DFDC-DD8C-4C2A-9815-7D703A8707AA}" type="datetime1">
+              <a:rPr lang="en-US" smtClean="0"/>
+              <a:t>11/27/2017</a:t>
             </a:fld>
             <a:endParaRPr lang="en-US"/>
           </a:p>
@@ -3252,10 +3247,9 @@
           <a:bodyPr/>
           <a:lstStyle/>
           <a:p>
-            <a:fld id="{8DFA1846-DA80-1C48-A609-854EA85C59AD}" type="datetimeFigureOut">
-              <a:rPr lang="en-US" dirty="0"/>
-              <a:pPr/>
-              <a:t>11/24/2017</a:t>
+            <a:fld id="{3CE5F090-9396-4646-8F3D-B20AB09A48E9}" type="datetime1">
+              <a:rPr lang="en-US" smtClean="0"/>
+              <a:t>11/27/2017</a:t>
             </a:fld>
             <a:endParaRPr lang="en-US"/>
           </a:p>
@@ -3406,7 +3400,7 @@
           <a:ln/>
           <a:extLst>
             <a:ext uri="{91240B29-F687-4f45-9708-019B960494DF}">
-              <a14:hiddenLine xmlns="" xmlns:a14="http://schemas.microsoft.com/office/drawing/2010/main" w="9525">
+              <a14:hiddenLine xmlns:a14="http://schemas.microsoft.com/office/drawing/2010/main" xmlns="" w="9525">
                 <a:solidFill>
                   <a:srgbClr val="000000"/>
                 </a:solidFill>
@@ -3585,10 +3579,9 @@
           <a:bodyPr/>
           <a:lstStyle/>
           <a:p>
-            <a:fld id="{57302355-E14B-8545-A8F8-0FE83CC9D524}" type="datetimeFigureOut">
-              <a:rPr lang="en-US" dirty="0"/>
-              <a:pPr/>
-              <a:t>11/24/2017</a:t>
+            <a:fld id="{B0F7C1AA-15D5-43A3-AD85-A242740ECF29}" type="datetime1">
+              <a:rPr lang="en-US" smtClean="0"/>
+              <a:t>11/27/2017</a:t>
             </a:fld>
             <a:endParaRPr lang="en-US"/>
           </a:p>
@@ -3739,7 +3732,7 @@
           <a:ln/>
           <a:extLst>
             <a:ext uri="{91240B29-F687-4f45-9708-019B960494DF}">
-              <a14:hiddenLine xmlns="" xmlns:a14="http://schemas.microsoft.com/office/drawing/2010/main" w="9525">
+              <a14:hiddenLine xmlns:a14="http://schemas.microsoft.com/office/drawing/2010/main" xmlns="" w="9525">
                 <a:solidFill>
                   <a:srgbClr val="000000"/>
                 </a:solidFill>
@@ -4056,10 +4049,9 @@
           <a:bodyPr/>
           <a:lstStyle/>
           <a:p>
-            <a:fld id="{02640F58-564D-2B4F-AE67-E407BA4FCF45}" type="datetimeFigureOut">
-              <a:rPr lang="en-US" dirty="0"/>
-              <a:pPr/>
-              <a:t>11/24/2017</a:t>
+            <a:fld id="{C2A7AA46-CB1A-46BA-810F-159ED7B75238}" type="datetime1">
+              <a:rPr lang="en-US" smtClean="0"/>
+              <a:t>11/27/2017</a:t>
             </a:fld>
             <a:endParaRPr lang="en-US"/>
           </a:p>
@@ -4210,7 +4202,7 @@
           <a:ln/>
           <a:extLst>
             <a:ext uri="{91240B29-F687-4f45-9708-019B960494DF}">
-              <a14:hiddenLine xmlns="" xmlns:a14="http://schemas.microsoft.com/office/drawing/2010/main" w="9525">
+              <a14:hiddenLine xmlns:a14="http://schemas.microsoft.com/office/drawing/2010/main" xmlns="" w="9525">
                 <a:solidFill>
                   <a:srgbClr val="000000"/>
                 </a:solidFill>
@@ -4273,10 +4265,9 @@
           <a:bodyPr/>
           <a:lstStyle/>
           <a:p>
-            <a:fld id="{F13A34C8-038E-2045-AF43-DF7DBB8E0E9E}" type="datetimeFigureOut">
-              <a:rPr lang="en-US" dirty="0"/>
-              <a:pPr/>
-              <a:t>11/24/2017</a:t>
+            <a:fld id="{633518B6-1485-4E26-8C16-EF4A5ABED950}" type="datetime1">
+              <a:rPr lang="en-US" smtClean="0"/>
+              <a:t>11/27/2017</a:t>
             </a:fld>
             <a:endParaRPr lang="en-US"/>
           </a:p>
@@ -4365,10 +4356,9 @@
           <a:bodyPr/>
           <a:lstStyle/>
           <a:p>
-            <a:fld id="{8818C68F-D26B-8F47-958C-23B49CF8A634}" type="datetimeFigureOut">
-              <a:rPr lang="en-US" dirty="0"/>
-              <a:pPr/>
-              <a:t>11/24/2017</a:t>
+            <a:fld id="{BAF87255-8F5A-4D3C-B239-2DE1947C77BB}" type="datetime1">
+              <a:rPr lang="en-US" smtClean="0"/>
+              <a:t>11/27/2017</a:t>
             </a:fld>
             <a:endParaRPr lang="en-US"/>
           </a:p>
@@ -4632,7 +4622,7 @@
           <a:ln/>
           <a:extLst>
             <a:ext uri="{91240B29-F687-4f45-9708-019B960494DF}">
-              <a14:hiddenLine xmlns="" xmlns:a14="http://schemas.microsoft.com/office/drawing/2010/main" w="9525">
+              <a14:hiddenLine xmlns:a14="http://schemas.microsoft.com/office/drawing/2010/main" xmlns="" w="9525">
                 <a:solidFill>
                   <a:srgbClr val="000000"/>
                 </a:solidFill>
@@ -4827,10 +4817,9 @@
           <a:bodyPr/>
           <a:lstStyle/>
           <a:p>
-            <a:fld id="{D0DF5E60-9974-AC48-9591-99C2BB44B7CF}" type="datetimeFigureOut">
-              <a:rPr lang="en-US" dirty="0"/>
-              <a:pPr/>
-              <a:t>11/24/2017</a:t>
+            <a:fld id="{22C3A4CD-12A5-4E72-A214-0F82D7FB2064}" type="datetime1">
+              <a:rPr lang="en-US" smtClean="0"/>
+              <a:t>11/27/2017</a:t>
             </a:fld>
             <a:endParaRPr lang="en-US"/>
           </a:p>
@@ -5135,10 +5124,9 @@
           <a:bodyPr/>
           <a:lstStyle/>
           <a:p>
-            <a:fld id="{18C79C5D-2A6F-F04D-97DA-BEF2467B64E4}" type="datetimeFigureOut">
-              <a:rPr lang="en-US" dirty="0"/>
-              <a:pPr/>
-              <a:t>11/24/2017</a:t>
+            <a:fld id="{7021C23C-E00B-40DA-B56C-8237DE13945F}" type="datetime1">
+              <a:rPr lang="en-US" smtClean="0"/>
+              <a:t>11/27/2017</a:t>
             </a:fld>
             <a:endParaRPr lang="en-US"/>
           </a:p>
@@ -5400,10 +5388,9 @@
             </a:lvl1pPr>
           </a:lstStyle>
           <a:p>
-            <a:fld id="{09B482E8-6E0E-1B4F-B1FD-C69DB9E858D9}" type="datetimeFigureOut">
-              <a:rPr lang="en-US" dirty="0"/>
-              <a:pPr/>
-              <a:t>11/24/2017</a:t>
+            <a:fld id="{142C0FFA-6909-4280-B768-CE28430A3E68}" type="datetime1">
+              <a:rPr lang="en-US" smtClean="0"/>
+              <a:t>11/27/2017</a:t>
             </a:fld>
             <a:endParaRPr lang="en-US"/>
           </a:p>
@@ -5468,7 +5455,7 @@
     <p:sldLayoutId id="2147483658" r:id="rId13"/>
     <p:sldLayoutId id="2147483659" r:id="rId14"/>
   </p:sldLayoutIdLst>
-  <p:hf sldNum="0" hdr="0" ftr="0" dt="0"/>
+  <p:hf hdr="0" ftr="0" dt="0"/>
   <p:txStyles>
     <p:titleStyle>
       <a:lvl1pPr algn="l" defTabSz="457200" rtl="0" eaLnBrk="1" latinLnBrk="0" hangingPunct="1">
@@ -6300,6 +6287,36 @@
           </a:p>
         </p:txBody>
       </p:sp>
+      <p:sp>
+        <p:nvSpPr>
+          <p:cNvPr id="4" name="Espace réservé du numéro de diapositive 3">
+            <a:extLst>
+              <a:ext uri="{FF2B5EF4-FFF2-40B4-BE49-F238E27FC236}">
+                <a16:creationId xmlns:a16="http://schemas.microsoft.com/office/drawing/2014/main" id="{4D5E5B5E-0E17-4F79-9193-DF7EEFB96203}"/>
+              </a:ext>
+            </a:extLst>
+          </p:cNvPr>
+          <p:cNvSpPr>
+            <a:spLocks noGrp="1"/>
+          </p:cNvSpPr>
+          <p:nvPr>
+            <p:ph type="sldNum" sz="quarter" idx="12"/>
+          </p:nvPr>
+        </p:nvSpPr>
+        <p:spPr/>
+        <p:txBody>
+          <a:bodyPr/>
+          <a:lstStyle/>
+          <a:p>
+            <a:fld id="{D57F1E4F-1CFF-5643-939E-217C01CDF565}" type="slidenum">
+              <a:rPr lang="en-US" smtClean="0"/>
+              <a:pPr/>
+              <a:t>2</a:t>
+            </a:fld>
+            <a:endParaRPr lang="en-US"/>
+          </a:p>
+        </p:txBody>
+      </p:sp>
     </p:spTree>
     <p:extLst>
       <p:ext uri="{BB962C8B-B14F-4D97-AF65-F5344CB8AC3E}">
@@ -6649,8 +6666,8 @@
         </p:blipFill>
         <p:spPr>
           <a:xfrm>
-            <a:off x="7219950" y="3790950"/>
-            <a:ext cx="4773055" cy="2976563"/>
+            <a:off x="7484012" y="4046111"/>
+            <a:ext cx="4508994" cy="2811890"/>
           </a:xfrm>
           <a:prstGeom prst="rect">
             <a:avLst/>
@@ -6695,6 +6712,36 @@
             <a:endParaRPr lang="fr-FR" dirty="0">
               <a:hlinkClick r:id="rId3"/>
             </a:endParaRPr>
+          </a:p>
+        </p:txBody>
+      </p:sp>
+      <p:sp>
+        <p:nvSpPr>
+          <p:cNvPr id="6" name="Espace réservé du numéro de diapositive 5">
+            <a:extLst>
+              <a:ext uri="{FF2B5EF4-FFF2-40B4-BE49-F238E27FC236}">
+                <a16:creationId xmlns:a16="http://schemas.microsoft.com/office/drawing/2014/main" id="{5B526B85-4872-451B-8941-68647A7EDDC1}"/>
+              </a:ext>
+            </a:extLst>
+          </p:cNvPr>
+          <p:cNvSpPr>
+            <a:spLocks noGrp="1"/>
+          </p:cNvSpPr>
+          <p:nvPr>
+            <p:ph type="sldNum" sz="quarter" idx="12"/>
+          </p:nvPr>
+        </p:nvSpPr>
+        <p:spPr/>
+        <p:txBody>
+          <a:bodyPr/>
+          <a:lstStyle/>
+          <a:p>
+            <a:fld id="{D57F1E4F-1CFF-5643-939E-217C01CDF565}" type="slidenum">
+              <a:rPr lang="en-US" smtClean="0"/>
+              <a:pPr/>
+              <a:t>3</a:t>
+            </a:fld>
+            <a:endParaRPr lang="en-US"/>
           </a:p>
         </p:txBody>
       </p:sp>
@@ -7122,6 +7169,36 @@
           </a:p>
         </p:txBody>
       </p:sp>
+      <p:sp>
+        <p:nvSpPr>
+          <p:cNvPr id="3" name="Espace réservé du numéro de diapositive 2">
+            <a:extLst>
+              <a:ext uri="{FF2B5EF4-FFF2-40B4-BE49-F238E27FC236}">
+                <a16:creationId xmlns:a16="http://schemas.microsoft.com/office/drawing/2014/main" id="{9B9005EF-9940-470C-BEA7-16EBED19DE17}"/>
+              </a:ext>
+            </a:extLst>
+          </p:cNvPr>
+          <p:cNvSpPr>
+            <a:spLocks noGrp="1"/>
+          </p:cNvSpPr>
+          <p:nvPr>
+            <p:ph type="sldNum" sz="quarter" idx="12"/>
+          </p:nvPr>
+        </p:nvSpPr>
+        <p:spPr/>
+        <p:txBody>
+          <a:bodyPr/>
+          <a:lstStyle/>
+          <a:p>
+            <a:fld id="{D57F1E4F-1CFF-5643-939E-217C01CDF565}" type="slidenum">
+              <a:rPr lang="en-US" smtClean="0"/>
+              <a:pPr/>
+              <a:t>4</a:t>
+            </a:fld>
+            <a:endParaRPr lang="en-US"/>
+          </a:p>
+        </p:txBody>
+      </p:sp>
     </p:spTree>
     <p:extLst>
       <p:ext uri="{BB962C8B-B14F-4D97-AF65-F5344CB8AC3E}">
@@ -7219,7 +7296,7 @@
         </p:blipFill>
         <p:spPr>
           <a:xfrm>
-            <a:off x="8335581" y="3075429"/>
+            <a:off x="7227045" y="2980623"/>
             <a:ext cx="2695951" cy="1114581"/>
           </a:xfrm>
           <a:prstGeom prst="rect">
@@ -7249,7 +7326,7 @@
         </p:blipFill>
         <p:spPr>
           <a:xfrm>
-            <a:off x="9382123" y="4874790"/>
+            <a:off x="9448800" y="4177920"/>
             <a:ext cx="2743200" cy="1076683"/>
           </a:xfrm>
           <a:prstGeom prst="rect">
@@ -7279,7 +7356,7 @@
         </p:blipFill>
         <p:spPr>
           <a:xfrm>
-            <a:off x="9914086" y="6052868"/>
+            <a:off x="9173187" y="5859406"/>
             <a:ext cx="2208811" cy="815766"/>
           </a:xfrm>
           <a:prstGeom prst="rect">
@@ -7305,8 +7382,8 @@
         </p:nvSpPr>
         <p:spPr>
           <a:xfrm>
-            <a:off x="476958" y="2613305"/>
-            <a:ext cx="10554574" cy="3636511"/>
+            <a:off x="225083" y="2711938"/>
+            <a:ext cx="10360088" cy="3286666"/>
           </a:xfrm>
         </p:spPr>
         <p:txBody>
@@ -7316,117 +7393,117 @@
           <a:lstStyle/>
           <a:p>
             <a:r>
-              <a:rPr lang="fr-FR" sz="2600" dirty="0"/>
+              <a:rPr lang="fr-FR" sz="2400" dirty="0"/>
               <a:t>Client </a:t>
             </a:r>
             <a:r>
-              <a:rPr lang="fr-FR" sz="2600" dirty="0" err="1"/>
+              <a:rPr lang="fr-FR" sz="2400" dirty="0" err="1"/>
               <a:t>Evalutation</a:t>
             </a:r>
-            <a:endParaRPr lang="fr-FR" sz="2600" dirty="0"/>
+            <a:endParaRPr lang="fr-FR" sz="2400" dirty="0"/>
           </a:p>
           <a:p>
             <a:pPr lvl="2"/>
             <a:r>
-              <a:rPr lang="fr-FR" sz="2400" dirty="0" err="1"/>
+              <a:rPr lang="fr-FR" sz="2200" dirty="0" err="1"/>
               <a:t>Each</a:t>
             </a:r>
             <a:r>
+              <a:rPr lang="fr-FR" sz="2200" dirty="0"/>
+              <a:t> data providers </a:t>
+            </a:r>
+            <a:r>
+              <a:rPr lang="fr-FR" sz="2200" dirty="0" err="1"/>
+              <a:t>evaluates</a:t>
+            </a:r>
+            <a:r>
+              <a:rPr lang="fr-FR" sz="2200" dirty="0"/>
+              <a:t> </a:t>
+            </a:r>
+            <a:r>
+              <a:rPr lang="fr-FR" sz="2200" dirty="0" err="1"/>
+              <a:t>its</a:t>
+            </a:r>
+            <a:r>
+              <a:rPr lang="fr-FR" sz="2200" dirty="0"/>
+              <a:t> </a:t>
+            </a:r>
+            <a:r>
+              <a:rPr lang="fr-FR" sz="2200" dirty="0" err="1"/>
+              <a:t>share</a:t>
+            </a:r>
+            <a:r>
+              <a:rPr lang="fr-FR" sz="2200" dirty="0"/>
+              <a:t> in an </a:t>
+            </a:r>
+            <a:r>
+              <a:rPr lang="fr-FR" sz="2200" dirty="0" err="1"/>
+              <a:t>arithmetic</a:t>
+            </a:r>
+            <a:r>
+              <a:rPr lang="fr-FR" sz="2200" dirty="0"/>
+              <a:t> circuit </a:t>
+            </a:r>
+            <a:r>
+              <a:rPr lang="fr-FR" sz="2200" dirty="0" err="1"/>
+              <a:t>with</a:t>
+            </a:r>
+            <a:r>
+              <a:rPr lang="fr-FR" sz="2200" dirty="0"/>
+              <a:t> M multiplication </a:t>
+            </a:r>
+            <a:r>
+              <a:rPr lang="fr-FR" sz="2200" dirty="0" err="1"/>
+              <a:t>gates</a:t>
+            </a:r>
+            <a:endParaRPr lang="en-US" sz="2200" dirty="0"/>
+          </a:p>
+          <a:p>
+            <a:r>
               <a:rPr lang="fr-FR" sz="2400" dirty="0"/>
-              <a:t> data providers </a:t>
-            </a:r>
-            <a:r>
-              <a:rPr lang="fr-FR" sz="2400" dirty="0" err="1"/>
-              <a:t>evaluates</a:t>
-            </a:r>
-            <a:r>
-              <a:rPr lang="fr-FR" sz="2400" dirty="0"/>
+              <a:t>Client Transfer:</a:t>
+            </a:r>
+          </a:p>
+          <a:p>
+            <a:pPr lvl="1"/>
+            <a:r>
+              <a:rPr lang="fr-FR" sz="2200" dirty="0" err="1"/>
+              <a:t>Construct</a:t>
+            </a:r>
+            <a:r>
+              <a:rPr lang="fr-FR" sz="2200" dirty="0"/>
+              <a:t> 3 </a:t>
+            </a:r>
+            <a:r>
+              <a:rPr lang="fr-FR" sz="2200" dirty="0" err="1"/>
+              <a:t>polynomials</a:t>
+            </a:r>
+            <a:r>
+              <a:rPr lang="fr-FR" sz="2200" dirty="0"/>
               <a:t> </a:t>
             </a:r>
             <a:r>
-              <a:rPr lang="fr-FR" sz="2400" dirty="0" err="1"/>
-              <a:t>its</a:t>
-            </a:r>
-            <a:r>
-              <a:rPr lang="fr-FR" sz="2400" dirty="0"/>
+              <a:rPr lang="fr-FR" sz="2200" dirty="0" err="1"/>
+              <a:t>from</a:t>
+            </a:r>
+            <a:r>
+              <a:rPr lang="fr-FR" sz="2200" dirty="0"/>
               <a:t> </a:t>
             </a:r>
             <a:r>
-              <a:rPr lang="fr-FR" sz="2400" dirty="0" err="1"/>
-              <a:t>share</a:t>
-            </a:r>
-            <a:r>
-              <a:rPr lang="fr-FR" sz="2400" dirty="0"/>
-              <a:t> in an </a:t>
-            </a:r>
-            <a:r>
-              <a:rPr lang="fr-FR" sz="2400" dirty="0" err="1"/>
-              <a:t>arithmetic</a:t>
-            </a:r>
-            <a:r>
-              <a:rPr lang="fr-FR" sz="2400" dirty="0"/>
-              <a:t> circuit </a:t>
-            </a:r>
-            <a:r>
-              <a:rPr lang="fr-FR" sz="2400" dirty="0" err="1"/>
-              <a:t>with</a:t>
-            </a:r>
-            <a:r>
-              <a:rPr lang="fr-FR" sz="2400" dirty="0"/>
-              <a:t> M multiplication </a:t>
-            </a:r>
-            <a:r>
-              <a:rPr lang="fr-FR" sz="2400" dirty="0" err="1"/>
-              <a:t>gates</a:t>
-            </a:r>
-            <a:endParaRPr lang="en-US" sz="2400" dirty="0"/>
-          </a:p>
-          <a:p>
-            <a:r>
-              <a:rPr lang="fr-FR" sz="2600" dirty="0"/>
-              <a:t>Client Transfer:</a:t>
-            </a:r>
-          </a:p>
-          <a:p>
-            <a:pPr lvl="1"/>
-            <a:r>
-              <a:rPr lang="fr-FR" sz="2400" dirty="0" err="1"/>
-              <a:t>Construct</a:t>
-            </a:r>
-            <a:r>
-              <a:rPr lang="fr-FR" sz="2400" dirty="0"/>
-              <a:t> 3 </a:t>
-            </a:r>
-            <a:r>
-              <a:rPr lang="fr-FR" sz="2400" dirty="0" err="1"/>
-              <a:t>polynomials</a:t>
-            </a:r>
-            <a:r>
-              <a:rPr lang="fr-FR" sz="2400" dirty="0"/>
-              <a:t> </a:t>
-            </a:r>
-            <a:r>
-              <a:rPr lang="fr-FR" sz="2400" dirty="0" err="1"/>
-              <a:t>from</a:t>
-            </a:r>
-            <a:r>
-              <a:rPr lang="fr-FR" sz="2400" dirty="0"/>
-              <a:t> </a:t>
-            </a:r>
-            <a:r>
-              <a:rPr lang="fr-FR" sz="2400" dirty="0" err="1"/>
+              <a:rPr lang="fr-FR" sz="2200" dirty="0" err="1"/>
               <a:t>wire</a:t>
             </a:r>
             <a:r>
-              <a:rPr lang="fr-FR" sz="2400" dirty="0"/>
+              <a:rPr lang="fr-FR" sz="2200" dirty="0"/>
               <a:t> (</a:t>
             </a:r>
             <a:r>
-              <a:rPr lang="fr-FR" sz="2400" dirty="0" err="1"/>
+              <a:rPr lang="fr-FR" sz="2200" dirty="0" err="1"/>
               <a:t>f,g</a:t>
             </a:r>
             <a:r>
-              <a:rPr lang="fr-FR" sz="2400" dirty="0"/>
+              <a:rPr lang="fr-FR" sz="2200" dirty="0"/>
               <a:t> and h)</a:t>
             </a:r>
           </a:p>
@@ -7435,144 +7512,143 @@
               <a:buFont typeface="Wingdings 2"/>
             </a:pPr>
             <a:r>
-              <a:rPr lang="fr-FR" sz="2400" dirty="0" err="1"/>
+              <a:rPr lang="fr-FR" sz="2200" dirty="0" err="1"/>
               <a:t>Send</a:t>
             </a:r>
             <a:r>
+              <a:rPr lang="fr-FR" sz="2200" dirty="0"/>
+              <a:t> Share h[i] of polynomial h </a:t>
+            </a:r>
+            <a:r>
+              <a:rPr lang="fr-FR" sz="2200" dirty="0" err="1"/>
+              <a:t>along</a:t>
+            </a:r>
+            <a:r>
+              <a:rPr lang="fr-FR" sz="2200" dirty="0"/>
+              <a:t> </a:t>
+            </a:r>
+            <a:r>
+              <a:rPr lang="fr-FR" sz="2200" dirty="0" err="1"/>
+              <a:t>with</a:t>
+            </a:r>
+            <a:r>
+              <a:rPr lang="fr-FR" sz="2200" dirty="0"/>
+              <a:t> </a:t>
+            </a:r>
+            <a:r>
+              <a:rPr lang="fr-FR" sz="2200" dirty="0" err="1"/>
+              <a:t>share</a:t>
+            </a:r>
+            <a:r>
+              <a:rPr lang="fr-FR" sz="2200" dirty="0"/>
+              <a:t> x[i] to server i</a:t>
+            </a:r>
+          </a:p>
+          <a:p>
+            <a:r>
               <a:rPr lang="fr-FR" sz="2400" dirty="0"/>
-              <a:t> Share h[i] of polynomial h </a:t>
-            </a:r>
-            <a:r>
-              <a:rPr lang="fr-FR" sz="2400" dirty="0" err="1"/>
-              <a:t>along</a:t>
-            </a:r>
-            <a:r>
-              <a:rPr lang="fr-FR" sz="2400" dirty="0"/>
+              <a:t>Server Computation:</a:t>
+            </a:r>
+          </a:p>
+          <a:p>
+            <a:pPr lvl="1"/>
+            <a:r>
+              <a:rPr lang="fr-FR" sz="2200" dirty="0"/>
+              <a:t>Server </a:t>
+            </a:r>
+            <a:r>
+              <a:rPr lang="fr-FR" sz="2200" dirty="0" err="1"/>
+              <a:t>reconstruct</a:t>
+            </a:r>
+            <a:r>
+              <a:rPr lang="fr-FR" sz="2200" dirty="0"/>
               <a:t> </a:t>
             </a:r>
             <a:r>
-              <a:rPr lang="fr-FR" sz="2400" dirty="0" err="1"/>
-              <a:t>with</a:t>
-            </a:r>
-            <a:r>
-              <a:rPr lang="fr-FR" sz="2400" dirty="0"/>
+              <a:rPr lang="fr-FR" sz="2200" dirty="0" err="1"/>
+              <a:t>from</a:t>
+            </a:r>
+            <a:r>
+              <a:rPr lang="fr-FR" sz="2200" dirty="0"/>
               <a:t> </a:t>
             </a:r>
             <a:r>
-              <a:rPr lang="fr-FR" sz="2400" dirty="0" err="1"/>
-              <a:t>share</a:t>
-            </a:r>
-            <a:r>
-              <a:rPr lang="fr-FR" sz="2400" dirty="0"/>
-              <a:t> x[i] to server i</a:t>
-            </a:r>
-          </a:p>
-          <a:p>
-            <a:r>
-              <a:rPr lang="fr-FR" sz="2600" dirty="0"/>
-              <a:t>Server Computation:</a:t>
-            </a:r>
-            <a:endParaRPr lang="fr-FR" dirty="0"/>
+              <a:rPr lang="fr-FR" sz="2200" dirty="0" err="1"/>
+              <a:t>shares</a:t>
+            </a:r>
+            <a:r>
+              <a:rPr lang="fr-FR" sz="2200" dirty="0"/>
+              <a:t>, do </a:t>
+            </a:r>
+            <a:r>
+              <a:rPr lang="fr-FR" sz="2200" dirty="0" err="1"/>
+              <a:t>consistency</a:t>
+            </a:r>
+            <a:r>
+              <a:rPr lang="fr-FR" sz="2200" dirty="0"/>
+              <a:t> check ; polynomial </a:t>
+            </a:r>
+            <a:r>
+              <a:rPr lang="fr-FR" sz="2200" dirty="0" err="1"/>
+              <a:t>identity</a:t>
+            </a:r>
+            <a:r>
+              <a:rPr lang="fr-FR" sz="2200" dirty="0"/>
+              <a:t> test. </a:t>
+            </a:r>
+            <a:r>
+              <a:rPr lang="fr-FR" sz="2200" dirty="0" err="1"/>
+              <a:t>Detect</a:t>
+            </a:r>
+            <a:r>
+              <a:rPr lang="fr-FR" sz="2200" dirty="0"/>
+              <a:t> </a:t>
+            </a:r>
+            <a:r>
+              <a:rPr lang="fr-FR" sz="2200" dirty="0" err="1"/>
+              <a:t>fraudulous</a:t>
+            </a:r>
+            <a:r>
+              <a:rPr lang="fr-FR" sz="2200" dirty="0"/>
+              <a:t> input </a:t>
+            </a:r>
           </a:p>
           <a:p>
             <a:pPr lvl="1"/>
             <a:r>
-              <a:rPr lang="fr-FR" sz="2400" dirty="0"/>
-              <a:t>Server </a:t>
-            </a:r>
-            <a:r>
-              <a:rPr lang="fr-FR" sz="2400" dirty="0" err="1"/>
-              <a:t>reconstruct</a:t>
-            </a:r>
-            <a:r>
-              <a:rPr lang="fr-FR" sz="2400" dirty="0"/>
+              <a:rPr lang="fr-FR" sz="2200" dirty="0"/>
+              <a:t>Use Beaver MPC to </a:t>
+            </a:r>
+            <a:r>
+              <a:rPr lang="fr-FR" sz="2200" dirty="0" err="1"/>
+              <a:t>multiply</a:t>
+            </a:r>
+            <a:r>
+              <a:rPr lang="fr-FR" sz="2200" dirty="0"/>
               <a:t> </a:t>
             </a:r>
             <a:r>
-              <a:rPr lang="fr-FR" sz="2400" dirty="0" err="1"/>
-              <a:t>from</a:t>
-            </a:r>
-            <a:r>
-              <a:rPr lang="fr-FR" sz="2400" dirty="0"/>
+              <a:rPr lang="fr-FR" sz="2200" dirty="0" err="1"/>
+              <a:t>shares</a:t>
+            </a:r>
+            <a:r>
+              <a:rPr lang="fr-FR" sz="2200" dirty="0"/>
+              <a:t> and </a:t>
+            </a:r>
+            <a:r>
+              <a:rPr lang="fr-FR" sz="2200" dirty="0" err="1"/>
+              <a:t>get</a:t>
+            </a:r>
+            <a:r>
+              <a:rPr lang="fr-FR" sz="2200" dirty="0"/>
               <a:t> </a:t>
             </a:r>
             <a:r>
-              <a:rPr lang="fr-FR" sz="2400" dirty="0" err="1"/>
-              <a:t>shares</a:t>
-            </a:r>
-            <a:r>
-              <a:rPr lang="fr-FR" sz="2400" dirty="0"/>
-              <a:t>, do </a:t>
-            </a:r>
-            <a:r>
-              <a:rPr lang="fr-FR" sz="2400" dirty="0" err="1"/>
-              <a:t>consistency</a:t>
-            </a:r>
-            <a:r>
-              <a:rPr lang="fr-FR" sz="2400" dirty="0"/>
-              <a:t> check ; polynomial </a:t>
-            </a:r>
-            <a:r>
-              <a:rPr lang="fr-FR" sz="2400" dirty="0" err="1"/>
-              <a:t>identity</a:t>
-            </a:r>
-            <a:r>
-              <a:rPr lang="fr-FR" sz="2400" dirty="0"/>
-              <a:t> test. </a:t>
-            </a:r>
-            <a:r>
-              <a:rPr lang="fr-FR" sz="2400" dirty="0" err="1"/>
-              <a:t>Detect</a:t>
-            </a:r>
-            <a:r>
-              <a:rPr lang="fr-FR" sz="2400" dirty="0"/>
-              <a:t> </a:t>
-            </a:r>
-            <a:r>
-              <a:rPr lang="fr-FR" sz="2400" dirty="0" err="1"/>
-              <a:t>fraudulous</a:t>
-            </a:r>
-            <a:r>
-              <a:rPr lang="fr-FR" sz="2400" dirty="0"/>
-              <a:t> input </a:t>
-            </a:r>
-          </a:p>
-          <a:p>
-            <a:pPr lvl="1"/>
-            <a:r>
-              <a:rPr lang="fr-FR" sz="2400" dirty="0"/>
-              <a:t>Use Beaver MPC to </a:t>
-            </a:r>
-            <a:r>
-              <a:rPr lang="fr-FR" sz="2400" dirty="0" err="1"/>
-              <a:t>multiply</a:t>
-            </a:r>
-            <a:r>
-              <a:rPr lang="fr-FR" sz="2400" dirty="0"/>
-              <a:t> </a:t>
-            </a:r>
-            <a:r>
-              <a:rPr lang="fr-FR" sz="2400" dirty="0" err="1"/>
-              <a:t>shares</a:t>
-            </a:r>
-            <a:r>
-              <a:rPr lang="fr-FR" sz="2400" dirty="0"/>
-              <a:t> and </a:t>
-            </a:r>
-            <a:r>
-              <a:rPr lang="fr-FR" sz="2400" dirty="0" err="1"/>
-              <a:t>get</a:t>
-            </a:r>
-            <a:r>
-              <a:rPr lang="fr-FR" sz="2400" dirty="0"/>
-              <a:t> </a:t>
-            </a:r>
-            <a:r>
-              <a:rPr lang="fr-FR" sz="2400" dirty="0" err="1"/>
+              <a:rPr lang="fr-FR" sz="2200" dirty="0" err="1"/>
               <a:t>aggregation</a:t>
             </a:r>
             <a:r>
-              <a:rPr lang="fr-FR" sz="2400" dirty="0"/>
+              <a:rPr lang="fr-FR" sz="2200" dirty="0"/>
               <a:t> f</a:t>
             </a:r>
           </a:p>
@@ -7594,8 +7670,8 @@
             </p:nvSpPr>
             <p:spPr>
               <a:xfrm>
-                <a:off x="8566198" y="5951473"/>
-                <a:ext cx="1631851" cy="539891"/>
+                <a:off x="6049108" y="5739618"/>
+                <a:ext cx="1772529" cy="537135"/>
               </a:xfrm>
               <a:prstGeom prst="rect">
                 <a:avLst/>
@@ -7653,7 +7729,7 @@
                           <a:rPr lang="fr-FR" sz="2200" b="0" i="1" smtClean="0">
                             <a:latin typeface="Cambria Math" panose="02040503050406030204" pitchFamily="18" charset="0"/>
                           </a:rPr>
-                          <m:t>[</m:t>
+                          <m:t>|</m:t>
                         </m:r>
                         <m:r>
                           <a:rPr lang="fr-FR" sz="2200" b="0" i="1" smtClean="0">
@@ -7665,7 +7741,7 @@
                           <a:rPr lang="fr-FR" sz="2200" b="0" i="1" smtClean="0">
                             <a:latin typeface="Cambria Math" panose="02040503050406030204" pitchFamily="18" charset="0"/>
                           </a:rPr>
-                          <m:t>[</m:t>
+                          <m:t>|</m:t>
                         </m:r>
                       </m:den>
                     </m:f>
@@ -7693,8 +7769,8 @@
             </p:nvSpPr>
             <p:spPr>
               <a:xfrm>
-                <a:off x="8566198" y="5951473"/>
-                <a:ext cx="1631851" cy="539891"/>
+                <a:off x="6049108" y="5739618"/>
+                <a:ext cx="1772529" cy="537135"/>
               </a:xfrm>
               <a:prstGeom prst="rect">
                 <a:avLst/>
@@ -7702,7 +7778,7 @@
               <a:blipFill>
                 <a:blip r:embed="rId6"/>
                 <a:stretch>
-                  <a:fillRect l="-10448" t="-2247" b="-6742"/>
+                  <a:fillRect l="-9622" t="-3409" b="-7955"/>
                 </a:stretch>
               </a:blipFill>
             </p:spPr>
@@ -7721,6 +7797,36 @@
           </p:sp>
         </mc:Fallback>
       </mc:AlternateContent>
+      <p:sp>
+        <p:nvSpPr>
+          <p:cNvPr id="6" name="Espace réservé du numéro de diapositive 5">
+            <a:extLst>
+              <a:ext uri="{FF2B5EF4-FFF2-40B4-BE49-F238E27FC236}">
+                <a16:creationId xmlns:a16="http://schemas.microsoft.com/office/drawing/2014/main" id="{2554C0DA-AAA2-4DEB-A938-0385E8FBA6C1}"/>
+              </a:ext>
+            </a:extLst>
+          </p:cNvPr>
+          <p:cNvSpPr>
+            <a:spLocks noGrp="1"/>
+          </p:cNvSpPr>
+          <p:nvPr>
+            <p:ph type="sldNum" sz="quarter" idx="12"/>
+          </p:nvPr>
+        </p:nvSpPr>
+        <p:spPr/>
+        <p:txBody>
+          <a:bodyPr/>
+          <a:lstStyle/>
+          <a:p>
+            <a:fld id="{D57F1E4F-1CFF-5643-939E-217C01CDF565}" type="slidenum">
+              <a:rPr lang="en-US" smtClean="0"/>
+              <a:pPr/>
+              <a:t>5</a:t>
+            </a:fld>
+            <a:endParaRPr lang="en-US"/>
+          </a:p>
+        </p:txBody>
+      </p:sp>
     </p:spTree>
     <p:extLst>
       <p:ext uri="{BB962C8B-B14F-4D97-AF65-F5344CB8AC3E}">
@@ -7804,24 +7910,257 @@
             <p:ph idx="1"/>
           </p:nvPr>
         </p:nvSpPr>
-        <p:spPr/>
+        <p:spPr>
+          <a:xfrm>
+            <a:off x="810000" y="2222288"/>
+            <a:ext cx="10563286" cy="823322"/>
+          </a:xfrm>
+        </p:spPr>
         <p:txBody>
           <a:bodyPr>
-            <a:normAutofit lnSpcReduction="10000"/>
+            <a:noAutofit/>
           </a:bodyPr>
           <a:lstStyle/>
           <a:p>
+            <a:pPr marL="0" indent="0">
+              <a:buNone/>
+            </a:pPr>
+            <a:r>
+              <a:rPr lang="fr-FR" sz="2400" dirty="0"/>
+              <a:t>3 </a:t>
+            </a:r>
+            <a:r>
+              <a:rPr lang="fr-FR" sz="2400" dirty="0" err="1"/>
+              <a:t>curves</a:t>
+            </a:r>
+            <a:r>
+              <a:rPr lang="fr-FR" sz="2400" dirty="0"/>
+              <a:t>, one for </a:t>
+            </a:r>
+            <a:r>
+              <a:rPr lang="fr-FR" sz="2400" dirty="0" err="1"/>
+              <a:t>aggregation</a:t>
+            </a:r>
+            <a:r>
+              <a:rPr lang="fr-FR" sz="2400" dirty="0"/>
+              <a:t> </a:t>
+            </a:r>
+            <a:r>
+              <a:rPr lang="fr-FR" sz="2400" dirty="0" err="1"/>
+              <a:t>with</a:t>
+            </a:r>
+            <a:r>
+              <a:rPr lang="fr-FR" sz="2400" dirty="0"/>
+              <a:t> </a:t>
+            </a:r>
+            <a:r>
+              <a:rPr lang="fr-FR" sz="2400" dirty="0" err="1"/>
+              <a:t>Prio</a:t>
+            </a:r>
+            <a:r>
+              <a:rPr lang="fr-FR" sz="2400" dirty="0"/>
+              <a:t> </a:t>
+            </a:r>
+            <a:r>
+              <a:rPr lang="fr-FR" sz="2400" dirty="0" err="1"/>
+              <a:t>method</a:t>
+            </a:r>
+            <a:r>
+              <a:rPr lang="fr-FR" sz="2400" dirty="0"/>
+              <a:t>, the </a:t>
+            </a:r>
+            <a:r>
+              <a:rPr lang="fr-FR" sz="2400" dirty="0" err="1"/>
+              <a:t>other</a:t>
+            </a:r>
+            <a:r>
+              <a:rPr lang="fr-FR" sz="2400" dirty="0"/>
+              <a:t> for the </a:t>
+            </a:r>
+            <a:r>
+              <a:rPr lang="fr-FR" sz="2400" dirty="0" err="1"/>
+              <a:t>aggregation</a:t>
+            </a:r>
+            <a:r>
+              <a:rPr lang="fr-FR" sz="2400" dirty="0"/>
+              <a:t> </a:t>
+            </a:r>
+            <a:r>
+              <a:rPr lang="fr-FR" sz="2400" dirty="0" err="1"/>
+              <a:t>with</a:t>
+            </a:r>
+            <a:r>
+              <a:rPr lang="fr-FR" sz="2400" dirty="0"/>
+              <a:t> </a:t>
+            </a:r>
+            <a:r>
+              <a:rPr lang="fr-FR" sz="2400" dirty="0" err="1"/>
+              <a:t>Unlynx</a:t>
+            </a:r>
+            <a:r>
+              <a:rPr lang="fr-FR" sz="2400" dirty="0"/>
+              <a:t> </a:t>
+            </a:r>
+            <a:r>
+              <a:rPr lang="fr-FR" sz="2400" dirty="0" err="1"/>
+              <a:t>ciphers</a:t>
+            </a:r>
+            <a:r>
+              <a:rPr lang="fr-FR" sz="2400" dirty="0"/>
+              <a:t>, and the last one </a:t>
+            </a:r>
+            <a:r>
+              <a:rPr lang="fr-FR" sz="2400" dirty="0" err="1"/>
+              <a:t>is</a:t>
+            </a:r>
+            <a:r>
+              <a:rPr lang="fr-FR" sz="2400" dirty="0"/>
+              <a:t> the </a:t>
+            </a:r>
+            <a:r>
+              <a:rPr lang="fr-FR" sz="2400" dirty="0" err="1"/>
+              <a:t>execution</a:t>
+            </a:r>
+            <a:r>
+              <a:rPr lang="fr-FR" sz="2400" dirty="0"/>
+              <a:t> time for </a:t>
+            </a:r>
+            <a:r>
+              <a:rPr lang="fr-FR" sz="2400" dirty="0" err="1"/>
+              <a:t>SNIPs</a:t>
+            </a:r>
+            <a:r>
+              <a:rPr lang="fr-FR" sz="2400" dirty="0"/>
+              <a:t> proof</a:t>
+            </a:r>
+          </a:p>
+        </p:txBody>
+      </p:sp>
+      <p:pic>
+        <p:nvPicPr>
+          <p:cNvPr id="4" name="Image 3">
+            <a:extLst>
+              <a:ext uri="{FF2B5EF4-FFF2-40B4-BE49-F238E27FC236}">
+                <a16:creationId xmlns:a16="http://schemas.microsoft.com/office/drawing/2014/main" id="{006DDC95-C2BE-4672-A669-F1F0FD4C9F57}"/>
+              </a:ext>
+            </a:extLst>
+          </p:cNvPr>
+          <p:cNvPicPr>
+            <a:picLocks noChangeAspect="1"/>
+          </p:cNvPicPr>
+          <p:nvPr/>
+        </p:nvPicPr>
+        <p:blipFill>
+          <a:blip r:embed="rId2"/>
+          <a:stretch>
+            <a:fillRect/>
+          </a:stretch>
+        </p:blipFill>
+        <p:spPr>
+          <a:xfrm>
+            <a:off x="6218586" y="3158151"/>
+            <a:ext cx="4704534" cy="3136356"/>
+          </a:xfrm>
+          <a:prstGeom prst="rect">
+            <a:avLst/>
+          </a:prstGeom>
+        </p:spPr>
+      </p:pic>
+      <p:pic>
+        <p:nvPicPr>
+          <p:cNvPr id="6" name="Image 5">
+            <a:extLst>
+              <a:ext uri="{FF2B5EF4-FFF2-40B4-BE49-F238E27FC236}">
+                <a16:creationId xmlns:a16="http://schemas.microsoft.com/office/drawing/2014/main" id="{17C229BA-CA99-4124-88BC-F71D8079CB50}"/>
+              </a:ext>
+            </a:extLst>
+          </p:cNvPr>
+          <p:cNvPicPr>
+            <a:picLocks noChangeAspect="1"/>
+          </p:cNvPicPr>
+          <p:nvPr/>
+        </p:nvPicPr>
+        <p:blipFill>
+          <a:blip r:embed="rId3"/>
+          <a:stretch>
+            <a:fillRect/>
+          </a:stretch>
+        </p:blipFill>
+        <p:spPr>
+          <a:xfrm>
+            <a:off x="810000" y="3158151"/>
+            <a:ext cx="4704535" cy="3136356"/>
+          </a:xfrm>
+          <a:prstGeom prst="rect">
+            <a:avLst/>
+          </a:prstGeom>
+        </p:spPr>
+      </p:pic>
+      <p:sp>
+        <p:nvSpPr>
+          <p:cNvPr id="7" name="ZoneTexte 6">
+            <a:extLst>
+              <a:ext uri="{FF2B5EF4-FFF2-40B4-BE49-F238E27FC236}">
+                <a16:creationId xmlns:a16="http://schemas.microsoft.com/office/drawing/2014/main" id="{79C71AF7-0383-4187-96E3-330F4BC0058F}"/>
+              </a:ext>
+            </a:extLst>
+          </p:cNvPr>
+          <p:cNvSpPr txBox="1"/>
+          <p:nvPr/>
+        </p:nvSpPr>
+        <p:spPr>
+          <a:xfrm>
+            <a:off x="810000" y="6294507"/>
+            <a:ext cx="11237300" cy="923330"/>
+          </a:xfrm>
+          <a:prstGeom prst="rect">
+            <a:avLst/>
+          </a:prstGeom>
+          <a:noFill/>
+        </p:spPr>
+        <p:txBody>
+          <a:bodyPr wrap="square" rtlCol="0">
+            <a:spAutoFit/>
+          </a:bodyPr>
+          <a:lstStyle/>
+          <a:p>
+            <a:r>
+              <a:rPr lang="fr-FR" dirty="0"/>
+              <a:t>Test </a:t>
+            </a:r>
             <a:r>
               <a:rPr lang="fr-FR" dirty="0" err="1"/>
-              <a:t>Title</a:t>
+              <a:t>ran</a:t>
             </a:r>
             <a:r>
               <a:rPr lang="fr-FR" dirty="0"/>
-              <a:t> of test to explicit the </a:t>
+              <a:t> on VMWare, Ubuntu64 bits v17.10, 6.1 GB RAM, 2 </a:t>
             </a:r>
             <a:r>
               <a:rPr lang="fr-FR" dirty="0" err="1"/>
-              <a:t>curves</a:t>
+              <a:t>cores</a:t>
+            </a:r>
+            <a:r>
+              <a:rPr lang="fr-FR" dirty="0"/>
+              <a:t> </a:t>
+            </a:r>
+            <a:r>
+              <a:rPr lang="fr-FR" dirty="0" err="1"/>
+              <a:t>intel</a:t>
+            </a:r>
+            <a:r>
+              <a:rPr lang="fr-FR" dirty="0"/>
+              <a:t> I5-4590 @3.3Ghz, 10 runs</a:t>
+            </a:r>
+          </a:p>
+          <a:p>
+            <a:r>
+              <a:rPr lang="fr-FR" dirty="0"/>
+              <a:t>All the code on </a:t>
+            </a:r>
+            <a:r>
+              <a:rPr lang="fr-FR" dirty="0" err="1"/>
+              <a:t>github</a:t>
             </a:r>
             <a:r>
               <a:rPr lang="fr-FR" dirty="0"/>
@@ -7829,111 +8168,53 @@
             </a:r>
             <a:r>
               <a:rPr lang="fr-FR" dirty="0" err="1"/>
-              <a:t>implemented</a:t>
+              <a:t>Unlynx</a:t>
             </a:r>
             <a:r>
               <a:rPr lang="fr-FR" dirty="0"/>
-              <a:t> on </a:t>
+              <a:t> repo, </a:t>
             </a:r>
             <a:r>
               <a:rPr lang="fr-FR" dirty="0" err="1"/>
-              <a:t>github</a:t>
-            </a:r>
+              <a:t>branch</a:t>
+            </a:r>
+            <a:r>
+              <a:rPr lang="fr-FR" dirty="0"/>
+              <a:t> Max</a:t>
+            </a:r>
+          </a:p>
+          <a:p>
             <a:endParaRPr lang="fr-FR" dirty="0"/>
           </a:p>
-          <a:p>
-            <a:pPr>
-              <a:buFont typeface="Wingdings 2"/>
-            </a:pPr>
-            <a:r>
-              <a:rPr lang="fr-FR" dirty="0" err="1"/>
-              <a:t>Add</a:t>
-            </a:r>
-            <a:r>
-              <a:rPr lang="fr-FR" dirty="0"/>
-              <a:t> for 7-8 servers,  25 -50 clients</a:t>
-            </a:r>
-          </a:p>
-          <a:p>
-            <a:pPr>
-              <a:buFont typeface="Wingdings 2"/>
-            </a:pPr>
-            <a:r>
-              <a:rPr lang="fr-FR" dirty="0" err="1"/>
-              <a:t>Title</a:t>
-            </a:r>
-            <a:r>
-              <a:rPr lang="fr-FR" dirty="0"/>
-              <a:t> to the plots, size of the fonts </a:t>
-            </a:r>
-            <a:r>
-              <a:rPr lang="fr-FR" dirty="0" err="1"/>
-              <a:t>bigger</a:t>
-            </a:r>
-            <a:endParaRPr lang="fr-FR" dirty="0"/>
-          </a:p>
-          <a:p>
-            <a:pPr>
-              <a:buFont typeface="Wingdings 2"/>
-            </a:pPr>
-            <a:endParaRPr lang="fr-FR"/>
-          </a:p>
-          <a:p>
-            <a:pPr>
-              <a:buFont typeface="Wingdings 2"/>
-            </a:pPr>
-            <a:endParaRPr lang="fr-FR"/>
-          </a:p>
-          <a:p>
-            <a:pPr>
-              <a:buFont typeface="Wingdings 2"/>
-            </a:pPr>
-            <a:endParaRPr lang="fr-FR" dirty="0"/>
-          </a:p>
-          <a:p>
-            <a:pPr>
-              <a:buFont typeface="Wingdings 2"/>
-            </a:pPr>
-            <a:endParaRPr lang="fr-FR" dirty="0"/>
-          </a:p>
-          <a:p>
-            <a:pPr>
-              <a:buFont typeface="Wingdings 2"/>
-            </a:pPr>
-            <a:endParaRPr lang="fr-FR" dirty="0"/>
-          </a:p>
-          <a:p>
-            <a:pPr>
-              <a:buFont typeface="Wingdings 2"/>
-            </a:pPr>
-            <a:r>
-              <a:rPr lang="fr-FR" dirty="0"/>
-              <a:t>Test </a:t>
-            </a:r>
-            <a:r>
-              <a:rPr lang="fr-FR" dirty="0" err="1"/>
-              <a:t>ran</a:t>
-            </a:r>
-            <a:r>
-              <a:rPr lang="fr-FR" dirty="0"/>
-              <a:t> on VMWare, Ubuntu64 bits v17.10, 6.1 GB RAM, 2 </a:t>
-            </a:r>
-            <a:r>
-              <a:rPr lang="fr-FR" dirty="0" err="1"/>
-              <a:t>cores</a:t>
-            </a:r>
-            <a:r>
-              <a:rPr lang="fr-FR" dirty="0"/>
-              <a:t> </a:t>
-            </a:r>
-            <a:r>
-              <a:rPr lang="fr-FR" dirty="0" err="1"/>
-              <a:t>intel</a:t>
-            </a:r>
-            <a:r>
-              <a:rPr lang="fr-FR" dirty="0"/>
-              <a:t> I5-4590 @3.3Ghz, 10 runs</a:t>
-            </a:r>
+        </p:txBody>
+      </p:sp>
+      <p:sp>
+        <p:nvSpPr>
+          <p:cNvPr id="8" name="Espace réservé du numéro de diapositive 7">
+            <a:extLst>
+              <a:ext uri="{FF2B5EF4-FFF2-40B4-BE49-F238E27FC236}">
+                <a16:creationId xmlns:a16="http://schemas.microsoft.com/office/drawing/2014/main" id="{1139FE2F-0A53-4EC0-A8DA-0D717B043B32}"/>
+              </a:ext>
+            </a:extLst>
+          </p:cNvPr>
+          <p:cNvSpPr>
+            <a:spLocks noGrp="1"/>
+          </p:cNvSpPr>
+          <p:nvPr>
+            <p:ph type="sldNum" sz="quarter" idx="12"/>
+          </p:nvPr>
+        </p:nvSpPr>
+        <p:spPr/>
+        <p:txBody>
+          <a:bodyPr/>
+          <a:lstStyle/>
+          <a:p>
+            <a:fld id="{D57F1E4F-1CFF-5643-939E-217C01CDF565}" type="slidenum">
+              <a:rPr lang="en-US" smtClean="0"/>
+              <a:pPr/>
+              <a:t>6</a:t>
+            </a:fld>
+            <a:endParaRPr lang="en-US"/>
           </a:p>
         </p:txBody>
       </p:sp>
@@ -8408,10 +8689,2069 @@
           </a:p>
         </p:txBody>
       </p:sp>
+      <p:sp>
+        <p:nvSpPr>
+          <p:cNvPr id="10" name="Espace réservé du numéro de diapositive 9">
+            <a:extLst>
+              <a:ext uri="{FF2B5EF4-FFF2-40B4-BE49-F238E27FC236}">
+                <a16:creationId xmlns:a16="http://schemas.microsoft.com/office/drawing/2014/main" id="{447D2E83-5ED1-4A8B-95EC-E8B6CCF1DF25}"/>
+              </a:ext>
+            </a:extLst>
+          </p:cNvPr>
+          <p:cNvSpPr>
+            <a:spLocks noGrp="1"/>
+          </p:cNvSpPr>
+          <p:nvPr>
+            <p:ph type="sldNum" sz="quarter" idx="12"/>
+          </p:nvPr>
+        </p:nvSpPr>
+        <p:spPr/>
+        <p:txBody>
+          <a:bodyPr/>
+          <a:lstStyle/>
+          <a:p>
+            <a:fld id="{D57F1E4F-1CFF-5643-939E-217C01CDF565}" type="slidenum">
+              <a:rPr lang="en-US" smtClean="0"/>
+              <a:pPr/>
+              <a:t>7</a:t>
+            </a:fld>
+            <a:endParaRPr lang="en-US"/>
+          </a:p>
+        </p:txBody>
+      </p:sp>
     </p:spTree>
     <p:extLst>
       <p:ext uri="{BB962C8B-B14F-4D97-AF65-F5344CB8AC3E}">
         <p14:creationId xmlns:p14="http://schemas.microsoft.com/office/powerpoint/2010/main" val="2518671884"/>
+      </p:ext>
+    </p:extLst>
+  </p:cSld>
+  <p:clrMapOvr>
+    <a:masterClrMapping/>
+  </p:clrMapOvr>
+</p:sld>
+</file>
+
+<file path=ppt/slides/slide8.xml><?xml version="1.0" encoding="utf-8"?>
+<p:sld xmlns:a="http://schemas.openxmlformats.org/drawingml/2006/main" xmlns:r="http://schemas.openxmlformats.org/officeDocument/2006/relationships" xmlns:p="http://schemas.openxmlformats.org/presentationml/2006/main">
+  <p:cSld>
+    <p:spTree>
+      <p:nvGrpSpPr>
+        <p:cNvPr id="1" name=""/>
+        <p:cNvGrpSpPr/>
+        <p:nvPr/>
+      </p:nvGrpSpPr>
+      <p:grpSpPr>
+        <a:xfrm>
+          <a:off x="0" y="0"/>
+          <a:ext cx="0" cy="0"/>
+          <a:chOff x="0" y="0"/>
+          <a:chExt cx="0" cy="0"/>
+        </a:xfrm>
+      </p:grpSpPr>
+      <p:sp>
+        <p:nvSpPr>
+          <p:cNvPr id="2" name="Titre 1">
+            <a:extLst>
+              <a:ext uri="{FF2B5EF4-FFF2-40B4-BE49-F238E27FC236}">
+                <a16:creationId xmlns:a16="http://schemas.microsoft.com/office/drawing/2014/main" id="{280692CA-9746-49AB-A037-D5E11518C508}"/>
+              </a:ext>
+            </a:extLst>
+          </p:cNvPr>
+          <p:cNvSpPr>
+            <a:spLocks noGrp="1"/>
+          </p:cNvSpPr>
+          <p:nvPr>
+            <p:ph type="title"/>
+          </p:nvPr>
+        </p:nvSpPr>
+        <p:spPr/>
+        <p:txBody>
+          <a:bodyPr/>
+          <a:lstStyle/>
+          <a:p>
+            <a:r>
+              <a:rPr lang="fr-FR" dirty="0" err="1"/>
+              <a:t>Technical</a:t>
+            </a:r>
+            <a:r>
+              <a:rPr lang="fr-FR" dirty="0"/>
+              <a:t> </a:t>
+            </a:r>
+            <a:r>
+              <a:rPr lang="fr-FR" dirty="0" err="1"/>
+              <a:t>Unlynx</a:t>
+            </a:r>
+            <a:endParaRPr lang="fr-FR" dirty="0"/>
+          </a:p>
+        </p:txBody>
+      </p:sp>
+      <p:sp>
+        <p:nvSpPr>
+          <p:cNvPr id="3" name="Espace réservé du contenu 2">
+            <a:extLst>
+              <a:ext uri="{FF2B5EF4-FFF2-40B4-BE49-F238E27FC236}">
+                <a16:creationId xmlns:a16="http://schemas.microsoft.com/office/drawing/2014/main" id="{B5C49BDA-305E-4CBE-97E7-FA139AF28152}"/>
+              </a:ext>
+            </a:extLst>
+          </p:cNvPr>
+          <p:cNvSpPr>
+            <a:spLocks noGrp="1"/>
+          </p:cNvSpPr>
+          <p:nvPr>
+            <p:ph idx="1"/>
+          </p:nvPr>
+        </p:nvSpPr>
+        <p:spPr/>
+        <p:txBody>
+          <a:bodyPr/>
+          <a:lstStyle/>
+          <a:p>
+            <a:pPr indent="-325438">
+              <a:buClrTx/>
+              <a:buFontTx/>
+              <a:buNone/>
+              <a:tabLst>
+                <a:tab pos="342900" algn="l"/>
+                <a:tab pos="447675" algn="l"/>
+                <a:tab pos="896938" algn="l"/>
+                <a:tab pos="1346200" algn="l"/>
+                <a:tab pos="1795463" algn="l"/>
+                <a:tab pos="2244725" algn="l"/>
+                <a:tab pos="2693988" algn="l"/>
+                <a:tab pos="3143250" algn="l"/>
+                <a:tab pos="3592513" algn="l"/>
+                <a:tab pos="4041775" algn="l"/>
+                <a:tab pos="4491038" algn="l"/>
+                <a:tab pos="4940300" algn="l"/>
+                <a:tab pos="5389563" algn="l"/>
+                <a:tab pos="5838825" algn="l"/>
+                <a:tab pos="6288088" algn="l"/>
+                <a:tab pos="6737350" algn="l"/>
+                <a:tab pos="7186613" algn="l"/>
+                <a:tab pos="7635875" algn="l"/>
+                <a:tab pos="8085138" algn="l"/>
+                <a:tab pos="8534400" algn="l"/>
+                <a:tab pos="8983663" algn="l"/>
+              </a:tabLst>
+            </a:pPr>
+            <a:r>
+              <a:rPr lang="fr-FR" altLang="fr-FR" dirty="0"/>
+              <a:t>Server i Pair </a:t>
+            </a:r>
+            <a:r>
+              <a:rPr lang="fr-FR" altLang="fr-FR" dirty="0" err="1"/>
+              <a:t>private</a:t>
+            </a:r>
+            <a:r>
+              <a:rPr lang="fr-FR" altLang="fr-FR" dirty="0"/>
+              <a:t>-public Key (</a:t>
+            </a:r>
+            <a:r>
+              <a:rPr lang="fr-FR" altLang="fr-FR" dirty="0" err="1"/>
+              <a:t>ki,Ki</a:t>
+            </a:r>
+            <a:r>
+              <a:rPr lang="fr-FR" altLang="fr-FR" dirty="0"/>
+              <a:t>), collective public key K </a:t>
+            </a:r>
+            <a:r>
+              <a:rPr lang="fr-FR" altLang="fr-FR" dirty="0" err="1"/>
+              <a:t>sum</a:t>
+            </a:r>
+            <a:r>
+              <a:rPr lang="fr-FR" altLang="fr-FR" dirty="0"/>
+              <a:t> of public </a:t>
+            </a:r>
+            <a:r>
+              <a:rPr lang="fr-FR" altLang="fr-FR" dirty="0" err="1"/>
+              <a:t>from</a:t>
+            </a:r>
+            <a:r>
+              <a:rPr lang="fr-FR" altLang="fr-FR" dirty="0"/>
+              <a:t> </a:t>
+            </a:r>
+            <a:r>
+              <a:rPr lang="fr-FR" altLang="fr-FR" dirty="0" err="1"/>
+              <a:t>each</a:t>
+            </a:r>
+            <a:r>
+              <a:rPr lang="fr-FR" altLang="fr-FR" dirty="0"/>
+              <a:t> server.</a:t>
+            </a:r>
+          </a:p>
+          <a:p>
+            <a:pPr indent="-325438">
+              <a:buClrTx/>
+              <a:buFontTx/>
+              <a:buNone/>
+              <a:tabLst>
+                <a:tab pos="342900" algn="l"/>
+                <a:tab pos="447675" algn="l"/>
+                <a:tab pos="896938" algn="l"/>
+                <a:tab pos="1346200" algn="l"/>
+                <a:tab pos="1795463" algn="l"/>
+                <a:tab pos="2244725" algn="l"/>
+                <a:tab pos="2693988" algn="l"/>
+                <a:tab pos="3143250" algn="l"/>
+                <a:tab pos="3592513" algn="l"/>
+                <a:tab pos="4041775" algn="l"/>
+                <a:tab pos="4491038" algn="l"/>
+                <a:tab pos="4940300" algn="l"/>
+                <a:tab pos="5389563" algn="l"/>
+                <a:tab pos="5838825" algn="l"/>
+                <a:tab pos="6288088" algn="l"/>
+                <a:tab pos="6737350" algn="l"/>
+                <a:tab pos="7186613" algn="l"/>
+                <a:tab pos="7635875" algn="l"/>
+                <a:tab pos="8085138" algn="l"/>
+                <a:tab pos="8534400" algn="l"/>
+                <a:tab pos="8983663" algn="l"/>
+              </a:tabLst>
+            </a:pPr>
+            <a:r>
+              <a:rPr lang="fr-FR" altLang="fr-FR" dirty="0" err="1"/>
+              <a:t>Zero</a:t>
+            </a:r>
+            <a:r>
+              <a:rPr lang="fr-FR" altLang="fr-FR" dirty="0"/>
+              <a:t> </a:t>
+            </a:r>
+            <a:r>
+              <a:rPr lang="fr-FR" altLang="fr-FR" dirty="0" err="1"/>
+              <a:t>knowledge</a:t>
+            </a:r>
+            <a:r>
+              <a:rPr lang="fr-FR" altLang="fr-FR" dirty="0"/>
+              <a:t> proof, </a:t>
+            </a:r>
+            <a:r>
+              <a:rPr lang="fr-FR" altLang="fr-FR" dirty="0" err="1"/>
+              <a:t>with</a:t>
+            </a:r>
+            <a:r>
+              <a:rPr lang="fr-FR" altLang="fr-FR" dirty="0"/>
+              <a:t> </a:t>
+            </a:r>
+            <a:r>
+              <a:rPr lang="fr-FR" altLang="fr-FR" dirty="0" err="1"/>
+              <a:t>discrete</a:t>
+            </a:r>
+            <a:r>
+              <a:rPr lang="fr-FR" altLang="fr-FR" dirty="0"/>
+              <a:t> log y1, y2 by </a:t>
+            </a:r>
+            <a:r>
+              <a:rPr lang="fr-FR" altLang="fr-FR" dirty="0" err="1"/>
+              <a:t>doing</a:t>
+            </a:r>
+            <a:r>
+              <a:rPr lang="fr-FR" altLang="fr-FR" dirty="0"/>
+              <a:t> A1y1 + A2y2 = A, for DDT, </a:t>
+            </a:r>
+            <a:r>
+              <a:rPr lang="fr-FR" altLang="fr-FR" dirty="0" err="1"/>
+              <a:t>publish</a:t>
+            </a:r>
+            <a:r>
+              <a:rPr lang="fr-FR" altLang="fr-FR" dirty="0"/>
+              <a:t> for </a:t>
+            </a:r>
+            <a:r>
+              <a:rPr lang="fr-FR" altLang="fr-FR" dirty="0" err="1"/>
+              <a:t>Agg</a:t>
+            </a:r>
+            <a:r>
+              <a:rPr lang="fr-FR" altLang="fr-FR" dirty="0"/>
+              <a:t>.</a:t>
+            </a:r>
+          </a:p>
+          <a:p>
+            <a:pPr indent="-325438">
+              <a:buClrTx/>
+              <a:buFontTx/>
+              <a:buNone/>
+              <a:tabLst>
+                <a:tab pos="342900" algn="l"/>
+                <a:tab pos="447675" algn="l"/>
+                <a:tab pos="896938" algn="l"/>
+                <a:tab pos="1346200" algn="l"/>
+                <a:tab pos="1795463" algn="l"/>
+                <a:tab pos="2244725" algn="l"/>
+                <a:tab pos="2693988" algn="l"/>
+                <a:tab pos="3143250" algn="l"/>
+                <a:tab pos="3592513" algn="l"/>
+                <a:tab pos="4041775" algn="l"/>
+                <a:tab pos="4491038" algn="l"/>
+                <a:tab pos="4940300" algn="l"/>
+                <a:tab pos="5389563" algn="l"/>
+                <a:tab pos="5838825" algn="l"/>
+                <a:tab pos="6288088" algn="l"/>
+                <a:tab pos="6737350" algn="l"/>
+                <a:tab pos="7186613" algn="l"/>
+                <a:tab pos="7635875" algn="l"/>
+                <a:tab pos="8085138" algn="l"/>
+                <a:tab pos="8534400" algn="l"/>
+                <a:tab pos="8983663" algn="l"/>
+              </a:tabLst>
+            </a:pPr>
+            <a:r>
+              <a:rPr lang="fr-FR" altLang="fr-FR" dirty="0"/>
+              <a:t>Support </a:t>
+            </a:r>
+            <a:r>
+              <a:rPr lang="fr-FR" altLang="fr-FR" dirty="0" err="1"/>
+              <a:t>Differentially</a:t>
+            </a:r>
+            <a:r>
+              <a:rPr lang="fr-FR" altLang="fr-FR" dirty="0"/>
+              <a:t> </a:t>
+            </a:r>
+            <a:r>
+              <a:rPr lang="fr-FR" altLang="fr-FR" dirty="0" err="1"/>
+              <a:t>private</a:t>
+            </a:r>
+            <a:r>
+              <a:rPr lang="fr-FR" altLang="fr-FR" dirty="0"/>
+              <a:t> </a:t>
+            </a:r>
+            <a:r>
+              <a:rPr lang="fr-FR" altLang="fr-FR" dirty="0" err="1"/>
+              <a:t>queries</a:t>
+            </a:r>
+            <a:endParaRPr lang="fr-FR" altLang="fr-FR" dirty="0"/>
+          </a:p>
+          <a:p>
+            <a:pPr indent="-325438">
+              <a:buClrTx/>
+              <a:buFontTx/>
+              <a:buNone/>
+              <a:tabLst>
+                <a:tab pos="342900" algn="l"/>
+                <a:tab pos="447675" algn="l"/>
+                <a:tab pos="896938" algn="l"/>
+                <a:tab pos="1346200" algn="l"/>
+                <a:tab pos="1795463" algn="l"/>
+                <a:tab pos="2244725" algn="l"/>
+                <a:tab pos="2693988" algn="l"/>
+                <a:tab pos="3143250" algn="l"/>
+                <a:tab pos="3592513" algn="l"/>
+                <a:tab pos="4041775" algn="l"/>
+                <a:tab pos="4491038" algn="l"/>
+                <a:tab pos="4940300" algn="l"/>
+                <a:tab pos="5389563" algn="l"/>
+                <a:tab pos="5838825" algn="l"/>
+                <a:tab pos="6288088" algn="l"/>
+                <a:tab pos="6737350" algn="l"/>
+                <a:tab pos="7186613" algn="l"/>
+                <a:tab pos="7635875" algn="l"/>
+                <a:tab pos="8085138" algn="l"/>
+                <a:tab pos="8534400" algn="l"/>
+                <a:tab pos="8983663" algn="l"/>
+              </a:tabLst>
+            </a:pPr>
+            <a:r>
+              <a:rPr lang="fr-FR" altLang="fr-FR" dirty="0" err="1"/>
+              <a:t>Confidentiality</a:t>
+            </a:r>
+            <a:r>
+              <a:rPr lang="fr-FR" altLang="fr-FR" dirty="0"/>
+              <a:t>, </a:t>
+            </a:r>
+            <a:r>
+              <a:rPr lang="fr-FR" altLang="fr-FR" dirty="0" err="1"/>
+              <a:t>Unlikability,Corectness</a:t>
+            </a:r>
+            <a:r>
+              <a:rPr lang="fr-FR" altLang="fr-FR" dirty="0"/>
+              <a:t>, </a:t>
+            </a:r>
+            <a:r>
+              <a:rPr lang="fr-FR" altLang="fr-FR" dirty="0" err="1"/>
+              <a:t>differential</a:t>
+            </a:r>
+            <a:r>
+              <a:rPr lang="fr-FR" altLang="fr-FR" dirty="0"/>
+              <a:t> </a:t>
+            </a:r>
+            <a:r>
+              <a:rPr lang="fr-FR" altLang="fr-FR" dirty="0" err="1"/>
+              <a:t>privacy</a:t>
+            </a:r>
+            <a:endParaRPr lang="fr-FR" altLang="fr-FR" dirty="0"/>
+          </a:p>
+          <a:p>
+            <a:endParaRPr lang="fr-FR" dirty="0"/>
+          </a:p>
+        </p:txBody>
+      </p:sp>
+      <p:pic>
+        <p:nvPicPr>
+          <p:cNvPr id="4" name="Picture 3">
+            <a:extLst>
+              <a:ext uri="{FF2B5EF4-FFF2-40B4-BE49-F238E27FC236}">
+                <a16:creationId xmlns:a16="http://schemas.microsoft.com/office/drawing/2014/main" id="{505F41D9-C64F-4FB6-B68E-C9C42B9D62F0}"/>
+              </a:ext>
+            </a:extLst>
+          </p:cNvPr>
+          <p:cNvPicPr>
+            <a:picLocks noChangeAspect="1" noChangeArrowheads="1"/>
+          </p:cNvPicPr>
+          <p:nvPr/>
+        </p:nvPicPr>
+        <p:blipFill>
+          <a:blip r:embed="rId2">
+            <a:extLst>
+              <a:ext uri="{28A0092B-C50C-407E-A947-70E740481C1C}">
+                <a14:useLocalDpi xmlns:a14="http://schemas.microsoft.com/office/drawing/2010/main" val="0"/>
+              </a:ext>
+            </a:extLst>
+          </a:blip>
+          <a:srcRect/>
+          <a:stretch>
+            <a:fillRect/>
+          </a:stretch>
+        </p:blipFill>
+        <p:spPr bwMode="auto">
+          <a:xfrm>
+            <a:off x="7484013" y="3918348"/>
+            <a:ext cx="4587484" cy="2605766"/>
+          </a:xfrm>
+          <a:prstGeom prst="rect">
+            <a:avLst/>
+          </a:prstGeom>
+          <a:noFill/>
+          <a:ln>
+            <a:noFill/>
+          </a:ln>
+          <a:effectLst/>
+          <a:extLst>
+            <a:ext uri="{909E8E84-426E-40DD-AFC4-6F175D3DCCD1}">
+              <a14:hiddenFill xmlns:a14="http://schemas.microsoft.com/office/drawing/2010/main">
+                <a:blipFill dpi="0" rotWithShape="0">
+                  <a:blip/>
+                  <a:srcRect/>
+                  <a:stretch>
+                    <a:fillRect/>
+                  </a:stretch>
+                </a:blipFill>
+              </a14:hiddenFill>
+            </a:ext>
+            <a:ext uri="{91240B29-F687-4F45-9708-019B960494DF}">
+              <a14:hiddenLine xmlns:a14="http://schemas.microsoft.com/office/drawing/2010/main" w="9525" cap="flat">
+                <a:solidFill>
+                  <a:srgbClr val="808080"/>
+                </a:solidFill>
+                <a:round/>
+                <a:headEnd/>
+                <a:tailEnd/>
+              </a14:hiddenLine>
+            </a:ext>
+            <a:ext uri="{AF507438-7753-43E0-B8FC-AC1667EBCBE1}">
+              <a14:hiddenEffects xmlns:a14="http://schemas.microsoft.com/office/drawing/2010/main">
+                <a:effectLst>
+                  <a:outerShdw dist="35921" dir="2700000" algn="ctr" rotWithShape="0">
+                    <a:srgbClr val="808080"/>
+                  </a:outerShdw>
+                </a:effectLst>
+              </a14:hiddenEffects>
+            </a:ext>
+          </a:extLst>
+        </p:spPr>
+      </p:pic>
+      <p:sp>
+        <p:nvSpPr>
+          <p:cNvPr id="5" name="Espace réservé du numéro de diapositive 4">
+            <a:extLst>
+              <a:ext uri="{FF2B5EF4-FFF2-40B4-BE49-F238E27FC236}">
+                <a16:creationId xmlns:a16="http://schemas.microsoft.com/office/drawing/2014/main" id="{D40B32C1-3C41-42B1-B8EB-07170B011DD2}"/>
+              </a:ext>
+            </a:extLst>
+          </p:cNvPr>
+          <p:cNvSpPr>
+            <a:spLocks noGrp="1"/>
+          </p:cNvSpPr>
+          <p:nvPr>
+            <p:ph type="sldNum" sz="quarter" idx="12"/>
+          </p:nvPr>
+        </p:nvSpPr>
+        <p:spPr/>
+        <p:txBody>
+          <a:bodyPr/>
+          <a:lstStyle/>
+          <a:p>
+            <a:fld id="{D57F1E4F-1CFF-5643-939E-217C01CDF565}" type="slidenum">
+              <a:rPr lang="en-US" smtClean="0"/>
+              <a:pPr/>
+              <a:t>8</a:t>
+            </a:fld>
+            <a:endParaRPr lang="en-US"/>
+          </a:p>
+        </p:txBody>
+      </p:sp>
+    </p:spTree>
+    <p:extLst>
+      <p:ext uri="{BB962C8B-B14F-4D97-AF65-F5344CB8AC3E}">
+        <p14:creationId xmlns:p14="http://schemas.microsoft.com/office/powerpoint/2010/main" val="1634324979"/>
+      </p:ext>
+    </p:extLst>
+  </p:cSld>
+  <p:clrMapOvr>
+    <a:masterClrMapping/>
+  </p:clrMapOvr>
+</p:sld>
+</file>
+
+<file path=ppt/slides/slide9.xml><?xml version="1.0" encoding="utf-8"?>
+<p:sld xmlns:a="http://schemas.openxmlformats.org/drawingml/2006/main" xmlns:r="http://schemas.openxmlformats.org/officeDocument/2006/relationships" xmlns:p="http://schemas.openxmlformats.org/presentationml/2006/main">
+  <p:cSld>
+    <p:spTree>
+      <p:nvGrpSpPr>
+        <p:cNvPr id="1" name=""/>
+        <p:cNvGrpSpPr/>
+        <p:nvPr/>
+      </p:nvGrpSpPr>
+      <p:grpSpPr>
+        <a:xfrm>
+          <a:off x="0" y="0"/>
+          <a:ext cx="0" cy="0"/>
+          <a:chOff x="0" y="0"/>
+          <a:chExt cx="0" cy="0"/>
+        </a:xfrm>
+      </p:grpSpPr>
+      <p:sp>
+        <p:nvSpPr>
+          <p:cNvPr id="2" name="Titre 1">
+            <a:extLst>
+              <a:ext uri="{FF2B5EF4-FFF2-40B4-BE49-F238E27FC236}">
+                <a16:creationId xmlns:a16="http://schemas.microsoft.com/office/drawing/2014/main" id="{6EDE33C9-3CAE-4D2B-9B6E-7A7C4CD88962}"/>
+              </a:ext>
+            </a:extLst>
+          </p:cNvPr>
+          <p:cNvSpPr>
+            <a:spLocks noGrp="1"/>
+          </p:cNvSpPr>
+          <p:nvPr>
+            <p:ph type="title"/>
+          </p:nvPr>
+        </p:nvSpPr>
+        <p:spPr/>
+        <p:txBody>
+          <a:bodyPr/>
+          <a:lstStyle/>
+          <a:p>
+            <a:r>
+              <a:rPr lang="fr-FR" dirty="0" err="1"/>
+              <a:t>Technical</a:t>
+            </a:r>
+            <a:r>
+              <a:rPr lang="fr-FR" dirty="0"/>
+              <a:t> </a:t>
+            </a:r>
+            <a:r>
+              <a:rPr lang="fr-FR" dirty="0" err="1"/>
+              <a:t>Prio</a:t>
+            </a:r>
+            <a:endParaRPr lang="fr-FR" dirty="0"/>
+          </a:p>
+        </p:txBody>
+      </p:sp>
+      <mc:AlternateContent xmlns:mc="http://schemas.openxmlformats.org/markup-compatibility/2006">
+        <mc:Choice xmlns:a14="http://schemas.microsoft.com/office/drawing/2010/main" Requires="a14">
+          <p:sp>
+            <p:nvSpPr>
+              <p:cNvPr id="3" name="Espace réservé du contenu 2">
+                <a:extLst>
+                  <a:ext uri="{FF2B5EF4-FFF2-40B4-BE49-F238E27FC236}">
+                    <a16:creationId xmlns:a16="http://schemas.microsoft.com/office/drawing/2014/main" id="{6E4A7A47-E795-43FE-9594-A27D5322C498}"/>
+                  </a:ext>
+                </a:extLst>
+              </p:cNvPr>
+              <p:cNvSpPr>
+                <a:spLocks noGrp="1"/>
+              </p:cNvSpPr>
+              <p:nvPr>
+                <p:ph idx="1"/>
+              </p:nvPr>
+            </p:nvSpPr>
+            <p:spPr>
+              <a:xfrm>
+                <a:off x="374472" y="2869401"/>
+                <a:ext cx="11007526" cy="4094107"/>
+              </a:xfrm>
+            </p:spPr>
+            <p:txBody>
+              <a:bodyPr>
+                <a:noAutofit/>
+              </a:bodyPr>
+              <a:lstStyle/>
+              <a:p>
+                <a:pPr indent="-327025">
+                  <a:buClrTx/>
+                  <a:buFontTx/>
+                  <a:buNone/>
+                  <a:tabLst>
+                    <a:tab pos="342900" algn="l"/>
+                    <a:tab pos="447675" algn="l"/>
+                    <a:tab pos="896938" algn="l"/>
+                    <a:tab pos="1346200" algn="l"/>
+                    <a:tab pos="1795463" algn="l"/>
+                    <a:tab pos="2244725" algn="l"/>
+                    <a:tab pos="2693988" algn="l"/>
+                    <a:tab pos="3143250" algn="l"/>
+                    <a:tab pos="3592513" algn="l"/>
+                    <a:tab pos="4041775" algn="l"/>
+                    <a:tab pos="4491038" algn="l"/>
+                    <a:tab pos="4940300" algn="l"/>
+                    <a:tab pos="5389563" algn="l"/>
+                    <a:tab pos="5838825" algn="l"/>
+                    <a:tab pos="6288088" algn="l"/>
+                    <a:tab pos="6737350" algn="l"/>
+                    <a:tab pos="7186613" algn="l"/>
+                    <a:tab pos="7635875" algn="l"/>
+                    <a:tab pos="8085138" algn="l"/>
+                    <a:tab pos="8534400" algn="l"/>
+                    <a:tab pos="8983663" algn="l"/>
+                  </a:tabLst>
+                </a:pPr>
+                <a:r>
+                  <a:rPr lang="fr-FR" altLang="fr-FR" sz="2300" dirty="0"/>
+                  <a:t>Data-provider </a:t>
+                </a:r>
+                <a:r>
+                  <a:rPr lang="fr-FR" altLang="fr-FR" sz="2300" dirty="0" err="1"/>
+                  <a:t>splits</a:t>
+                </a:r>
+                <a:r>
+                  <a:rPr lang="fr-FR" altLang="fr-FR" sz="2300" dirty="0"/>
+                  <a:t> </a:t>
+                </a:r>
+                <a:r>
+                  <a:rPr lang="fr-FR" altLang="fr-FR" sz="2300" dirty="0" err="1"/>
+                  <a:t>private</a:t>
+                </a:r>
+                <a:r>
+                  <a:rPr lang="fr-FR" altLang="fr-FR" sz="2300" dirty="0"/>
+                  <a:t> value </a:t>
+                </a:r>
+                <a:r>
+                  <a:rPr lang="fr-FR" altLang="fr-FR" sz="2300" i="1" dirty="0"/>
+                  <a:t>x</a:t>
+                </a:r>
+                <a:r>
+                  <a:rPr lang="fr-FR" altLang="fr-FR" sz="2300" dirty="0"/>
+                  <a:t> in </a:t>
+                </a:r>
+                <a:r>
+                  <a:rPr lang="fr-FR" altLang="fr-FR" sz="2300" i="1" dirty="0"/>
+                  <a:t>d</a:t>
+                </a:r>
+                <a:r>
+                  <a:rPr lang="fr-FR" altLang="fr-FR" sz="2300" dirty="0"/>
+                  <a:t> </a:t>
+                </a:r>
+                <a:r>
+                  <a:rPr lang="fr-FR" altLang="fr-FR" sz="2300" dirty="0" err="1"/>
+                  <a:t>shares</a:t>
+                </a:r>
+                <a:r>
+                  <a:rPr lang="fr-FR" altLang="fr-FR" sz="2300" dirty="0"/>
+                  <a:t>, </a:t>
+                </a:r>
+                <a:r>
+                  <a:rPr lang="fr-FR" altLang="fr-FR" sz="2300" dirty="0" err="1"/>
+                  <a:t>evaluate</a:t>
+                </a:r>
+                <a:r>
+                  <a:rPr lang="fr-FR" altLang="fr-FR" sz="2300" dirty="0"/>
+                  <a:t> circuit </a:t>
+                </a:r>
+                <a:r>
+                  <a:rPr lang="fr-FR" altLang="fr-FR" sz="2300" i="1" dirty="0" err="1"/>
+                  <a:t>Valid</a:t>
+                </a:r>
+                <a:r>
+                  <a:rPr lang="fr-FR" altLang="fr-FR" sz="2300" i="1" dirty="0"/>
+                  <a:t>(x).</a:t>
+                </a:r>
+              </a:p>
+              <a:p>
+                <a:pPr indent="-327025">
+                  <a:buClrTx/>
+                  <a:buNone/>
+                  <a:tabLst>
+                    <a:tab pos="342900" algn="l"/>
+                    <a:tab pos="447675" algn="l"/>
+                    <a:tab pos="896938" algn="l"/>
+                    <a:tab pos="1346200" algn="l"/>
+                    <a:tab pos="1795463" algn="l"/>
+                    <a:tab pos="2244725" algn="l"/>
+                    <a:tab pos="2693988" algn="l"/>
+                    <a:tab pos="3143250" algn="l"/>
+                    <a:tab pos="3592513" algn="l"/>
+                    <a:tab pos="4041775" algn="l"/>
+                    <a:tab pos="4491038" algn="l"/>
+                    <a:tab pos="4940300" algn="l"/>
+                    <a:tab pos="5389563" algn="l"/>
+                    <a:tab pos="5838825" algn="l"/>
+                    <a:tab pos="6288088" algn="l"/>
+                    <a:tab pos="6737350" algn="l"/>
+                    <a:tab pos="7186613" algn="l"/>
+                    <a:tab pos="7635875" algn="l"/>
+                    <a:tab pos="8085138" algn="l"/>
+                    <a:tab pos="8534400" algn="l"/>
+                    <a:tab pos="8983663" algn="l"/>
+                  </a:tabLst>
+                </a:pPr>
+                <a:r>
+                  <a:rPr lang="fr-FR" altLang="fr-FR" sz="2300" dirty="0" err="1"/>
+                  <a:t>From</a:t>
+                </a:r>
+                <a:r>
+                  <a:rPr lang="fr-FR" altLang="fr-FR" sz="2300" dirty="0"/>
+                  <a:t> </a:t>
+                </a:r>
+                <a:r>
+                  <a:rPr lang="fr-FR" altLang="fr-FR" sz="2300" dirty="0" err="1"/>
+                  <a:t>wire</a:t>
+                </a:r>
+                <a:r>
+                  <a:rPr lang="fr-FR" altLang="fr-FR" sz="2300" dirty="0"/>
+                  <a:t> of circuits </a:t>
+                </a:r>
+                <a:r>
+                  <a:rPr lang="fr-FR" altLang="fr-FR" sz="2300" dirty="0" err="1"/>
+                  <a:t>derive</a:t>
+                </a:r>
+                <a:r>
+                  <a:rPr lang="fr-FR" altLang="fr-FR" sz="2300" dirty="0"/>
+                  <a:t> </a:t>
+                </a:r>
+                <a:r>
+                  <a:rPr lang="fr-FR" altLang="fr-FR" sz="2300" dirty="0" err="1"/>
+                  <a:t>polinomials</a:t>
+                </a:r>
+                <a:r>
+                  <a:rPr lang="fr-FR" altLang="fr-FR" sz="2300" i="1" dirty="0"/>
+                  <a:t> </a:t>
+                </a:r>
+                <a:r>
+                  <a:rPr lang="fr-FR" altLang="fr-FR" sz="2300" i="1" dirty="0" err="1"/>
+                  <a:t>f,g</a:t>
+                </a:r>
+                <a:r>
+                  <a:rPr lang="fr-FR" altLang="fr-FR" sz="2300" i="1" dirty="0"/>
+                  <a:t> </a:t>
+                </a:r>
+                <a:r>
+                  <a:rPr lang="fr-FR" altLang="fr-FR" sz="2300" dirty="0"/>
+                  <a:t>and </a:t>
+                </a:r>
+                <a:r>
+                  <a:rPr lang="fr-FR" altLang="fr-FR" sz="2300" i="1" dirty="0"/>
+                  <a:t>h</a:t>
+                </a:r>
+                <a:r>
+                  <a:rPr lang="fr-FR" altLang="fr-FR" sz="2300" dirty="0"/>
+                  <a:t>, </a:t>
+                </a:r>
+                <a14:m>
+                  <m:oMath xmlns:m="http://schemas.openxmlformats.org/officeDocument/2006/math">
+                    <m:r>
+                      <a:rPr lang="fr-FR" sz="2200" i="1">
+                        <a:latin typeface="Cambria Math" panose="02040503050406030204" pitchFamily="18" charset="0"/>
+                      </a:rPr>
+                      <m:t>𝑓</m:t>
+                    </m:r>
+                    <m:r>
+                      <a:rPr lang="fr-FR" sz="2200" i="1">
+                        <a:latin typeface="Cambria Math" panose="02040503050406030204" pitchFamily="18" charset="0"/>
+                      </a:rPr>
+                      <m:t> ∗</m:t>
+                    </m:r>
+                    <m:r>
+                      <a:rPr lang="fr-FR" sz="2200" i="1">
+                        <a:latin typeface="Cambria Math" panose="02040503050406030204" pitchFamily="18" charset="0"/>
+                      </a:rPr>
+                      <m:t>𝑔</m:t>
+                    </m:r>
+                    <m:r>
+                      <a:rPr lang="fr-FR" sz="2200" i="1">
+                        <a:latin typeface="Cambria Math" panose="02040503050406030204" pitchFamily="18" charset="0"/>
+                      </a:rPr>
+                      <m:t>=</m:t>
+                    </m:r>
+                    <m:r>
+                      <a:rPr lang="fr-FR" sz="2200" i="1">
+                        <a:latin typeface="Cambria Math" panose="02040503050406030204" pitchFamily="18" charset="0"/>
+                      </a:rPr>
+                      <m:t>h</m:t>
+                    </m:r>
+                  </m:oMath>
+                </a14:m>
+                <a:r>
+                  <a:rPr lang="fr-FR" altLang="fr-FR" sz="2300" dirty="0"/>
+                  <a:t>, </a:t>
+                </a:r>
+                <a:r>
+                  <a:rPr lang="fr-FR" altLang="fr-FR" sz="2300" dirty="0" err="1"/>
+                  <a:t>send</a:t>
+                </a:r>
+                <a:r>
+                  <a:rPr lang="fr-FR" altLang="fr-FR" sz="2300" dirty="0"/>
+                  <a:t> </a:t>
+                </a:r>
+                <a:r>
+                  <a:rPr lang="fr-FR" altLang="fr-FR" sz="2300" i="1" dirty="0"/>
+                  <a:t>[h]i </a:t>
+                </a:r>
+                <a:r>
+                  <a:rPr lang="fr-FR" altLang="fr-FR" sz="2300" dirty="0"/>
+                  <a:t>and </a:t>
+                </a:r>
+                <a:r>
+                  <a:rPr lang="fr-FR" altLang="fr-FR" sz="2300" i="1" dirty="0"/>
+                  <a:t>[x]i</a:t>
+                </a:r>
+              </a:p>
+              <a:p>
+                <a:pPr indent="-327025">
+                  <a:buClrTx/>
+                  <a:buFontTx/>
+                  <a:buNone/>
+                  <a:tabLst>
+                    <a:tab pos="342900" algn="l"/>
+                    <a:tab pos="447675" algn="l"/>
+                    <a:tab pos="896938" algn="l"/>
+                    <a:tab pos="1346200" algn="l"/>
+                    <a:tab pos="1795463" algn="l"/>
+                    <a:tab pos="2244725" algn="l"/>
+                    <a:tab pos="2693988" algn="l"/>
+                    <a:tab pos="3143250" algn="l"/>
+                    <a:tab pos="3592513" algn="l"/>
+                    <a:tab pos="4041775" algn="l"/>
+                    <a:tab pos="4491038" algn="l"/>
+                    <a:tab pos="4940300" algn="l"/>
+                    <a:tab pos="5389563" algn="l"/>
+                    <a:tab pos="5838825" algn="l"/>
+                    <a:tab pos="6288088" algn="l"/>
+                    <a:tab pos="6737350" algn="l"/>
+                    <a:tab pos="7186613" algn="l"/>
+                    <a:tab pos="7635875" algn="l"/>
+                    <a:tab pos="8085138" algn="l"/>
+                    <a:tab pos="8534400" algn="l"/>
+                    <a:tab pos="8983663" algn="l"/>
+                  </a:tabLst>
+                </a:pPr>
+                <a:r>
+                  <a:rPr lang="fr-FR" altLang="fr-FR" sz="2300" dirty="0"/>
+                  <a:t>Server </a:t>
+                </a:r>
+                <a:r>
+                  <a:rPr lang="fr-FR" altLang="fr-FR" sz="2300" dirty="0" err="1"/>
+                  <a:t>reconstruct</a:t>
+                </a:r>
+                <a:r>
+                  <a:rPr lang="fr-FR" altLang="fr-FR" sz="2300" dirty="0"/>
+                  <a:t> </a:t>
+                </a:r>
+                <a:r>
+                  <a:rPr lang="fr-FR" altLang="fr-FR" sz="2300" dirty="0" err="1"/>
+                  <a:t>share</a:t>
+                </a:r>
+                <a:r>
+                  <a:rPr lang="fr-FR" altLang="fr-FR" sz="2300" dirty="0"/>
+                  <a:t> </a:t>
+                </a:r>
+                <a:r>
+                  <a:rPr lang="fr-FR" altLang="fr-FR" sz="2300" i="1" dirty="0"/>
+                  <a:t>[f]i </a:t>
+                </a:r>
+                <a:r>
+                  <a:rPr lang="fr-FR" altLang="fr-FR" sz="2300" dirty="0"/>
+                  <a:t>and </a:t>
+                </a:r>
+                <a:r>
+                  <a:rPr lang="fr-FR" altLang="fr-FR" sz="2300" i="1" dirty="0"/>
+                  <a:t>[g]i</a:t>
+                </a:r>
+                <a:r>
+                  <a:rPr lang="fr-FR" altLang="fr-FR" sz="2300" dirty="0"/>
+                  <a:t> </a:t>
+                </a:r>
+                <a:r>
+                  <a:rPr lang="fr-FR" altLang="fr-FR" sz="2300" dirty="0" err="1"/>
+                  <a:t>from</a:t>
+                </a:r>
+                <a:r>
+                  <a:rPr lang="fr-FR" altLang="fr-FR" sz="2300" dirty="0"/>
+                  <a:t> </a:t>
+                </a:r>
+                <a:r>
+                  <a:rPr lang="fr-FR" altLang="fr-FR" sz="2300" dirty="0" err="1"/>
+                  <a:t>wire</a:t>
+                </a:r>
+                <a:r>
+                  <a:rPr lang="fr-FR" altLang="fr-FR" sz="2300" dirty="0"/>
+                  <a:t> </a:t>
+                </a:r>
+                <a:r>
+                  <a:rPr lang="fr-FR" altLang="fr-FR" sz="2300" dirty="0" err="1"/>
+                  <a:t>share</a:t>
+                </a:r>
+                <a:r>
+                  <a:rPr lang="fr-FR" altLang="fr-FR" sz="2300" dirty="0"/>
+                  <a:t> </a:t>
+                </a:r>
+                <a:r>
+                  <a:rPr lang="fr-FR" altLang="fr-FR" sz="2300" i="1" dirty="0"/>
+                  <a:t>[h]i </a:t>
+                </a:r>
+                <a:r>
+                  <a:rPr lang="fr-FR" altLang="fr-FR" sz="2300" dirty="0"/>
+                  <a:t>and </a:t>
+                </a:r>
+                <a:r>
+                  <a:rPr lang="fr-FR" altLang="fr-FR" sz="2300" dirty="0" err="1"/>
+                  <a:t>share</a:t>
+                </a:r>
+                <a:r>
+                  <a:rPr lang="fr-FR" altLang="fr-FR" sz="2300" dirty="0"/>
+                  <a:t> of [x]i, </a:t>
+                </a:r>
+                <a:r>
+                  <a:rPr lang="fr-FR" altLang="fr-FR" sz="2300" dirty="0" err="1"/>
+                  <a:t>with</a:t>
+                </a:r>
+                <a:r>
+                  <a:rPr lang="fr-FR" altLang="fr-FR" sz="2300" dirty="0"/>
+                  <a:t> polynomial interpolation</a:t>
+                </a:r>
+              </a:p>
+              <a:p>
+                <a:pPr indent="-327025">
+                  <a:buClrTx/>
+                  <a:buFontTx/>
+                  <a:buNone/>
+                  <a:tabLst>
+                    <a:tab pos="342900" algn="l"/>
+                    <a:tab pos="447675" algn="l"/>
+                    <a:tab pos="896938" algn="l"/>
+                    <a:tab pos="1346200" algn="l"/>
+                    <a:tab pos="1795463" algn="l"/>
+                    <a:tab pos="2244725" algn="l"/>
+                    <a:tab pos="2693988" algn="l"/>
+                    <a:tab pos="3143250" algn="l"/>
+                    <a:tab pos="3592513" algn="l"/>
+                    <a:tab pos="4041775" algn="l"/>
+                    <a:tab pos="4491038" algn="l"/>
+                    <a:tab pos="4940300" algn="l"/>
+                    <a:tab pos="5389563" algn="l"/>
+                    <a:tab pos="5838825" algn="l"/>
+                    <a:tab pos="6288088" algn="l"/>
+                    <a:tab pos="6737350" algn="l"/>
+                    <a:tab pos="7186613" algn="l"/>
+                    <a:tab pos="7635875" algn="l"/>
+                    <a:tab pos="8085138" algn="l"/>
+                    <a:tab pos="8534400" algn="l"/>
+                    <a:tab pos="8983663" algn="l"/>
+                  </a:tabLst>
+                </a:pPr>
+                <a:r>
+                  <a:rPr lang="fr-FR" altLang="fr-FR" sz="2300" dirty="0"/>
+                  <a:t>Need to check </a:t>
+                </a:r>
+                <a:r>
+                  <a:rPr lang="fr-FR" altLang="fr-FR" sz="2300" dirty="0" err="1"/>
+                  <a:t>that</a:t>
+                </a:r>
+                <a:r>
+                  <a:rPr lang="fr-FR" altLang="fr-FR" sz="2300" dirty="0"/>
+                  <a:t>                  , </a:t>
+                </a:r>
+                <a:r>
+                  <a:rPr lang="fr-FR" altLang="fr-FR" sz="2300" dirty="0" err="1"/>
+                  <a:t>pick</a:t>
+                </a:r>
+                <a:r>
+                  <a:rPr lang="fr-FR" altLang="fr-FR" sz="2300" dirty="0"/>
+                  <a:t> </a:t>
+                </a:r>
+                <a:r>
+                  <a:rPr lang="fr-FR" altLang="fr-FR" sz="2300" dirty="0" err="1"/>
+                  <a:t>random</a:t>
+                </a:r>
+                <a:r>
+                  <a:rPr lang="fr-FR" altLang="fr-FR" sz="2300" i="1" dirty="0"/>
+                  <a:t> r</a:t>
+                </a:r>
+                <a:r>
+                  <a:rPr lang="fr-FR" altLang="fr-FR" sz="2300" dirty="0"/>
+                  <a:t>, </a:t>
+                </a:r>
+                <a:r>
+                  <a:rPr lang="fr-FR" altLang="fr-FR" sz="2300" dirty="0" err="1"/>
+                  <a:t>publish</a:t>
+                </a:r>
+                <a:r>
+                  <a:rPr lang="fr-FR" altLang="fr-FR" sz="2300" dirty="0"/>
+                  <a:t>	</a:t>
+                </a:r>
+                <a:r>
+                  <a:rPr lang="fr-FR" altLang="fr-FR" sz="2300" i="1" dirty="0"/>
+                  <a:t>[f(r)]i * [g(r)]i – [h(r)]i </a:t>
+                </a:r>
+                <a:r>
+                  <a:rPr lang="fr-FR" altLang="fr-FR" sz="2300" dirty="0" err="1"/>
+                  <a:t>should</a:t>
+                </a:r>
+                <a:r>
+                  <a:rPr lang="fr-FR" altLang="fr-FR" sz="2300" dirty="0"/>
+                  <a:t> </a:t>
+                </a:r>
+                <a:r>
+                  <a:rPr lang="fr-FR" altLang="fr-FR" sz="2300" dirty="0" err="1"/>
+                  <a:t>be</a:t>
+                </a:r>
+                <a:r>
+                  <a:rPr lang="fr-FR" altLang="fr-FR" sz="2300" dirty="0"/>
+                  <a:t> 0</a:t>
+                </a:r>
+              </a:p>
+              <a:p>
+                <a:pPr indent="-327025">
+                  <a:buClrTx/>
+                  <a:buFontTx/>
+                  <a:buNone/>
+                  <a:tabLst>
+                    <a:tab pos="342900" algn="l"/>
+                    <a:tab pos="447675" algn="l"/>
+                    <a:tab pos="896938" algn="l"/>
+                    <a:tab pos="1346200" algn="l"/>
+                    <a:tab pos="1795463" algn="l"/>
+                    <a:tab pos="2244725" algn="l"/>
+                    <a:tab pos="2693988" algn="l"/>
+                    <a:tab pos="3143250" algn="l"/>
+                    <a:tab pos="3592513" algn="l"/>
+                    <a:tab pos="4041775" algn="l"/>
+                    <a:tab pos="4491038" algn="l"/>
+                    <a:tab pos="4940300" algn="l"/>
+                    <a:tab pos="5389563" algn="l"/>
+                    <a:tab pos="5838825" algn="l"/>
+                    <a:tab pos="6288088" algn="l"/>
+                    <a:tab pos="6737350" algn="l"/>
+                    <a:tab pos="7186613" algn="l"/>
+                    <a:tab pos="7635875" algn="l"/>
+                    <a:tab pos="8085138" algn="l"/>
+                    <a:tab pos="8534400" algn="l"/>
+                    <a:tab pos="8983663" algn="l"/>
+                  </a:tabLst>
+                </a:pPr>
+                <a:r>
+                  <a:rPr lang="fr-FR" altLang="fr-FR" sz="2300" dirty="0"/>
+                  <a:t>MPC triple, </a:t>
+                </a:r>
+                <a:r>
+                  <a:rPr lang="fr-FR" altLang="fr-FR" sz="2300" dirty="0" err="1"/>
+                  <a:t>a.b</a:t>
+                </a:r>
+                <a:r>
+                  <a:rPr lang="fr-FR" altLang="fr-FR" sz="2300" dirty="0"/>
+                  <a:t> =c </a:t>
+                </a:r>
+                <a:r>
+                  <a:rPr lang="fr-FR" altLang="fr-FR" sz="2300" dirty="0" err="1"/>
+                  <a:t>shared</a:t>
+                </a:r>
+                <a:r>
+                  <a:rPr lang="fr-FR" altLang="fr-FR" sz="2300" dirty="0"/>
+                  <a:t>, </a:t>
+                </a:r>
+                <a:r>
+                  <a:rPr lang="fr-FR" altLang="fr-FR" sz="2300" dirty="0" err="1"/>
+                  <a:t>each</a:t>
+                </a:r>
+                <a:r>
+                  <a:rPr lang="fr-FR" altLang="fr-FR" sz="2300" dirty="0"/>
+                  <a:t> </a:t>
+                </a:r>
+                <a:r>
+                  <a:rPr lang="fr-FR" altLang="fr-FR" sz="2300" dirty="0" err="1"/>
+                  <a:t>compute</a:t>
+                </a:r>
+                <a:r>
+                  <a:rPr lang="fr-FR" altLang="fr-FR" sz="2300" dirty="0"/>
+                  <a:t> : </a:t>
+                </a:r>
+                <a14:m>
+                  <m:oMath xmlns:m="http://schemas.openxmlformats.org/officeDocument/2006/math">
+                    <m:sSub>
+                      <m:sSubPr>
+                        <m:ctrlPr>
+                          <a:rPr lang="fr-FR" altLang="fr-FR" sz="2300" b="0" i="1" smtClean="0">
+                            <a:latin typeface="Cambria Math" panose="02040503050406030204" pitchFamily="18" charset="0"/>
+                          </a:rPr>
+                        </m:ctrlPr>
+                      </m:sSubPr>
+                      <m:e>
+                        <m:r>
+                          <a:rPr lang="fr-FR" altLang="fr-FR" sz="2300" b="0" i="1" smtClean="0">
+                            <a:latin typeface="Cambria Math" panose="02040503050406030204" pitchFamily="18" charset="0"/>
+                          </a:rPr>
+                          <m:t>𝑑</m:t>
+                        </m:r>
+                      </m:e>
+                      <m:sub>
+                        <m:r>
+                          <a:rPr lang="fr-FR" altLang="fr-FR" sz="2300" b="0" i="1" smtClean="0">
+                            <a:latin typeface="Cambria Math" panose="02040503050406030204" pitchFamily="18" charset="0"/>
+                          </a:rPr>
+                          <m:t>𝑖</m:t>
+                        </m:r>
+                      </m:sub>
+                    </m:sSub>
+                    <m:r>
+                      <a:rPr lang="fr-FR" altLang="fr-FR" sz="2300" b="0" i="1" smtClean="0">
+                        <a:latin typeface="Cambria Math" panose="02040503050406030204" pitchFamily="18" charset="0"/>
+                      </a:rPr>
+                      <m:t>=</m:t>
+                    </m:r>
+                    <m:sSub>
+                      <m:sSubPr>
+                        <m:ctrlPr>
+                          <a:rPr lang="fr-FR" altLang="fr-FR" sz="2300" b="0" i="1" smtClean="0">
+                            <a:latin typeface="Cambria Math" panose="02040503050406030204" pitchFamily="18" charset="0"/>
+                          </a:rPr>
+                        </m:ctrlPr>
+                      </m:sSubPr>
+                      <m:e>
+                        <m:r>
+                          <a:rPr lang="fr-FR" altLang="fr-FR" sz="2300" b="0" i="1" smtClean="0">
+                            <a:latin typeface="Cambria Math" panose="02040503050406030204" pitchFamily="18" charset="0"/>
+                          </a:rPr>
+                          <m:t>𝑓</m:t>
+                        </m:r>
+                      </m:e>
+                      <m:sub>
+                        <m:r>
+                          <a:rPr lang="fr-FR" altLang="fr-FR" sz="2300" b="0" i="1" smtClean="0">
+                            <a:latin typeface="Cambria Math" panose="02040503050406030204" pitchFamily="18" charset="0"/>
+                          </a:rPr>
+                          <m:t>𝑖</m:t>
+                        </m:r>
+                      </m:sub>
+                    </m:sSub>
+                    <m:r>
+                      <a:rPr lang="fr-FR" altLang="fr-FR" sz="2300" b="0" i="1" smtClean="0">
+                        <a:latin typeface="Cambria Math" panose="02040503050406030204" pitchFamily="18" charset="0"/>
+                      </a:rPr>
+                      <m:t>−</m:t>
+                    </m:r>
+                    <m:sSub>
+                      <m:sSubPr>
+                        <m:ctrlPr>
+                          <a:rPr lang="fr-FR" altLang="fr-FR" sz="2300" b="0" i="1" smtClean="0">
+                            <a:latin typeface="Cambria Math" panose="02040503050406030204" pitchFamily="18" charset="0"/>
+                          </a:rPr>
+                        </m:ctrlPr>
+                      </m:sSubPr>
+                      <m:e>
+                        <m:r>
+                          <a:rPr lang="fr-FR" altLang="fr-FR" sz="2300" b="0" i="1" smtClean="0">
+                            <a:latin typeface="Cambria Math" panose="02040503050406030204" pitchFamily="18" charset="0"/>
+                          </a:rPr>
+                          <m:t>𝑎</m:t>
+                        </m:r>
+                      </m:e>
+                      <m:sub>
+                        <m:r>
+                          <a:rPr lang="fr-FR" altLang="fr-FR" sz="2300" b="0" i="1" smtClean="0">
+                            <a:latin typeface="Cambria Math" panose="02040503050406030204" pitchFamily="18" charset="0"/>
+                          </a:rPr>
+                          <m:t>𝑖</m:t>
+                        </m:r>
+                      </m:sub>
+                    </m:sSub>
+                    <m:r>
+                      <a:rPr lang="fr-FR" altLang="fr-FR" sz="2300" b="0" i="1" smtClean="0">
+                        <a:latin typeface="Cambria Math" panose="02040503050406030204" pitchFamily="18" charset="0"/>
+                      </a:rPr>
+                      <m:t> </m:t>
+                    </m:r>
+                  </m:oMath>
+                </a14:m>
+                <a:r>
+                  <a:rPr lang="fr-FR" altLang="fr-FR" sz="2300" dirty="0"/>
+                  <a:t>and </a:t>
+                </a:r>
+                <a14:m>
+                  <m:oMath xmlns:m="http://schemas.openxmlformats.org/officeDocument/2006/math">
+                    <m:sSub>
+                      <m:sSubPr>
+                        <m:ctrlPr>
+                          <a:rPr lang="fr-FR" altLang="fr-FR" sz="2300" b="0" i="1" smtClean="0">
+                            <a:latin typeface="Cambria Math" panose="02040503050406030204" pitchFamily="18" charset="0"/>
+                          </a:rPr>
+                        </m:ctrlPr>
+                      </m:sSubPr>
+                      <m:e>
+                        <m:r>
+                          <a:rPr lang="fr-FR" altLang="fr-FR" sz="2300" b="0" i="1" smtClean="0">
+                            <a:latin typeface="Cambria Math" panose="02040503050406030204" pitchFamily="18" charset="0"/>
+                          </a:rPr>
+                          <m:t>𝑒</m:t>
+                        </m:r>
+                      </m:e>
+                      <m:sub>
+                        <m:r>
+                          <a:rPr lang="fr-FR" altLang="fr-FR" sz="2300" b="0" i="1" smtClean="0">
+                            <a:latin typeface="Cambria Math" panose="02040503050406030204" pitchFamily="18" charset="0"/>
+                          </a:rPr>
+                          <m:t>𝑖</m:t>
+                        </m:r>
+                      </m:sub>
+                    </m:sSub>
+                    <m:r>
+                      <a:rPr lang="fr-FR" altLang="fr-FR" sz="2300" b="0" i="1" smtClean="0">
+                        <a:latin typeface="Cambria Math" panose="02040503050406030204" pitchFamily="18" charset="0"/>
+                      </a:rPr>
+                      <m:t>=</m:t>
+                    </m:r>
+                    <m:sSub>
+                      <m:sSubPr>
+                        <m:ctrlPr>
+                          <a:rPr lang="fr-FR" altLang="fr-FR" sz="2300" b="0" i="1" smtClean="0">
+                            <a:latin typeface="Cambria Math" panose="02040503050406030204" pitchFamily="18" charset="0"/>
+                          </a:rPr>
+                        </m:ctrlPr>
+                      </m:sSubPr>
+                      <m:e>
+                        <m:r>
+                          <a:rPr lang="fr-FR" altLang="fr-FR" sz="2300" b="0" i="1" smtClean="0">
+                            <a:latin typeface="Cambria Math" panose="02040503050406030204" pitchFamily="18" charset="0"/>
+                          </a:rPr>
+                          <m:t>𝑔</m:t>
+                        </m:r>
+                      </m:e>
+                      <m:sub>
+                        <m:r>
+                          <a:rPr lang="fr-FR" altLang="fr-FR" sz="2300" b="0" i="1" smtClean="0">
+                            <a:latin typeface="Cambria Math" panose="02040503050406030204" pitchFamily="18" charset="0"/>
+                          </a:rPr>
+                          <m:t>𝑖</m:t>
+                        </m:r>
+                      </m:sub>
+                    </m:sSub>
+                    <m:r>
+                      <a:rPr lang="fr-FR" altLang="fr-FR" sz="2300" b="0" i="1" smtClean="0">
+                        <a:latin typeface="Cambria Math" panose="02040503050406030204" pitchFamily="18" charset="0"/>
+                      </a:rPr>
+                      <m:t>−</m:t>
+                    </m:r>
+                    <m:sSub>
+                      <m:sSubPr>
+                        <m:ctrlPr>
+                          <a:rPr lang="fr-FR" altLang="fr-FR" sz="2300" b="0" i="1" smtClean="0">
+                            <a:latin typeface="Cambria Math" panose="02040503050406030204" pitchFamily="18" charset="0"/>
+                          </a:rPr>
+                        </m:ctrlPr>
+                      </m:sSubPr>
+                      <m:e>
+                        <m:r>
+                          <a:rPr lang="fr-FR" altLang="fr-FR" sz="2300" b="0" i="1" smtClean="0">
+                            <a:latin typeface="Cambria Math" panose="02040503050406030204" pitchFamily="18" charset="0"/>
+                          </a:rPr>
+                          <m:t>𝑏</m:t>
+                        </m:r>
+                      </m:e>
+                      <m:sub>
+                        <m:r>
+                          <a:rPr lang="fr-FR" altLang="fr-FR" sz="2300" b="0" i="1" smtClean="0">
+                            <a:latin typeface="Cambria Math" panose="02040503050406030204" pitchFamily="18" charset="0"/>
+                          </a:rPr>
+                          <m:t>𝑖</m:t>
+                        </m:r>
+                      </m:sub>
+                    </m:sSub>
+                  </m:oMath>
+                </a14:m>
+                <a:endParaRPr lang="fr-FR" altLang="fr-FR" sz="2300" b="0" dirty="0"/>
+              </a:p>
+              <a:p>
+                <a:pPr indent="-327025">
+                  <a:buClrTx/>
+                  <a:buFontTx/>
+                  <a:buNone/>
+                  <a:tabLst>
+                    <a:tab pos="342900" algn="l"/>
+                    <a:tab pos="447675" algn="l"/>
+                    <a:tab pos="896938" algn="l"/>
+                    <a:tab pos="1346200" algn="l"/>
+                    <a:tab pos="1795463" algn="l"/>
+                    <a:tab pos="2244725" algn="l"/>
+                    <a:tab pos="2693988" algn="l"/>
+                    <a:tab pos="3143250" algn="l"/>
+                    <a:tab pos="3592513" algn="l"/>
+                    <a:tab pos="4041775" algn="l"/>
+                    <a:tab pos="4491038" algn="l"/>
+                    <a:tab pos="4940300" algn="l"/>
+                    <a:tab pos="5389563" algn="l"/>
+                    <a:tab pos="5838825" algn="l"/>
+                    <a:tab pos="6288088" algn="l"/>
+                    <a:tab pos="6737350" algn="l"/>
+                    <a:tab pos="7186613" algn="l"/>
+                    <a:tab pos="7635875" algn="l"/>
+                    <a:tab pos="8085138" algn="l"/>
+                    <a:tab pos="8534400" algn="l"/>
+                    <a:tab pos="8983663" algn="l"/>
+                  </a:tabLst>
+                </a:pPr>
+                <a:r>
+                  <a:rPr lang="fr-FR" altLang="fr-FR" sz="2300" dirty="0"/>
+                  <a:t>, broadcast </a:t>
+                </a:r>
+                <a:r>
+                  <a:rPr lang="fr-FR" altLang="fr-FR" sz="2300" dirty="0" err="1"/>
+                  <a:t>these</a:t>
+                </a:r>
+                <a:r>
+                  <a:rPr lang="fr-FR" altLang="fr-FR" sz="2300" dirty="0"/>
+                  <a:t> to </a:t>
+                </a:r>
+                <a:r>
+                  <a:rPr lang="fr-FR" altLang="fr-FR" sz="2300" dirty="0" err="1"/>
+                  <a:t>reconstruct</a:t>
+                </a:r>
+                <a:r>
+                  <a:rPr lang="fr-FR" altLang="fr-FR" sz="2300" dirty="0"/>
+                  <a:t> d &amp; e.</a:t>
+                </a:r>
+              </a:p>
+              <a:p>
+                <a:pPr indent="-327025">
+                  <a:buClrTx/>
+                  <a:buFontTx/>
+                  <a:buNone/>
+                  <a:tabLst>
+                    <a:tab pos="342900" algn="l"/>
+                    <a:tab pos="447675" algn="l"/>
+                    <a:tab pos="896938" algn="l"/>
+                    <a:tab pos="1346200" algn="l"/>
+                    <a:tab pos="1795463" algn="l"/>
+                    <a:tab pos="2244725" algn="l"/>
+                    <a:tab pos="2693988" algn="l"/>
+                    <a:tab pos="3143250" algn="l"/>
+                    <a:tab pos="3592513" algn="l"/>
+                    <a:tab pos="4041775" algn="l"/>
+                    <a:tab pos="4491038" algn="l"/>
+                    <a:tab pos="4940300" algn="l"/>
+                    <a:tab pos="5389563" algn="l"/>
+                    <a:tab pos="5838825" algn="l"/>
+                    <a:tab pos="6288088" algn="l"/>
+                    <a:tab pos="6737350" algn="l"/>
+                    <a:tab pos="7186613" algn="l"/>
+                    <a:tab pos="7635875" algn="l"/>
+                    <a:tab pos="8085138" algn="l"/>
+                    <a:tab pos="8534400" algn="l"/>
+                    <a:tab pos="8983663" algn="l"/>
+                  </a:tabLst>
+                </a:pPr>
+                <a14:m>
+                  <m:oMath xmlns:m="http://schemas.openxmlformats.org/officeDocument/2006/math">
+                    <m:sSub>
+                      <m:sSubPr>
+                        <m:ctrlPr>
+                          <a:rPr lang="fr-FR" altLang="fr-FR" sz="2300" b="0" i="1" smtClean="0">
+                            <a:latin typeface="Cambria Math" panose="02040503050406030204" pitchFamily="18" charset="0"/>
+                          </a:rPr>
+                        </m:ctrlPr>
+                      </m:sSubPr>
+                      <m:e>
+                        <m:r>
+                          <a:rPr lang="fr-FR" altLang="fr-FR" sz="2300" b="0" i="1" smtClean="0">
+                            <a:latin typeface="Cambria Math" panose="02040503050406030204" pitchFamily="18" charset="0"/>
+                          </a:rPr>
+                          <m:t>𝑧</m:t>
+                        </m:r>
+                      </m:e>
+                      <m:sub>
+                        <m:r>
+                          <a:rPr lang="fr-FR" altLang="fr-FR" sz="2300" b="0" i="1" smtClean="0">
+                            <a:latin typeface="Cambria Math" panose="02040503050406030204" pitchFamily="18" charset="0"/>
+                          </a:rPr>
+                          <m:t>𝑖</m:t>
+                        </m:r>
+                      </m:sub>
+                    </m:sSub>
+                    <m:r>
+                      <a:rPr lang="fr-FR" altLang="fr-FR" sz="2300" b="0" i="1" smtClean="0">
+                        <a:latin typeface="Cambria Math" panose="02040503050406030204" pitchFamily="18" charset="0"/>
+                      </a:rPr>
+                      <m:t>=</m:t>
+                    </m:r>
+                    <m:r>
+                      <a:rPr lang="fr-FR" altLang="fr-FR" sz="2300" b="0" i="1" smtClean="0">
+                        <a:latin typeface="Cambria Math" panose="02040503050406030204" pitchFamily="18" charset="0"/>
+                      </a:rPr>
+                      <m:t>𝑑𝑒</m:t>
+                    </m:r>
+                    <m:r>
+                      <a:rPr lang="fr-FR" altLang="fr-FR" sz="2300" b="0" i="1" smtClean="0">
+                        <a:latin typeface="Cambria Math" panose="02040503050406030204" pitchFamily="18" charset="0"/>
+                      </a:rPr>
+                      <m:t>+</m:t>
+                    </m:r>
+                    <m:r>
+                      <a:rPr lang="fr-FR" altLang="fr-FR" sz="2300" b="0" i="1" smtClean="0">
+                        <a:latin typeface="Cambria Math" panose="02040503050406030204" pitchFamily="18" charset="0"/>
+                      </a:rPr>
+                      <m:t>𝑑</m:t>
+                    </m:r>
+                    <m:sSub>
+                      <m:sSubPr>
+                        <m:ctrlPr>
+                          <a:rPr lang="fr-FR" altLang="fr-FR" sz="2300" b="0" i="1" smtClean="0">
+                            <a:latin typeface="Cambria Math" panose="02040503050406030204" pitchFamily="18" charset="0"/>
+                          </a:rPr>
+                        </m:ctrlPr>
+                      </m:sSubPr>
+                      <m:e>
+                        <m:r>
+                          <a:rPr lang="fr-FR" altLang="fr-FR" sz="2300" b="0" i="1" smtClean="0">
+                            <a:latin typeface="Cambria Math" panose="02040503050406030204" pitchFamily="18" charset="0"/>
+                          </a:rPr>
+                          <m:t>𝑏</m:t>
+                        </m:r>
+                      </m:e>
+                      <m:sub>
+                        <m:r>
+                          <a:rPr lang="fr-FR" altLang="fr-FR" sz="2300" b="0" i="1" smtClean="0">
+                            <a:latin typeface="Cambria Math" panose="02040503050406030204" pitchFamily="18" charset="0"/>
+                          </a:rPr>
+                          <m:t>𝑖</m:t>
+                        </m:r>
+                      </m:sub>
+                    </m:sSub>
+                    <m:r>
+                      <a:rPr lang="fr-FR" altLang="fr-FR" sz="2300" b="0" i="1" smtClean="0">
+                        <a:latin typeface="Cambria Math" panose="02040503050406030204" pitchFamily="18" charset="0"/>
+                      </a:rPr>
+                      <m:t>+</m:t>
+                    </m:r>
+                    <m:r>
+                      <a:rPr lang="fr-FR" altLang="fr-FR" sz="2300" b="0" i="1" smtClean="0">
+                        <a:latin typeface="Cambria Math" panose="02040503050406030204" pitchFamily="18" charset="0"/>
+                      </a:rPr>
+                      <m:t>𝑒</m:t>
+                    </m:r>
+                    <m:sSub>
+                      <m:sSubPr>
+                        <m:ctrlPr>
+                          <a:rPr lang="fr-FR" altLang="fr-FR" sz="2300" b="0" i="1" smtClean="0">
+                            <a:latin typeface="Cambria Math" panose="02040503050406030204" pitchFamily="18" charset="0"/>
+                          </a:rPr>
+                        </m:ctrlPr>
+                      </m:sSubPr>
+                      <m:e>
+                        <m:r>
+                          <a:rPr lang="fr-FR" altLang="fr-FR" sz="2300" b="0" i="1" smtClean="0">
+                            <a:latin typeface="Cambria Math" panose="02040503050406030204" pitchFamily="18" charset="0"/>
+                          </a:rPr>
+                          <m:t>𝑎</m:t>
+                        </m:r>
+                      </m:e>
+                      <m:sub>
+                        <m:r>
+                          <a:rPr lang="fr-FR" altLang="fr-FR" sz="2300" b="0" i="1" smtClean="0">
+                            <a:latin typeface="Cambria Math" panose="02040503050406030204" pitchFamily="18" charset="0"/>
+                          </a:rPr>
+                          <m:t>𝑖</m:t>
+                        </m:r>
+                      </m:sub>
+                    </m:sSub>
+                    <m:r>
+                      <a:rPr lang="fr-FR" altLang="fr-FR" sz="2300" b="0" i="1" smtClean="0">
+                        <a:latin typeface="Cambria Math" panose="02040503050406030204" pitchFamily="18" charset="0"/>
+                      </a:rPr>
+                      <m:t>+</m:t>
+                    </m:r>
+                    <m:sSub>
+                      <m:sSubPr>
+                        <m:ctrlPr>
+                          <a:rPr lang="fr-FR" altLang="fr-FR" sz="2300" b="0" i="1" smtClean="0">
+                            <a:latin typeface="Cambria Math" panose="02040503050406030204" pitchFamily="18" charset="0"/>
+                          </a:rPr>
+                        </m:ctrlPr>
+                      </m:sSubPr>
+                      <m:e>
+                        <m:r>
+                          <a:rPr lang="fr-FR" altLang="fr-FR" sz="2300" b="0" i="1" smtClean="0">
+                            <a:latin typeface="Cambria Math" panose="02040503050406030204" pitchFamily="18" charset="0"/>
+                          </a:rPr>
+                          <m:t>𝑐</m:t>
+                        </m:r>
+                      </m:e>
+                      <m:sub>
+                        <m:r>
+                          <a:rPr lang="fr-FR" altLang="fr-FR" sz="2300" b="0" i="1" smtClean="0">
+                            <a:latin typeface="Cambria Math" panose="02040503050406030204" pitchFamily="18" charset="0"/>
+                          </a:rPr>
+                          <m:t>𝑖</m:t>
+                        </m:r>
+                      </m:sub>
+                    </m:sSub>
+                  </m:oMath>
+                </a14:m>
+                <a:r>
+                  <a:rPr lang="fr-FR" altLang="fr-FR" sz="2300" dirty="0"/>
+                  <a:t> , as </a:t>
+                </a:r>
+                <a14:m>
+                  <m:oMath xmlns:m="http://schemas.openxmlformats.org/officeDocument/2006/math">
+                    <m:r>
+                      <a:rPr lang="fr-FR" altLang="fr-FR" sz="2300" b="0" i="1" smtClean="0">
+                        <a:latin typeface="Cambria Math" panose="02040503050406030204" pitchFamily="18" charset="0"/>
+                      </a:rPr>
+                      <m:t>∑</m:t>
+                    </m:r>
+                    <m:sSub>
+                      <m:sSubPr>
+                        <m:ctrlPr>
+                          <a:rPr lang="fr-FR" altLang="fr-FR" sz="2300" b="0" i="1" smtClean="0">
+                            <a:latin typeface="Cambria Math" panose="02040503050406030204" pitchFamily="18" charset="0"/>
+                          </a:rPr>
+                        </m:ctrlPr>
+                      </m:sSubPr>
+                      <m:e>
+                        <m:r>
+                          <a:rPr lang="fr-FR" altLang="fr-FR" sz="2300" b="0" i="1" smtClean="0">
+                            <a:latin typeface="Cambria Math" panose="02040503050406030204" pitchFamily="18" charset="0"/>
+                          </a:rPr>
+                          <m:t>𝑧</m:t>
+                        </m:r>
+                      </m:e>
+                      <m:sub>
+                        <m:r>
+                          <a:rPr lang="fr-FR" altLang="fr-FR" sz="2300" b="0" i="1" smtClean="0">
+                            <a:latin typeface="Cambria Math" panose="02040503050406030204" pitchFamily="18" charset="0"/>
+                          </a:rPr>
+                          <m:t>𝑖</m:t>
+                        </m:r>
+                      </m:sub>
+                    </m:sSub>
+                    <m:r>
+                      <a:rPr lang="fr-FR" altLang="fr-FR" sz="2300" b="0" i="1" smtClean="0">
+                        <a:latin typeface="Cambria Math" panose="02040503050406030204" pitchFamily="18" charset="0"/>
+                      </a:rPr>
+                      <m:t>=</m:t>
+                    </m:r>
+                    <m:r>
+                      <a:rPr lang="fr-FR" altLang="fr-FR" sz="2300" b="0" i="1" smtClean="0">
+                        <a:latin typeface="Cambria Math" panose="02040503050406030204" pitchFamily="18" charset="0"/>
+                      </a:rPr>
+                      <m:t>𝑑𝑒</m:t>
+                    </m:r>
+                    <m:r>
+                      <a:rPr lang="fr-FR" altLang="fr-FR" sz="2300" b="0" i="1" smtClean="0">
+                        <a:latin typeface="Cambria Math" panose="02040503050406030204" pitchFamily="18" charset="0"/>
+                      </a:rPr>
+                      <m:t>+</m:t>
+                    </m:r>
+                    <m:r>
+                      <a:rPr lang="fr-FR" altLang="fr-FR" sz="2300" b="0" i="1" smtClean="0">
+                        <a:latin typeface="Cambria Math" panose="02040503050406030204" pitchFamily="18" charset="0"/>
+                      </a:rPr>
+                      <m:t>𝑑𝑏</m:t>
+                    </m:r>
+                    <m:r>
+                      <a:rPr lang="fr-FR" altLang="fr-FR" sz="2300" b="0" i="1" smtClean="0">
+                        <a:latin typeface="Cambria Math" panose="02040503050406030204" pitchFamily="18" charset="0"/>
+                      </a:rPr>
+                      <m:t>+</m:t>
+                    </m:r>
+                    <m:r>
+                      <a:rPr lang="fr-FR" altLang="fr-FR" sz="2300" b="0" i="1" smtClean="0">
+                        <a:latin typeface="Cambria Math" panose="02040503050406030204" pitchFamily="18" charset="0"/>
+                      </a:rPr>
+                      <m:t>𝑒𝑎</m:t>
+                    </m:r>
+                    <m:r>
+                      <a:rPr lang="fr-FR" altLang="fr-FR" sz="2300" b="0" i="1" smtClean="0">
+                        <a:latin typeface="Cambria Math" panose="02040503050406030204" pitchFamily="18" charset="0"/>
+                      </a:rPr>
+                      <m:t>+</m:t>
+                    </m:r>
+                    <m:r>
+                      <a:rPr lang="fr-FR" altLang="fr-FR" sz="2300" b="0" i="1" smtClean="0">
+                        <a:latin typeface="Cambria Math" panose="02040503050406030204" pitchFamily="18" charset="0"/>
+                      </a:rPr>
+                      <m:t>𝑐</m:t>
+                    </m:r>
+                    <m:r>
+                      <a:rPr lang="fr-FR" altLang="fr-FR" sz="2300" b="0" i="1" smtClean="0">
+                        <a:latin typeface="Cambria Math" panose="02040503050406030204" pitchFamily="18" charset="0"/>
+                      </a:rPr>
+                      <m:t>=</m:t>
+                    </m:r>
+                    <m:r>
+                      <a:rPr lang="fr-FR" altLang="fr-FR" sz="2300" b="0" i="1" smtClean="0">
+                        <a:latin typeface="Cambria Math" panose="02040503050406030204" pitchFamily="18" charset="0"/>
+                      </a:rPr>
+                      <m:t>𝑓</m:t>
+                    </m:r>
+                    <m:r>
+                      <a:rPr lang="fr-FR" altLang="fr-FR" sz="2300" b="0" i="1" smtClean="0">
+                        <a:latin typeface="Cambria Math" panose="02040503050406030204" pitchFamily="18" charset="0"/>
+                      </a:rPr>
+                      <m:t>∗</m:t>
+                    </m:r>
+                    <m:r>
+                      <a:rPr lang="fr-FR" altLang="fr-FR" sz="2300" b="0" i="1" smtClean="0">
+                        <a:latin typeface="Cambria Math" panose="02040503050406030204" pitchFamily="18" charset="0"/>
+                      </a:rPr>
+                      <m:t>𝑔</m:t>
+                    </m:r>
+                    <m:r>
+                      <a:rPr lang="fr-FR" altLang="fr-FR" sz="2300" b="0" i="1" smtClean="0">
+                        <a:latin typeface="Cambria Math" panose="02040503050406030204" pitchFamily="18" charset="0"/>
+                      </a:rPr>
+                      <m:t>=</m:t>
+                    </m:r>
+                    <m:r>
+                      <a:rPr lang="fr-FR" altLang="fr-FR" sz="2300" b="0" i="1" smtClean="0">
+                        <a:latin typeface="Cambria Math" panose="02040503050406030204" pitchFamily="18" charset="0"/>
+                      </a:rPr>
+                      <m:t>h</m:t>
+                    </m:r>
+                    <m:r>
+                      <a:rPr lang="fr-FR" altLang="fr-FR" sz="2300" b="0" i="1" smtClean="0">
+                        <a:latin typeface="Cambria Math" panose="02040503050406030204" pitchFamily="18" charset="0"/>
+                      </a:rPr>
+                      <m:t> ;</m:t>
+                    </m:r>
+                    <m:r>
+                      <a:rPr lang="fr-FR" altLang="fr-FR" sz="2300" b="0" i="1" smtClean="0">
+                        <a:latin typeface="Cambria Math" panose="02040503050406030204" pitchFamily="18" charset="0"/>
+                      </a:rPr>
+                      <m:t>𝑡h𝑒𝑛</m:t>
+                    </m:r>
+                    <m:r>
+                      <a:rPr lang="fr-FR" altLang="fr-FR" sz="2300" b="0" i="1" smtClean="0">
+                        <a:latin typeface="Cambria Math" panose="02040503050406030204" pitchFamily="18" charset="0"/>
+                      </a:rPr>
+                      <m:t> </m:t>
+                    </m:r>
+                    <m:sSub>
+                      <m:sSubPr>
+                        <m:ctrlPr>
+                          <a:rPr lang="fr-FR" altLang="fr-FR" sz="2300" b="0" i="1" smtClean="0">
+                            <a:latin typeface="Cambria Math" panose="02040503050406030204" pitchFamily="18" charset="0"/>
+                          </a:rPr>
+                        </m:ctrlPr>
+                      </m:sSubPr>
+                      <m:e>
+                        <m:r>
+                          <a:rPr lang="fr-FR" altLang="fr-FR" sz="2300" b="0" i="1" smtClean="0">
+                            <a:latin typeface="Cambria Math" panose="02040503050406030204" pitchFamily="18" charset="0"/>
+                          </a:rPr>
+                          <m:t>𝑧</m:t>
+                        </m:r>
+                      </m:e>
+                      <m:sub>
+                        <m:r>
+                          <a:rPr lang="fr-FR" altLang="fr-FR" sz="2300" b="0" i="1" smtClean="0">
+                            <a:latin typeface="Cambria Math" panose="02040503050406030204" pitchFamily="18" charset="0"/>
+                          </a:rPr>
+                          <m:t>𝑖</m:t>
+                        </m:r>
+                      </m:sub>
+                    </m:sSub>
+                    <m:r>
+                      <a:rPr lang="fr-FR" altLang="fr-FR" sz="2300" b="0" i="1" smtClean="0">
+                        <a:latin typeface="Cambria Math" panose="02040503050406030204" pitchFamily="18" charset="0"/>
+                      </a:rPr>
+                      <m:t>=</m:t>
+                    </m:r>
+                    <m:sSub>
+                      <m:sSubPr>
+                        <m:ctrlPr>
+                          <a:rPr lang="fr-FR" altLang="fr-FR" sz="2300" b="0" i="1" smtClean="0">
+                            <a:latin typeface="Cambria Math" panose="02040503050406030204" pitchFamily="18" charset="0"/>
+                          </a:rPr>
+                        </m:ctrlPr>
+                      </m:sSubPr>
+                      <m:e>
+                        <m:r>
+                          <a:rPr lang="fr-FR" altLang="fr-FR" sz="2300" b="0" i="1" smtClean="0">
+                            <a:latin typeface="Cambria Math" panose="02040503050406030204" pitchFamily="18" charset="0"/>
+                          </a:rPr>
+                          <m:t>h</m:t>
+                        </m:r>
+                      </m:e>
+                      <m:sub>
+                        <m:r>
+                          <a:rPr lang="fr-FR" altLang="fr-FR" sz="2300" b="0" i="1" smtClean="0">
+                            <a:latin typeface="Cambria Math" panose="02040503050406030204" pitchFamily="18" charset="0"/>
+                          </a:rPr>
+                          <m:t>𝑖</m:t>
+                        </m:r>
+                      </m:sub>
+                    </m:sSub>
+                  </m:oMath>
+                </a14:m>
+                <a:endParaRPr lang="fr-FR" altLang="fr-FR" sz="2300" dirty="0"/>
+              </a:p>
+              <a:p>
+                <a:pPr indent="-327025">
+                  <a:buClrTx/>
+                  <a:buFontTx/>
+                  <a:buNone/>
+                  <a:tabLst>
+                    <a:tab pos="342900" algn="l"/>
+                    <a:tab pos="447675" algn="l"/>
+                    <a:tab pos="896938" algn="l"/>
+                    <a:tab pos="1346200" algn="l"/>
+                    <a:tab pos="1795463" algn="l"/>
+                    <a:tab pos="2244725" algn="l"/>
+                    <a:tab pos="2693988" algn="l"/>
+                    <a:tab pos="3143250" algn="l"/>
+                    <a:tab pos="3592513" algn="l"/>
+                    <a:tab pos="4041775" algn="l"/>
+                    <a:tab pos="4491038" algn="l"/>
+                    <a:tab pos="4940300" algn="l"/>
+                    <a:tab pos="5389563" algn="l"/>
+                    <a:tab pos="5838825" algn="l"/>
+                    <a:tab pos="6288088" algn="l"/>
+                    <a:tab pos="6737350" algn="l"/>
+                    <a:tab pos="7186613" algn="l"/>
+                    <a:tab pos="7635875" algn="l"/>
+                    <a:tab pos="8085138" algn="l"/>
+                    <a:tab pos="8534400" algn="l"/>
+                    <a:tab pos="8983663" algn="l"/>
+                  </a:tabLst>
+                </a:pPr>
+                <a:r>
+                  <a:rPr lang="fr-FR" altLang="fr-FR" sz="2300" dirty="0"/>
+                  <a:t>Check </a:t>
+                </a:r>
+                <a:r>
+                  <a:rPr lang="fr-FR" altLang="fr-FR" sz="2300" dirty="0" err="1"/>
+                  <a:t>that</a:t>
+                </a:r>
+                <a:r>
+                  <a:rPr lang="fr-FR" altLang="fr-FR" sz="2300" dirty="0"/>
+                  <a:t> </a:t>
+                </a:r>
+                <a:r>
+                  <a:rPr lang="fr-FR" altLang="fr-FR" sz="2300" dirty="0" err="1"/>
+                  <a:t>indeed</a:t>
+                </a:r>
+                <a:r>
+                  <a:rPr lang="fr-FR" altLang="fr-FR" sz="2300" dirty="0"/>
+                  <a:t> </a:t>
+                </a:r>
+                <a14:m>
+                  <m:oMath xmlns:m="http://schemas.openxmlformats.org/officeDocument/2006/math">
+                    <m:sSub>
+                      <m:sSubPr>
+                        <m:ctrlPr>
+                          <a:rPr lang="fr-FR" altLang="fr-FR" sz="2300" b="0" i="1" smtClean="0">
+                            <a:latin typeface="Cambria Math" panose="02040503050406030204" pitchFamily="18" charset="0"/>
+                          </a:rPr>
+                        </m:ctrlPr>
+                      </m:sSubPr>
+                      <m:e>
+                        <m:r>
+                          <a:rPr lang="fr-FR" altLang="fr-FR" sz="2300" b="0" i="1" smtClean="0">
+                            <a:latin typeface="Cambria Math" panose="02040503050406030204" pitchFamily="18" charset="0"/>
+                          </a:rPr>
+                          <m:t>𝑧</m:t>
+                        </m:r>
+                      </m:e>
+                      <m:sub>
+                        <m:r>
+                          <a:rPr lang="fr-FR" altLang="fr-FR" sz="2300" b="0" i="1" smtClean="0">
+                            <a:latin typeface="Cambria Math" panose="02040503050406030204" pitchFamily="18" charset="0"/>
+                          </a:rPr>
+                          <m:t>𝑖</m:t>
+                        </m:r>
+                      </m:sub>
+                    </m:sSub>
+                    <m:r>
+                      <a:rPr lang="fr-FR" altLang="fr-FR" sz="2300" b="0" i="1" smtClean="0">
+                        <a:latin typeface="Cambria Math" panose="02040503050406030204" pitchFamily="18" charset="0"/>
+                      </a:rPr>
+                      <m:t>−</m:t>
+                    </m:r>
+                    <m:sSub>
+                      <m:sSubPr>
+                        <m:ctrlPr>
+                          <a:rPr lang="fr-FR" altLang="fr-FR" sz="2300" b="0" i="1" smtClean="0">
+                            <a:latin typeface="Cambria Math" panose="02040503050406030204" pitchFamily="18" charset="0"/>
+                          </a:rPr>
+                        </m:ctrlPr>
+                      </m:sSubPr>
+                      <m:e>
+                        <m:r>
+                          <a:rPr lang="fr-FR" altLang="fr-FR" sz="2300" b="0" i="1" smtClean="0">
+                            <a:latin typeface="Cambria Math" panose="02040503050406030204" pitchFamily="18" charset="0"/>
+                          </a:rPr>
+                          <m:t>h</m:t>
+                        </m:r>
+                      </m:e>
+                      <m:sub>
+                        <m:r>
+                          <a:rPr lang="fr-FR" altLang="fr-FR" sz="2300" b="0" i="1" smtClean="0">
+                            <a:latin typeface="Cambria Math" panose="02040503050406030204" pitchFamily="18" charset="0"/>
+                          </a:rPr>
+                          <m:t>𝑖</m:t>
+                        </m:r>
+                      </m:sub>
+                    </m:sSub>
+                    <m:r>
+                      <a:rPr lang="fr-FR" altLang="fr-FR" sz="2300" b="0" i="1" smtClean="0">
+                        <a:latin typeface="Cambria Math" panose="02040503050406030204" pitchFamily="18" charset="0"/>
+                      </a:rPr>
+                      <m:t>=0</m:t>
+                    </m:r>
+                  </m:oMath>
+                </a14:m>
+                <a:endParaRPr lang="fr-FR" altLang="fr-FR" sz="2300" dirty="0"/>
+              </a:p>
+              <a:p>
+                <a:pPr indent="-327025">
+                  <a:buClrTx/>
+                  <a:buFontTx/>
+                  <a:buNone/>
+                  <a:tabLst>
+                    <a:tab pos="342900" algn="l"/>
+                    <a:tab pos="447675" algn="l"/>
+                    <a:tab pos="896938" algn="l"/>
+                    <a:tab pos="1346200" algn="l"/>
+                    <a:tab pos="1795463" algn="l"/>
+                    <a:tab pos="2244725" algn="l"/>
+                    <a:tab pos="2693988" algn="l"/>
+                    <a:tab pos="3143250" algn="l"/>
+                    <a:tab pos="3592513" algn="l"/>
+                    <a:tab pos="4041775" algn="l"/>
+                    <a:tab pos="4491038" algn="l"/>
+                    <a:tab pos="4940300" algn="l"/>
+                    <a:tab pos="5389563" algn="l"/>
+                    <a:tab pos="5838825" algn="l"/>
+                    <a:tab pos="6288088" algn="l"/>
+                    <a:tab pos="6737350" algn="l"/>
+                    <a:tab pos="7186613" algn="l"/>
+                    <a:tab pos="7635875" algn="l"/>
+                    <a:tab pos="8085138" algn="l"/>
+                    <a:tab pos="8534400" algn="l"/>
+                    <a:tab pos="8983663" algn="l"/>
+                  </a:tabLst>
+                </a:pPr>
+                <a:endParaRPr lang="fr-FR" altLang="fr-FR" sz="2300" dirty="0"/>
+              </a:p>
+              <a:p>
+                <a:endParaRPr lang="fr-FR" sz="2300" dirty="0"/>
+              </a:p>
+            </p:txBody>
+          </p:sp>
+        </mc:Choice>
+        <mc:Fallback>
+          <p:sp>
+            <p:nvSpPr>
+              <p:cNvPr id="3" name="Espace réservé du contenu 2">
+                <a:extLst>
+                  <a:ext uri="{FF2B5EF4-FFF2-40B4-BE49-F238E27FC236}">
+                    <a16:creationId xmlns:a16="http://schemas.microsoft.com/office/drawing/2014/main" id="{6E4A7A47-E795-43FE-9594-A27D5322C498}"/>
+                  </a:ext>
+                </a:extLst>
+              </p:cNvPr>
+              <p:cNvSpPr>
+                <a:spLocks noGrp="1" noRot="1" noChangeAspect="1" noMove="1" noResize="1" noEditPoints="1" noAdjustHandles="1" noChangeArrowheads="1" noChangeShapeType="1" noTextEdit="1"/>
+              </p:cNvSpPr>
+              <p:nvPr>
+                <p:ph idx="1"/>
+              </p:nvPr>
+            </p:nvSpPr>
+            <p:spPr>
+              <a:xfrm>
+                <a:off x="374472" y="2869401"/>
+                <a:ext cx="11007526" cy="4094107"/>
+              </a:xfrm>
+              <a:blipFill>
+                <a:blip r:embed="rId2"/>
+                <a:stretch>
+                  <a:fillRect/>
+                </a:stretch>
+              </a:blipFill>
+            </p:spPr>
+            <p:txBody>
+              <a:bodyPr/>
+              <a:lstStyle/>
+              <a:p>
+                <a:r>
+                  <a:rPr lang="fr-FR">
+                    <a:noFill/>
+                  </a:rPr>
+                  <a:t> </a:t>
+                </a:r>
+              </a:p>
+            </p:txBody>
+          </p:sp>
+        </mc:Fallback>
+      </mc:AlternateContent>
+      <mc:AlternateContent xmlns:mc="http://schemas.openxmlformats.org/markup-compatibility/2006">
+        <mc:Choice xmlns:a14="http://schemas.microsoft.com/office/drawing/2010/main" Requires="a14">
+          <p:sp>
+            <p:nvSpPr>
+              <p:cNvPr id="5" name="ZoneTexte 4">
+                <a:extLst>
+                  <a:ext uri="{FF2B5EF4-FFF2-40B4-BE49-F238E27FC236}">
+                    <a16:creationId xmlns:a16="http://schemas.microsoft.com/office/drawing/2014/main" id="{B0515090-E883-4053-84DF-D00C81219095}"/>
+                  </a:ext>
+                </a:extLst>
+              </p:cNvPr>
+              <p:cNvSpPr txBox="1"/>
+              <p:nvPr/>
+            </p:nvSpPr>
+            <p:spPr>
+              <a:xfrm>
+                <a:off x="3352800" y="3956280"/>
+                <a:ext cx="1386918" cy="369332"/>
+              </a:xfrm>
+              <a:prstGeom prst="rect">
+                <a:avLst/>
+              </a:prstGeom>
+              <a:noFill/>
+            </p:spPr>
+            <p:txBody>
+              <a:bodyPr wrap="none" lIns="0" tIns="0" rIns="0" bIns="0" rtlCol="0">
+                <a:spAutoFit/>
+              </a:bodyPr>
+              <a:lstStyle/>
+              <a:p>
+                <a14:m>
+                  <m:oMathPara xmlns:m="http://schemas.openxmlformats.org/officeDocument/2006/math">
+                    <m:oMathParaPr>
+                      <m:jc m:val="centerGroup"/>
+                    </m:oMathParaPr>
+                    <m:oMath xmlns:m="http://schemas.openxmlformats.org/officeDocument/2006/math">
+                      <m:r>
+                        <a:rPr lang="fr-FR" sz="2400" b="0" i="1" smtClean="0">
+                          <a:latin typeface="Cambria Math" panose="02040503050406030204" pitchFamily="18" charset="0"/>
+                        </a:rPr>
+                        <m:t>𝑓</m:t>
+                      </m:r>
+                      <m:r>
+                        <a:rPr lang="fr-FR" sz="2400" b="0" i="1" smtClean="0">
+                          <a:latin typeface="Cambria Math" panose="02040503050406030204" pitchFamily="18" charset="0"/>
+                        </a:rPr>
+                        <m:t> ∗</m:t>
+                      </m:r>
+                      <m:r>
+                        <a:rPr lang="fr-FR" sz="2400" b="0" i="1" smtClean="0">
+                          <a:latin typeface="Cambria Math" panose="02040503050406030204" pitchFamily="18" charset="0"/>
+                        </a:rPr>
+                        <m:t>𝑔</m:t>
+                      </m:r>
+                      <m:r>
+                        <a:rPr lang="fr-FR" sz="2400" b="0" i="1" smtClean="0">
+                          <a:latin typeface="Cambria Math" panose="02040503050406030204" pitchFamily="18" charset="0"/>
+                        </a:rPr>
+                        <m:t>=</m:t>
+                      </m:r>
+                      <m:r>
+                        <a:rPr lang="fr-FR" sz="2400" b="0" i="1" smtClean="0">
+                          <a:latin typeface="Cambria Math" panose="02040503050406030204" pitchFamily="18" charset="0"/>
+                        </a:rPr>
+                        <m:t>h</m:t>
+                      </m:r>
+                    </m:oMath>
+                  </m:oMathPara>
+                </a14:m>
+                <a:endParaRPr lang="fr-FR" sz="2400" b="0" dirty="0"/>
+              </a:p>
+            </p:txBody>
+          </p:sp>
+        </mc:Choice>
+        <mc:Fallback>
+          <p:sp>
+            <p:nvSpPr>
+              <p:cNvPr id="5" name="ZoneTexte 4">
+                <a:extLst>
+                  <a:ext uri="{FF2B5EF4-FFF2-40B4-BE49-F238E27FC236}">
+                    <a16:creationId xmlns:a16="http://schemas.microsoft.com/office/drawing/2014/main" id="{B0515090-E883-4053-84DF-D00C81219095}"/>
+                  </a:ext>
+                </a:extLst>
+              </p:cNvPr>
+              <p:cNvSpPr txBox="1">
+                <a:spLocks noRot="1" noChangeAspect="1" noMove="1" noResize="1" noEditPoints="1" noAdjustHandles="1" noChangeArrowheads="1" noChangeShapeType="1" noTextEdit="1"/>
+              </p:cNvSpPr>
+              <p:nvPr/>
+            </p:nvSpPr>
+            <p:spPr>
+              <a:xfrm>
+                <a:off x="3352800" y="3956280"/>
+                <a:ext cx="1386918" cy="369332"/>
+              </a:xfrm>
+              <a:prstGeom prst="rect">
+                <a:avLst/>
+              </a:prstGeom>
+              <a:blipFill>
+                <a:blip r:embed="rId3"/>
+                <a:stretch>
+                  <a:fillRect l="-6579" r="-3947" b="-36066"/>
+                </a:stretch>
+              </a:blipFill>
+            </p:spPr>
+            <p:txBody>
+              <a:bodyPr/>
+              <a:lstStyle/>
+              <a:p>
+                <a:r>
+                  <a:rPr lang="fr-FR">
+                    <a:noFill/>
+                  </a:rPr>
+                  <a:t> </a:t>
+                </a:r>
+              </a:p>
+            </p:txBody>
+          </p:sp>
+        </mc:Fallback>
+      </mc:AlternateContent>
+      <p:sp>
+        <p:nvSpPr>
+          <p:cNvPr id="6" name="Espace réservé du numéro de diapositive 5">
+            <a:extLst>
+              <a:ext uri="{FF2B5EF4-FFF2-40B4-BE49-F238E27FC236}">
+                <a16:creationId xmlns:a16="http://schemas.microsoft.com/office/drawing/2014/main" id="{138D5151-BC82-4F14-9F76-5098ACBEB4D0}"/>
+              </a:ext>
+            </a:extLst>
+          </p:cNvPr>
+          <p:cNvSpPr>
+            <a:spLocks noGrp="1"/>
+          </p:cNvSpPr>
+          <p:nvPr>
+            <p:ph type="sldNum" sz="quarter" idx="12"/>
+          </p:nvPr>
+        </p:nvSpPr>
+        <p:spPr/>
+        <p:txBody>
+          <a:bodyPr/>
+          <a:lstStyle/>
+          <a:p>
+            <a:fld id="{D57F1E4F-1CFF-5643-939E-217C01CDF565}" type="slidenum">
+              <a:rPr lang="en-US" smtClean="0"/>
+              <a:pPr/>
+              <a:t>9</a:t>
+            </a:fld>
+            <a:endParaRPr lang="en-US"/>
+          </a:p>
+        </p:txBody>
+      </p:sp>
+    </p:spTree>
+    <p:extLst>
+      <p:ext uri="{BB962C8B-B14F-4D97-AF65-F5344CB8AC3E}">
+        <p14:creationId xmlns:p14="http://schemas.microsoft.com/office/powerpoint/2010/main" val="2635400282"/>
       </p:ext>
     </p:extLst>
   </p:cSld>

</xml_diff>

<commit_message>
last modif of pptx
</commit_message>
<xml_diff>
--- a/doc/Présentation.pptx
+++ b/doc/Présentation.pptx
@@ -209,7 +209,7 @@
           <a:p>
             <a:fld id="{257196CA-1AA5-48F7-AC5A-81C2542B9768}" type="datetimeFigureOut">
               <a:rPr lang="fr-FR" smtClean="0"/>
-              <a:t>26/11/2017</a:t>
+              <a:t>27/11/2017</a:t>
             </a:fld>
             <a:endParaRPr lang="fr-FR"/>
           </a:p>
@@ -739,7 +739,7 @@
           <a:effectLst/>
           <a:extLst>
             <a:ext uri="{91240B29-F687-4f45-9708-019B960494DF}">
-              <a14:hiddenLine xmlns:a14="http://schemas.microsoft.com/office/drawing/2010/main" xmlns="" w="9525">
+              <a14:hiddenLine xmlns="" xmlns:a14="http://schemas.microsoft.com/office/drawing/2010/main" w="9525">
                 <a:solidFill>
                   <a:srgbClr val="000000"/>
                 </a:solidFill>
@@ -2239,7 +2239,7 @@
           <a:ln/>
           <a:extLst>
             <a:ext uri="{91240B29-F687-4f45-9708-019B960494DF}">
-              <a14:hiddenLine xmlns:a14="http://schemas.microsoft.com/office/drawing/2010/main" xmlns="" w="9525">
+              <a14:hiddenLine xmlns="" xmlns:a14="http://schemas.microsoft.com/office/drawing/2010/main" w="9525">
                 <a:solidFill>
                   <a:srgbClr val="000000"/>
                 </a:solidFill>
@@ -2508,7 +2508,7 @@
           <a:ln/>
           <a:extLst>
             <a:ext uri="{91240B29-F687-4f45-9708-019B960494DF}">
-              <a14:hiddenLine xmlns:a14="http://schemas.microsoft.com/office/drawing/2010/main" xmlns="" w="9525">
+              <a14:hiddenLine xmlns="" xmlns:a14="http://schemas.microsoft.com/office/drawing/2010/main" w="9525">
                 <a:solidFill>
                   <a:srgbClr val="000000"/>
                 </a:solidFill>
@@ -2785,7 +2785,7 @@
           <a:ln/>
           <a:extLst>
             <a:ext uri="{91240B29-F687-4f45-9708-019B960494DF}">
-              <a14:hiddenLine xmlns:a14="http://schemas.microsoft.com/office/drawing/2010/main" xmlns="" w="9525">
+              <a14:hiddenLine xmlns="" xmlns:a14="http://schemas.microsoft.com/office/drawing/2010/main" w="9525">
                 <a:solidFill>
                   <a:srgbClr val="000000"/>
                 </a:solidFill>
@@ -3400,7 +3400,7 @@
           <a:ln/>
           <a:extLst>
             <a:ext uri="{91240B29-F687-4f45-9708-019B960494DF}">
-              <a14:hiddenLine xmlns:a14="http://schemas.microsoft.com/office/drawing/2010/main" xmlns="" w="9525">
+              <a14:hiddenLine xmlns="" xmlns:a14="http://schemas.microsoft.com/office/drawing/2010/main" w="9525">
                 <a:solidFill>
                   <a:srgbClr val="000000"/>
                 </a:solidFill>
@@ -3732,7 +3732,7 @@
           <a:ln/>
           <a:extLst>
             <a:ext uri="{91240B29-F687-4f45-9708-019B960494DF}">
-              <a14:hiddenLine xmlns:a14="http://schemas.microsoft.com/office/drawing/2010/main" xmlns="" w="9525">
+              <a14:hiddenLine xmlns="" xmlns:a14="http://schemas.microsoft.com/office/drawing/2010/main" w="9525">
                 <a:solidFill>
                   <a:srgbClr val="000000"/>
                 </a:solidFill>
@@ -4202,7 +4202,7 @@
           <a:ln/>
           <a:extLst>
             <a:ext uri="{91240B29-F687-4f45-9708-019B960494DF}">
-              <a14:hiddenLine xmlns:a14="http://schemas.microsoft.com/office/drawing/2010/main" xmlns="" w="9525">
+              <a14:hiddenLine xmlns="" xmlns:a14="http://schemas.microsoft.com/office/drawing/2010/main" w="9525">
                 <a:solidFill>
                   <a:srgbClr val="000000"/>
                 </a:solidFill>
@@ -4622,7 +4622,7 @@
           <a:ln/>
           <a:extLst>
             <a:ext uri="{91240B29-F687-4f45-9708-019B960494DF}">
-              <a14:hiddenLine xmlns:a14="http://schemas.microsoft.com/office/drawing/2010/main" xmlns="" w="9525">
+              <a14:hiddenLine xmlns="" xmlns:a14="http://schemas.microsoft.com/office/drawing/2010/main" w="9525">
                 <a:solidFill>
                   <a:srgbClr val="000000"/>
                 </a:solidFill>
@@ -6028,94 +6028,99 @@
           <a:lstStyle/>
           <a:p>
             <a:r>
-              <a:rPr lang="fr-FR" sz="2600"/>
+              <a:rPr lang="fr-FR" sz="2600" dirty="0"/>
               <a:t>Analyse </a:t>
             </a:r>
             <a:r>
-              <a:rPr lang="fr-FR" sz="2600" err="1"/>
+              <a:rPr lang="fr-FR" sz="2600" dirty="0" err="1"/>
               <a:t>Decentralized</a:t>
             </a:r>
             <a:r>
-              <a:rPr lang="fr-FR" sz="2600"/>
+              <a:rPr lang="fr-FR" sz="2600" dirty="0"/>
               <a:t> </a:t>
             </a:r>
             <a:r>
-              <a:rPr lang="fr-FR" sz="2600" err="1"/>
+              <a:rPr lang="fr-FR" sz="2600" dirty="0" err="1"/>
               <a:t>Privacy-preserving</a:t>
             </a:r>
             <a:r>
-              <a:rPr lang="fr-FR" sz="2600"/>
+              <a:rPr lang="fr-FR" sz="2600" dirty="0"/>
               <a:t> data sharing system</a:t>
             </a:r>
-            <a:endParaRPr lang="fr-FR"/>
+            <a:endParaRPr lang="fr-FR" dirty="0"/>
           </a:p>
           <a:p>
             <a:pPr>
               <a:buFont typeface="Wingdings 2"/>
             </a:pPr>
             <a:r>
-              <a:rPr lang="fr-FR" sz="2600" err="1"/>
+              <a:rPr lang="fr-FR" sz="2600" dirty="0" err="1"/>
               <a:t>Unlynx</a:t>
             </a:r>
             <a:r>
-              <a:rPr lang="fr-FR" sz="2600"/>
+              <a:rPr lang="fr-FR" sz="2600" dirty="0"/>
               <a:t> </a:t>
             </a:r>
             <a:r>
-              <a:rPr lang="fr-FR" sz="2000"/>
+              <a:rPr lang="fr-FR" sz="2000" dirty="0"/>
               <a:t>[1]</a:t>
             </a:r>
             <a:r>
-              <a:rPr lang="fr-FR" sz="2600"/>
+              <a:rPr lang="fr-FR" sz="2600" dirty="0"/>
               <a:t> </a:t>
             </a:r>
             <a:r>
-              <a:rPr lang="fr-FR" sz="2600" err="1"/>
+              <a:rPr lang="fr-FR" sz="2600" dirty="0" err="1"/>
               <a:t>with</a:t>
             </a:r>
             <a:r>
-              <a:rPr lang="fr-FR" sz="2600"/>
+              <a:rPr lang="fr-FR" sz="2600" dirty="0"/>
               <a:t> </a:t>
             </a:r>
             <a:r>
-              <a:rPr lang="fr-FR" sz="2600" err="1"/>
+              <a:rPr lang="fr-FR" sz="2600" dirty="0" err="1"/>
               <a:t>Homomorphic</a:t>
             </a:r>
             <a:r>
-              <a:rPr lang="fr-FR" sz="2600"/>
+              <a:rPr lang="fr-FR" sz="2600" dirty="0"/>
               <a:t> </a:t>
             </a:r>
             <a:r>
-              <a:rPr lang="fr-FR" sz="2600" err="1"/>
+              <a:rPr lang="fr-FR" sz="2600" dirty="0" err="1"/>
               <a:t>Encryption</a:t>
             </a:r>
+            <a:endParaRPr lang="fr-FR" sz="2600" dirty="0"/>
           </a:p>
           <a:p>
             <a:pPr>
               <a:buFont typeface="Wingdings 2"/>
             </a:pPr>
             <a:r>
-              <a:rPr lang="fr-FR" sz="2600"/>
-              <a:t>Prio </a:t>
-            </a:r>
-            <a:r>
-              <a:rPr lang="fr-FR" sz="2000"/>
+              <a:rPr lang="fr-FR" sz="2600" dirty="0" err="1"/>
+              <a:t>Prio</a:t>
+            </a:r>
+            <a:r>
+              <a:rPr lang="fr-FR" sz="2600" dirty="0"/>
+              <a:t> </a:t>
+            </a:r>
+            <a:r>
+              <a:rPr lang="fr-FR" sz="2000" dirty="0"/>
               <a:t>[2] </a:t>
             </a:r>
             <a:r>
-              <a:rPr lang="fr-FR" sz="2600" err="1"/>
+              <a:rPr lang="fr-FR" sz="2600" dirty="0" err="1"/>
               <a:t>using</a:t>
             </a:r>
             <a:r>
-              <a:rPr lang="fr-FR" sz="2600"/>
+              <a:rPr lang="fr-FR" sz="2600" dirty="0"/>
               <a:t> Secret Sharing Scheme and </a:t>
             </a:r>
             <a:r>
-              <a:rPr lang="fr-FR" sz="2600" err="1"/>
+              <a:rPr lang="fr-FR" sz="2600" dirty="0" err="1"/>
               <a:t>Multiparty</a:t>
             </a:r>
             <a:r>
-              <a:rPr lang="fr-FR" sz="2600"/>
+              <a:rPr lang="fr-FR" sz="2600" dirty="0"/>
               <a:t> Computation (MPC)</a:t>
             </a:r>
           </a:p>
@@ -6124,63 +6129,71 @@
               <a:buFont typeface="Wingdings 2"/>
             </a:pPr>
             <a:r>
-              <a:rPr lang="fr-FR" sz="2600"/>
+              <a:rPr lang="fr-FR" sz="2600" dirty="0"/>
               <a:t>Compare and </a:t>
             </a:r>
             <a:r>
-              <a:rPr lang="fr-FR" sz="2600" err="1"/>
+              <a:rPr lang="fr-FR" sz="2600" dirty="0" err="1"/>
               <a:t>evaluate</a:t>
             </a:r>
             <a:r>
-              <a:rPr lang="fr-FR" sz="2600"/>
+              <a:rPr lang="fr-FR" sz="2600" dirty="0"/>
               <a:t> </a:t>
             </a:r>
             <a:r>
-              <a:rPr lang="fr-FR" sz="2600" err="1"/>
+              <a:rPr lang="fr-FR" sz="2600" dirty="0" err="1"/>
               <a:t>what</a:t>
             </a:r>
             <a:r>
-              <a:rPr lang="fr-FR" sz="2600"/>
+              <a:rPr lang="fr-FR" sz="2600" dirty="0"/>
               <a:t> </a:t>
             </a:r>
             <a:r>
-              <a:rPr lang="fr-FR" sz="2600" err="1"/>
+              <a:rPr lang="fr-FR" sz="2600" dirty="0" err="1"/>
               <a:t>is</a:t>
             </a:r>
             <a:r>
-              <a:rPr lang="fr-FR" sz="2600"/>
+              <a:rPr lang="fr-FR" sz="2600" dirty="0"/>
               <a:t> the main </a:t>
             </a:r>
             <a:r>
-              <a:rPr lang="fr-FR" sz="2600" err="1"/>
+              <a:rPr lang="fr-FR" sz="2600" dirty="0" err="1"/>
               <a:t>difference</a:t>
             </a:r>
             <a:r>
-              <a:rPr lang="fr-FR" sz="2600"/>
+              <a:rPr lang="fr-FR" sz="2600" dirty="0"/>
               <a:t> and </a:t>
             </a:r>
             <a:r>
-              <a:rPr lang="fr-FR" sz="2600" err="1"/>
+              <a:rPr lang="fr-FR" sz="2600" dirty="0" err="1"/>
               <a:t>which</a:t>
             </a:r>
             <a:r>
-              <a:rPr lang="fr-FR" sz="2600"/>
+              <a:rPr lang="fr-FR" sz="2600" dirty="0"/>
               <a:t> </a:t>
             </a:r>
             <a:r>
-              <a:rPr lang="fr-FR" sz="2600" err="1"/>
+              <a:rPr lang="fr-FR" sz="2600" dirty="0" err="1"/>
+              <a:t>protocol</a:t>
+            </a:r>
+            <a:r>
+              <a:rPr lang="fr-FR" sz="2600" dirty="0"/>
+              <a:t> </a:t>
+            </a:r>
+            <a:r>
+              <a:rPr lang="fr-FR" sz="2600" dirty="0" err="1"/>
               <a:t>is</a:t>
             </a:r>
             <a:r>
-              <a:rPr lang="fr-FR" sz="2600"/>
+              <a:rPr lang="fr-FR" sz="2600" dirty="0"/>
               <a:t> </a:t>
             </a:r>
             <a:r>
-              <a:rPr lang="fr-FR" sz="2600" err="1"/>
+              <a:rPr lang="fr-FR" sz="2600" dirty="0" err="1"/>
               <a:t>most</a:t>
             </a:r>
             <a:r>
-              <a:rPr lang="fr-FR" sz="2600"/>
+              <a:rPr lang="fr-FR" sz="2600" dirty="0"/>
               <a:t> efficient/scalable ?</a:t>
             </a:r>
           </a:p>
@@ -6189,23 +6202,23 @@
               <a:buFont typeface="Wingdings 2"/>
             </a:pPr>
             <a:r>
-              <a:rPr lang="fr-FR" sz="2600"/>
+              <a:rPr lang="fr-FR" sz="2600" dirty="0"/>
               <a:t>Design a solution </a:t>
             </a:r>
             <a:r>
-              <a:rPr lang="fr-FR" sz="2600" err="1"/>
+              <a:rPr lang="fr-FR" sz="2600" dirty="0" err="1"/>
               <a:t>that</a:t>
             </a:r>
             <a:r>
-              <a:rPr lang="fr-FR" sz="2600"/>
-              <a:t> combine </a:t>
-            </a:r>
-            <a:r>
-              <a:rPr lang="fr-FR" sz="2600" err="1"/>
+              <a:rPr lang="fr-FR" sz="2600" dirty="0"/>
+              <a:t> combines </a:t>
+            </a:r>
+            <a:r>
+              <a:rPr lang="fr-FR" sz="2600" dirty="0" err="1"/>
               <a:t>both</a:t>
             </a:r>
             <a:r>
-              <a:rPr lang="fr-FR" sz="2600"/>
+              <a:rPr lang="fr-FR" sz="2600" dirty="0"/>
               <a:t> of the solutions</a:t>
             </a:r>
           </a:p>
@@ -6479,11 +6492,11 @@
             </a:r>
             <a:r>
               <a:rPr lang="fr-FR" sz="2200" dirty="0"/>
-              <a:t> of servers), </a:t>
+              <a:t> of servers), </a:t>
             </a:r>
             <a:r>
               <a:rPr lang="fr-FR" sz="2200" dirty="0" err="1"/>
-              <a:t>awnser</a:t>
+              <a:t>answer</a:t>
             </a:r>
             <a:r>
               <a:rPr lang="fr-FR" sz="2200" dirty="0"/>
@@ -6573,6 +6586,14 @@
             </a:r>
             <a:r>
               <a:rPr lang="fr-FR" sz="2600" dirty="0"/>
+              <a:t> &amp; </a:t>
+            </a:r>
+            <a:r>
+              <a:rPr lang="fr-FR" sz="2600" dirty="0" err="1"/>
+              <a:t>Correctness</a:t>
+            </a:r>
+            <a:r>
+              <a:rPr lang="fr-FR" sz="2600" dirty="0"/>
               <a:t>:</a:t>
             </a:r>
             <a:endParaRPr lang="fr-FR" dirty="0"/>
@@ -6582,26 +6603,26 @@
               <a:buFont typeface="Wingdings 2"/>
             </a:pPr>
             <a:r>
-              <a:rPr lang="fr-FR" sz="2400" dirty="0" err="1"/>
+              <a:rPr lang="fr-FR" sz="2200" dirty="0" err="1"/>
               <a:t>Assured</a:t>
             </a:r>
             <a:r>
-              <a:rPr lang="fr-FR" sz="2400" dirty="0"/>
+              <a:rPr lang="fr-FR" sz="2200" dirty="0"/>
               <a:t> if at least one server </a:t>
             </a:r>
             <a:r>
-              <a:rPr lang="fr-FR" sz="2400" dirty="0" err="1"/>
+              <a:rPr lang="fr-FR" sz="2200" dirty="0" err="1"/>
               <a:t>is</a:t>
             </a:r>
             <a:r>
-              <a:rPr lang="fr-FR" sz="2400" dirty="0"/>
+              <a:rPr lang="fr-FR" sz="2200" dirty="0"/>
               <a:t> </a:t>
             </a:r>
             <a:r>
-              <a:rPr lang="fr-FR" sz="2400" dirty="0" err="1"/>
+              <a:rPr lang="fr-FR" sz="2200" dirty="0" err="1"/>
               <a:t>trusted</a:t>
             </a:r>
-            <a:endParaRPr lang="fr-FR" sz="2400" dirty="0"/>
+            <a:endParaRPr lang="fr-FR" sz="2200" dirty="0"/>
           </a:p>
           <a:p>
             <a:pPr>
@@ -6621,15 +6642,15 @@
               <a:buFont typeface="Wingdings 2"/>
             </a:pPr>
             <a:r>
-              <a:rPr lang="fr-FR" sz="2400" dirty="0"/>
+              <a:rPr lang="fr-FR" sz="2200" dirty="0"/>
               <a:t>Proof of </a:t>
             </a:r>
             <a:r>
-              <a:rPr lang="fr-FR" sz="2400" dirty="0" err="1"/>
+              <a:rPr lang="fr-FR" sz="2200" dirty="0" err="1"/>
               <a:t>correctness</a:t>
             </a:r>
             <a:r>
-              <a:rPr lang="fr-FR" sz="2400" dirty="0"/>
+              <a:rPr lang="fr-FR" sz="2200" dirty="0"/>
               <a:t> </a:t>
             </a:r>
           </a:p>
@@ -6638,7 +6659,7 @@
               <a:buFont typeface="Wingdings 2"/>
             </a:pPr>
             <a:r>
-              <a:rPr lang="fr-FR" sz="2400" dirty="0"/>
+              <a:rPr lang="fr-FR" sz="2200" dirty="0"/>
               <a:t>No proof for input validation</a:t>
             </a:r>
           </a:p>
@@ -6846,8 +6867,8 @@
         </p:nvSpPr>
         <p:spPr>
           <a:xfrm>
-            <a:off x="714375" y="2362200"/>
-            <a:ext cx="10554574" cy="3636511"/>
+            <a:off x="440787" y="2518117"/>
+            <a:ext cx="11310423" cy="3255511"/>
           </a:xfrm>
         </p:spPr>
         <p:txBody>
@@ -7019,6 +7040,14 @@
             </a:r>
             <a:r>
               <a:rPr lang="fr-FR" sz="2600" dirty="0"/>
+              <a:t> &amp; </a:t>
+            </a:r>
+            <a:r>
+              <a:rPr lang="fr-FR" sz="2600" dirty="0" err="1"/>
+              <a:t>Correctness</a:t>
+            </a:r>
+            <a:r>
+              <a:rPr lang="fr-FR" sz="2600" dirty="0"/>
               <a:t>:</a:t>
             </a:r>
             <a:endParaRPr lang="fr-FR" dirty="0"/>
@@ -7028,38 +7057,70 @@
               <a:buFont typeface="Wingdings 2"/>
             </a:pPr>
             <a:r>
-              <a:rPr lang="fr-FR" sz="2400" dirty="0"/>
+              <a:rPr lang="fr-FR" sz="2200" dirty="0"/>
               <a:t>As </a:t>
             </a:r>
             <a:r>
-              <a:rPr lang="fr-FR" sz="2400" dirty="0" err="1"/>
+              <a:rPr lang="fr-FR" sz="2200" dirty="0" err="1"/>
               <a:t>Unlynx</a:t>
             </a:r>
             <a:r>
-              <a:rPr lang="fr-FR" sz="2400" dirty="0"/>
+              <a:rPr lang="fr-FR" sz="2200" dirty="0"/>
               <a:t>, </a:t>
             </a:r>
             <a:r>
-              <a:rPr lang="fr-FR" sz="2400" dirty="0" err="1"/>
+              <a:rPr lang="fr-FR" sz="2200" dirty="0" err="1"/>
               <a:t>assured</a:t>
             </a:r>
             <a:r>
-              <a:rPr lang="fr-FR" sz="2400" dirty="0"/>
+              <a:rPr lang="fr-FR" sz="2200" dirty="0"/>
               <a:t> if at least one server </a:t>
             </a:r>
             <a:r>
-              <a:rPr lang="fr-FR" sz="2400" dirty="0" err="1"/>
+              <a:rPr lang="fr-FR" sz="2200" dirty="0" err="1"/>
               <a:t>is</a:t>
             </a:r>
             <a:r>
-              <a:rPr lang="fr-FR" sz="2400" dirty="0"/>
+              <a:rPr lang="fr-FR" sz="2200" dirty="0"/>
               <a:t> </a:t>
             </a:r>
             <a:r>
-              <a:rPr lang="fr-FR" sz="2400" dirty="0" err="1"/>
+              <a:rPr lang="fr-FR" sz="2200" dirty="0" err="1"/>
               <a:t>trusted</a:t>
             </a:r>
-            <a:endParaRPr lang="fr-FR" sz="2400" dirty="0"/>
+            <a:r>
+              <a:rPr lang="fr-FR" sz="2200" dirty="0"/>
+              <a:t>, but </a:t>
+            </a:r>
+            <a:r>
+              <a:rPr lang="fr-FR" sz="2200" dirty="0" err="1"/>
+              <a:t>correctness</a:t>
+            </a:r>
+            <a:r>
+              <a:rPr lang="fr-FR" sz="2200" dirty="0"/>
+              <a:t> </a:t>
+            </a:r>
+            <a:r>
+              <a:rPr lang="fr-FR" sz="2200" dirty="0" err="1"/>
+              <a:t>only</a:t>
+            </a:r>
+            <a:r>
+              <a:rPr lang="fr-FR" sz="2200" dirty="0"/>
+              <a:t> if all </a:t>
+            </a:r>
+            <a:r>
+              <a:rPr lang="fr-FR" sz="2200" dirty="0" err="1"/>
+              <a:t>cothority</a:t>
+            </a:r>
+            <a:r>
+              <a:rPr lang="fr-FR" sz="2200" dirty="0"/>
+              <a:t> </a:t>
+            </a:r>
+            <a:r>
+              <a:rPr lang="fr-FR" sz="2200" dirty="0" err="1"/>
+              <a:t>trusted</a:t>
+            </a:r>
+            <a:endParaRPr lang="fr-FR" sz="2200" dirty="0"/>
           </a:p>
           <a:p>
             <a:pPr>
@@ -7079,41 +7140,32 @@
               <a:buFont typeface="Wingdings 2"/>
             </a:pPr>
             <a:r>
-              <a:rPr lang="fr-FR" sz="2400" dirty="0"/>
+              <a:rPr lang="fr-FR" sz="2200" dirty="0"/>
               <a:t>Proof of </a:t>
             </a:r>
             <a:r>
-              <a:rPr lang="fr-FR" sz="2400" dirty="0" err="1"/>
+              <a:rPr lang="fr-FR" sz="2200" dirty="0" err="1"/>
               <a:t>correctness</a:t>
             </a:r>
             <a:r>
-              <a:rPr lang="fr-FR" sz="2400" dirty="0"/>
+              <a:rPr lang="fr-FR" sz="2200" dirty="0"/>
               <a:t> </a:t>
             </a:r>
             <a:r>
-              <a:rPr lang="fr-FR" sz="2400" dirty="0" err="1"/>
+              <a:rPr lang="fr-FR" sz="2200" dirty="0" err="1"/>
               <a:t>using</a:t>
             </a:r>
             <a:r>
-              <a:rPr lang="fr-FR" sz="2400" dirty="0"/>
+              <a:rPr lang="fr-FR" sz="2200" dirty="0"/>
               <a:t> by </a:t>
             </a:r>
             <a:r>
-              <a:rPr lang="fr-FR" sz="2400" dirty="0" err="1"/>
+              <a:rPr lang="fr-FR" sz="2200" dirty="0" err="1"/>
               <a:t>SNIPs</a:t>
             </a:r>
             <a:r>
-              <a:rPr lang="fr-FR" sz="2400" dirty="0"/>
-              <a:t> proof</a:t>
-            </a:r>
-          </a:p>
-          <a:p>
-            <a:pPr lvl="1">
-              <a:buFont typeface="Wingdings 2"/>
-            </a:pPr>
-            <a:r>
-              <a:rPr lang="fr-FR" sz="2400" dirty="0"/>
-              <a:t>Proof for input validation</a:t>
+              <a:rPr lang="fr-FR" sz="2200" dirty="0"/>
+              <a:t> proof and Proof for input validation</a:t>
             </a:r>
           </a:p>
         </p:txBody>
@@ -7496,15 +7548,31 @@
             </a:r>
             <a:r>
               <a:rPr lang="fr-FR" sz="2200" dirty="0"/>
-              <a:t> (</a:t>
-            </a:r>
-            <a:r>
-              <a:rPr lang="fr-FR" sz="2200" dirty="0" err="1"/>
+              <a:t> </a:t>
+            </a:r>
+            <a:r>
+              <a:rPr lang="fr-FR" sz="2200" i="1" dirty="0"/>
+              <a:t>(</a:t>
+            </a:r>
+            <a:r>
+              <a:rPr lang="fr-FR" sz="2200" i="1" dirty="0" err="1"/>
               <a:t>f,g</a:t>
             </a:r>
             <a:r>
+              <a:rPr lang="fr-FR" sz="2200" i="1" dirty="0"/>
+              <a:t> </a:t>
+            </a:r>
+            <a:r>
               <a:rPr lang="fr-FR" sz="2200" dirty="0"/>
-              <a:t> and h)</a:t>
+              <a:t>and </a:t>
+            </a:r>
+            <a:r>
+              <a:rPr lang="fr-FR" sz="2200" i="1" dirty="0"/>
+              <a:t>h</a:t>
+            </a:r>
+            <a:r>
+              <a:rPr lang="fr-FR" sz="2200" dirty="0"/>
+              <a:t>)</a:t>
             </a:r>
           </a:p>
           <a:p>
@@ -7517,7 +7585,23 @@
             </a:r>
             <a:r>
               <a:rPr lang="fr-FR" sz="2200" dirty="0"/>
-              <a:t> Share h[i] of polynomial h </a:t>
+              <a:t> Share </a:t>
+            </a:r>
+            <a:r>
+              <a:rPr lang="fr-FR" sz="2200" i="1" dirty="0"/>
+              <a:t>h[i]</a:t>
+            </a:r>
+            <a:r>
+              <a:rPr lang="fr-FR" sz="2200" dirty="0"/>
+              <a:t> of polynomial </a:t>
+            </a:r>
+            <a:r>
+              <a:rPr lang="fr-FR" sz="2200" i="1" dirty="0"/>
+              <a:t>h</a:t>
+            </a:r>
+            <a:r>
+              <a:rPr lang="fr-FR" sz="2200" dirty="0"/>
+              <a:t> </a:t>
             </a:r>
             <a:r>
               <a:rPr lang="fr-FR" sz="2200" dirty="0" err="1"/>
@@ -7541,7 +7625,19 @@
             </a:r>
             <a:r>
               <a:rPr lang="fr-FR" sz="2200" dirty="0"/>
-              <a:t> x[i] to server i</a:t>
+              <a:t> </a:t>
+            </a:r>
+            <a:r>
+              <a:rPr lang="fr-FR" sz="2200" i="1" dirty="0"/>
+              <a:t>x[i]</a:t>
+            </a:r>
+            <a:r>
+              <a:rPr lang="fr-FR" sz="2200" dirty="0"/>
+              <a:t> to server </a:t>
+            </a:r>
+            <a:r>
+              <a:rPr lang="fr-FR" sz="2200" i="1" dirty="0"/>
+              <a:t>i</a:t>
             </a:r>
           </a:p>
           <a:p>
@@ -7649,13 +7745,17 @@
             </a:r>
             <a:r>
               <a:rPr lang="fr-FR" sz="2200" dirty="0"/>
-              <a:t> f</a:t>
-            </a:r>
-          </a:p>
-        </p:txBody>
-      </p:sp>
-      <mc:AlternateContent xmlns:mc="http://schemas.openxmlformats.org/markup-compatibility/2006">
-        <mc:Choice xmlns:a14="http://schemas.microsoft.com/office/drawing/2010/main" Requires="a14">
+              <a:t> </a:t>
+            </a:r>
+            <a:r>
+              <a:rPr lang="fr-FR" sz="2200" i="1" dirty="0"/>
+              <a:t>f(.)</a:t>
+            </a:r>
+          </a:p>
+        </p:txBody>
+      </p:sp>
+      <mc:AlternateContent xmlns:mc="http://schemas.openxmlformats.org/markup-compatibility/2006" xmlns:a14="http://schemas.microsoft.com/office/drawing/2010/main">
+        <mc:Choice Requires="a14">
           <p:sp>
             <p:nvSpPr>
               <p:cNvPr id="4" name="ZoneTexte 3">
@@ -7752,7 +7852,7 @@
             </p:txBody>
           </p:sp>
         </mc:Choice>
-        <mc:Fallback>
+        <mc:Fallback xmlns="">
           <p:sp>
             <p:nvSpPr>
               <p:cNvPr id="4" name="ZoneTexte 3">
@@ -7926,111 +8026,111 @@
               <a:buNone/>
             </a:pPr>
             <a:r>
-              <a:rPr lang="fr-FR" sz="2400" dirty="0"/>
+              <a:rPr lang="fr-FR" sz="2200" dirty="0"/>
               <a:t>3 </a:t>
             </a:r>
             <a:r>
-              <a:rPr lang="fr-FR" sz="2400" dirty="0" err="1"/>
+              <a:rPr lang="fr-FR" sz="2200" dirty="0" err="1"/>
               <a:t>curves</a:t>
             </a:r>
             <a:r>
-              <a:rPr lang="fr-FR" sz="2400" dirty="0"/>
+              <a:rPr lang="fr-FR" sz="2200" dirty="0"/>
               <a:t>, one for </a:t>
             </a:r>
             <a:r>
-              <a:rPr lang="fr-FR" sz="2400" dirty="0" err="1"/>
+              <a:rPr lang="fr-FR" sz="2200" dirty="0" err="1"/>
               <a:t>aggregation</a:t>
             </a:r>
             <a:r>
-              <a:rPr lang="fr-FR" sz="2400" dirty="0"/>
+              <a:rPr lang="fr-FR" sz="2200" dirty="0"/>
               <a:t> </a:t>
             </a:r>
             <a:r>
-              <a:rPr lang="fr-FR" sz="2400" dirty="0" err="1"/>
+              <a:rPr lang="fr-FR" sz="2200" dirty="0" err="1"/>
               <a:t>with</a:t>
             </a:r>
             <a:r>
-              <a:rPr lang="fr-FR" sz="2400" dirty="0"/>
+              <a:rPr lang="fr-FR" sz="2200" dirty="0"/>
               <a:t> </a:t>
             </a:r>
             <a:r>
-              <a:rPr lang="fr-FR" sz="2400" dirty="0" err="1"/>
+              <a:rPr lang="fr-FR" sz="2200" dirty="0" err="1"/>
               <a:t>Prio</a:t>
             </a:r>
             <a:r>
-              <a:rPr lang="fr-FR" sz="2400" dirty="0"/>
+              <a:rPr lang="fr-FR" sz="2200" dirty="0"/>
               <a:t> </a:t>
             </a:r>
             <a:r>
-              <a:rPr lang="fr-FR" sz="2400" dirty="0" err="1"/>
+              <a:rPr lang="fr-FR" sz="2200" dirty="0" err="1"/>
               <a:t>method</a:t>
             </a:r>
             <a:r>
-              <a:rPr lang="fr-FR" sz="2400" dirty="0"/>
+              <a:rPr lang="fr-FR" sz="2200" dirty="0"/>
               <a:t>, the </a:t>
             </a:r>
             <a:r>
-              <a:rPr lang="fr-FR" sz="2400" dirty="0" err="1"/>
+              <a:rPr lang="fr-FR" sz="2200" dirty="0" err="1"/>
               <a:t>other</a:t>
             </a:r>
             <a:r>
-              <a:rPr lang="fr-FR" sz="2400" dirty="0"/>
+              <a:rPr lang="fr-FR" sz="2200" dirty="0"/>
               <a:t> for the </a:t>
             </a:r>
             <a:r>
-              <a:rPr lang="fr-FR" sz="2400" dirty="0" err="1"/>
+              <a:rPr lang="fr-FR" sz="2200" dirty="0" err="1"/>
               <a:t>aggregation</a:t>
             </a:r>
             <a:r>
-              <a:rPr lang="fr-FR" sz="2400" dirty="0"/>
+              <a:rPr lang="fr-FR" sz="2200" dirty="0"/>
               <a:t> </a:t>
             </a:r>
             <a:r>
-              <a:rPr lang="fr-FR" sz="2400" dirty="0" err="1"/>
+              <a:rPr lang="fr-FR" sz="2200" dirty="0" err="1"/>
               <a:t>with</a:t>
             </a:r>
             <a:r>
-              <a:rPr lang="fr-FR" sz="2400" dirty="0"/>
+              <a:rPr lang="fr-FR" sz="2200" dirty="0"/>
               <a:t> </a:t>
             </a:r>
             <a:r>
-              <a:rPr lang="fr-FR" sz="2400" dirty="0" err="1"/>
+              <a:rPr lang="fr-FR" sz="2200" dirty="0" err="1"/>
               <a:t>Unlynx</a:t>
             </a:r>
             <a:r>
-              <a:rPr lang="fr-FR" sz="2400" dirty="0"/>
+              <a:rPr lang="fr-FR" sz="2200" dirty="0"/>
               <a:t> </a:t>
             </a:r>
             <a:r>
-              <a:rPr lang="fr-FR" sz="2400" dirty="0" err="1"/>
+              <a:rPr lang="fr-FR" sz="2200" dirty="0" err="1"/>
               <a:t>ciphers</a:t>
             </a:r>
             <a:r>
-              <a:rPr lang="fr-FR" sz="2400" dirty="0"/>
+              <a:rPr lang="fr-FR" sz="2200" dirty="0"/>
               <a:t>, and the last one </a:t>
             </a:r>
             <a:r>
-              <a:rPr lang="fr-FR" sz="2400" dirty="0" err="1"/>
+              <a:rPr lang="fr-FR" sz="2200" dirty="0" err="1"/>
               <a:t>is</a:t>
             </a:r>
             <a:r>
-              <a:rPr lang="fr-FR" sz="2400" dirty="0"/>
+              <a:rPr lang="fr-FR" sz="2200" dirty="0"/>
               <a:t> the </a:t>
             </a:r>
             <a:r>
-              <a:rPr lang="fr-FR" sz="2400" dirty="0" err="1"/>
+              <a:rPr lang="fr-FR" sz="2200" dirty="0" err="1"/>
               <a:t>execution</a:t>
             </a:r>
             <a:r>
-              <a:rPr lang="fr-FR" sz="2400" dirty="0"/>
+              <a:rPr lang="fr-FR" sz="2200" dirty="0"/>
               <a:t> time for </a:t>
             </a:r>
             <a:r>
-              <a:rPr lang="fr-FR" sz="2400" dirty="0" err="1"/>
+              <a:rPr lang="fr-FR" sz="2200" dirty="0" err="1"/>
               <a:t>SNIPs</a:t>
             </a:r>
             <a:r>
-              <a:rPr lang="fr-FR" sz="2400" dirty="0"/>
+              <a:rPr lang="fr-FR" sz="2200" dirty="0"/>
               <a:t> proof</a:t>
             </a:r>
           </a:p>
@@ -8719,6 +8819,150 @@
           </a:p>
         </p:txBody>
       </p:sp>
+      <p:pic>
+        <p:nvPicPr>
+          <p:cNvPr id="7" name="Graphique 6" descr="Fermer">
+            <a:extLst>
+              <a:ext uri="{FF2B5EF4-FFF2-40B4-BE49-F238E27FC236}">
+                <a16:creationId xmlns:a16="http://schemas.microsoft.com/office/drawing/2014/main" id="{430A22E9-A5A6-44C0-9B7B-2AA43379751A}"/>
+              </a:ext>
+            </a:extLst>
+          </p:cNvPr>
+          <p:cNvPicPr>
+            <a:picLocks noChangeAspect="1"/>
+          </p:cNvPicPr>
+          <p:nvPr/>
+        </p:nvPicPr>
+        <p:blipFill>
+          <a:blip r:embed="rId6">
+            <a:extLst>
+              <a:ext uri="{96DAC541-7B7A-43D3-8B79-37D633B846F1}">
+                <asvg:svgBlip xmlns:asvg="http://schemas.microsoft.com/office/drawing/2016/SVG/main" r:embed="rId7"/>
+              </a:ext>
+            </a:extLst>
+          </a:blip>
+          <a:stretch>
+            <a:fillRect/>
+          </a:stretch>
+        </p:blipFill>
+        <p:spPr>
+          <a:xfrm>
+            <a:off x="9246509" y="4169498"/>
+            <a:ext cx="627535" cy="627535"/>
+          </a:xfrm>
+          <a:prstGeom prst="rect">
+            <a:avLst/>
+          </a:prstGeom>
+        </p:spPr>
+      </p:pic>
+      <p:pic>
+        <p:nvPicPr>
+          <p:cNvPr id="11" name="Graphique 10" descr="Fermer">
+            <a:extLst>
+              <a:ext uri="{FF2B5EF4-FFF2-40B4-BE49-F238E27FC236}">
+                <a16:creationId xmlns:a16="http://schemas.microsoft.com/office/drawing/2014/main" id="{C2789318-8E0D-4D97-87A6-F69A4EEE9DCC}"/>
+              </a:ext>
+            </a:extLst>
+          </p:cNvPr>
+          <p:cNvPicPr>
+            <a:picLocks noChangeAspect="1"/>
+          </p:cNvPicPr>
+          <p:nvPr/>
+        </p:nvPicPr>
+        <p:blipFill>
+          <a:blip r:embed="rId6">
+            <a:extLst>
+              <a:ext uri="{96DAC541-7B7A-43D3-8B79-37D633B846F1}">
+                <asvg:svgBlip xmlns:asvg="http://schemas.microsoft.com/office/drawing/2016/SVG/main" r:embed="rId7"/>
+              </a:ext>
+            </a:extLst>
+          </a:blip>
+          <a:stretch>
+            <a:fillRect/>
+          </a:stretch>
+        </p:blipFill>
+        <p:spPr>
+          <a:xfrm>
+            <a:off x="11214230" y="4694680"/>
+            <a:ext cx="638234" cy="638234"/>
+          </a:xfrm>
+          <a:prstGeom prst="rect">
+            <a:avLst/>
+          </a:prstGeom>
+        </p:spPr>
+      </p:pic>
+      <p:pic>
+        <p:nvPicPr>
+          <p:cNvPr id="12" name="Graphique 11" descr="Fermer">
+            <a:extLst>
+              <a:ext uri="{FF2B5EF4-FFF2-40B4-BE49-F238E27FC236}">
+                <a16:creationId xmlns:a16="http://schemas.microsoft.com/office/drawing/2014/main" id="{2565D5D3-EFC7-4473-AE69-AA546DE91992}"/>
+              </a:ext>
+            </a:extLst>
+          </p:cNvPr>
+          <p:cNvPicPr>
+            <a:picLocks noChangeAspect="1"/>
+          </p:cNvPicPr>
+          <p:nvPr/>
+        </p:nvPicPr>
+        <p:blipFill>
+          <a:blip r:embed="rId6">
+            <a:extLst>
+              <a:ext uri="{96DAC541-7B7A-43D3-8B79-37D633B846F1}">
+                <asvg:svgBlip xmlns:asvg="http://schemas.microsoft.com/office/drawing/2016/SVG/main" r:embed="rId7"/>
+              </a:ext>
+            </a:extLst>
+          </a:blip>
+          <a:stretch>
+            <a:fillRect/>
+          </a:stretch>
+        </p:blipFill>
+        <p:spPr>
+          <a:xfrm>
+            <a:off x="8360229" y="5226170"/>
+            <a:ext cx="598286" cy="598286"/>
+          </a:xfrm>
+          <a:prstGeom prst="rect">
+            <a:avLst/>
+          </a:prstGeom>
+        </p:spPr>
+      </p:pic>
+      <p:pic>
+        <p:nvPicPr>
+          <p:cNvPr id="13" name="Graphique 12" descr="Fermer">
+            <a:extLst>
+              <a:ext uri="{FF2B5EF4-FFF2-40B4-BE49-F238E27FC236}">
+                <a16:creationId xmlns:a16="http://schemas.microsoft.com/office/drawing/2014/main" id="{5880F270-CC52-47D0-9F2B-2FBB667A3709}"/>
+              </a:ext>
+            </a:extLst>
+          </p:cNvPr>
+          <p:cNvPicPr>
+            <a:picLocks noChangeAspect="1"/>
+          </p:cNvPicPr>
+          <p:nvPr/>
+        </p:nvPicPr>
+        <p:blipFill>
+          <a:blip r:embed="rId6">
+            <a:extLst>
+              <a:ext uri="{96DAC541-7B7A-43D3-8B79-37D633B846F1}">
+                <asvg:svgBlip xmlns:asvg="http://schemas.microsoft.com/office/drawing/2016/SVG/main" r:embed="rId7"/>
+              </a:ext>
+            </a:extLst>
+          </a:blip>
+          <a:stretch>
+            <a:fillRect/>
+          </a:stretch>
+        </p:blipFill>
+        <p:spPr>
+          <a:xfrm>
+            <a:off x="5162904" y="5745367"/>
+            <a:ext cx="661120" cy="661120"/>
+          </a:xfrm>
+          <a:prstGeom prst="rect">
+            <a:avLst/>
+          </a:prstGeom>
+        </p:spPr>
+      </p:pic>
     </p:spTree>
     <p:extLst>
       <p:ext uri="{BB962C8B-B14F-4D97-AF65-F5344CB8AC3E}">
@@ -8836,47 +9080,47 @@
               </a:tabLst>
             </a:pPr>
             <a:r>
-              <a:rPr lang="fr-FR" altLang="fr-FR" dirty="0"/>
+              <a:rPr lang="fr-FR" altLang="fr-FR" sz="2200" dirty="0"/>
               <a:t>Server i Pair </a:t>
             </a:r>
             <a:r>
-              <a:rPr lang="fr-FR" altLang="fr-FR" dirty="0" err="1"/>
+              <a:rPr lang="fr-FR" altLang="fr-FR" sz="2200" dirty="0" err="1"/>
               <a:t>private</a:t>
             </a:r>
             <a:r>
-              <a:rPr lang="fr-FR" altLang="fr-FR" dirty="0"/>
+              <a:rPr lang="fr-FR" altLang="fr-FR" sz="2200" dirty="0"/>
               <a:t>-public Key (</a:t>
             </a:r>
             <a:r>
-              <a:rPr lang="fr-FR" altLang="fr-FR" dirty="0" err="1"/>
+              <a:rPr lang="fr-FR" altLang="fr-FR" sz="2200" dirty="0" err="1"/>
               <a:t>ki,Ki</a:t>
             </a:r>
             <a:r>
-              <a:rPr lang="fr-FR" altLang="fr-FR" dirty="0"/>
+              <a:rPr lang="fr-FR" altLang="fr-FR" sz="2200" dirty="0"/>
               <a:t>), collective public key K </a:t>
             </a:r>
             <a:r>
-              <a:rPr lang="fr-FR" altLang="fr-FR" dirty="0" err="1"/>
+              <a:rPr lang="fr-FR" altLang="fr-FR" sz="2200" dirty="0" err="1"/>
               <a:t>sum</a:t>
             </a:r>
             <a:r>
-              <a:rPr lang="fr-FR" altLang="fr-FR" dirty="0"/>
+              <a:rPr lang="fr-FR" altLang="fr-FR" sz="2200" dirty="0"/>
               <a:t> of public </a:t>
             </a:r>
             <a:r>
-              <a:rPr lang="fr-FR" altLang="fr-FR" dirty="0" err="1"/>
+              <a:rPr lang="fr-FR" altLang="fr-FR" sz="2200" dirty="0" err="1"/>
               <a:t>from</a:t>
             </a:r>
             <a:r>
-              <a:rPr lang="fr-FR" altLang="fr-FR" dirty="0"/>
+              <a:rPr lang="fr-FR" altLang="fr-FR" sz="2200" dirty="0"/>
               <a:t> </a:t>
             </a:r>
             <a:r>
-              <a:rPr lang="fr-FR" altLang="fr-FR" dirty="0" err="1"/>
+              <a:rPr lang="fr-FR" altLang="fr-FR" sz="2200" dirty="0" err="1"/>
               <a:t>each</a:t>
             </a:r>
             <a:r>
-              <a:rPr lang="fr-FR" altLang="fr-FR" dirty="0"/>
+              <a:rPr lang="fr-FR" altLang="fr-FR" sz="2200" dirty="0"/>
               <a:t> server.</a:t>
             </a:r>
           </a:p>
@@ -8910,59 +9154,59 @@
               </a:tabLst>
             </a:pPr>
             <a:r>
-              <a:rPr lang="fr-FR" altLang="fr-FR" dirty="0" err="1"/>
+              <a:rPr lang="fr-FR" altLang="fr-FR" sz="2200" dirty="0" err="1"/>
               <a:t>Zero</a:t>
             </a:r>
             <a:r>
-              <a:rPr lang="fr-FR" altLang="fr-FR" dirty="0"/>
+              <a:rPr lang="fr-FR" altLang="fr-FR" sz="2200" dirty="0"/>
               <a:t> </a:t>
             </a:r>
             <a:r>
-              <a:rPr lang="fr-FR" altLang="fr-FR" dirty="0" err="1"/>
+              <a:rPr lang="fr-FR" altLang="fr-FR" sz="2200" dirty="0" err="1"/>
               <a:t>knowledge</a:t>
             </a:r>
             <a:r>
-              <a:rPr lang="fr-FR" altLang="fr-FR" dirty="0"/>
+              <a:rPr lang="fr-FR" altLang="fr-FR" sz="2200" dirty="0"/>
               <a:t> proof, </a:t>
             </a:r>
             <a:r>
-              <a:rPr lang="fr-FR" altLang="fr-FR" dirty="0" err="1"/>
+              <a:rPr lang="fr-FR" altLang="fr-FR" sz="2200" dirty="0" err="1"/>
               <a:t>with</a:t>
             </a:r>
             <a:r>
-              <a:rPr lang="fr-FR" altLang="fr-FR" dirty="0"/>
+              <a:rPr lang="fr-FR" altLang="fr-FR" sz="2200" dirty="0"/>
               <a:t> </a:t>
             </a:r>
             <a:r>
-              <a:rPr lang="fr-FR" altLang="fr-FR" dirty="0" err="1"/>
+              <a:rPr lang="fr-FR" altLang="fr-FR" sz="2200" dirty="0" err="1"/>
               <a:t>discrete</a:t>
             </a:r>
             <a:r>
-              <a:rPr lang="fr-FR" altLang="fr-FR" dirty="0"/>
+              <a:rPr lang="fr-FR" altLang="fr-FR" sz="2200" dirty="0"/>
               <a:t> log y1, y2 by </a:t>
             </a:r>
             <a:r>
-              <a:rPr lang="fr-FR" altLang="fr-FR" dirty="0" err="1"/>
+              <a:rPr lang="fr-FR" altLang="fr-FR" sz="2200" dirty="0" err="1"/>
               <a:t>doing</a:t>
             </a:r>
             <a:r>
-              <a:rPr lang="fr-FR" altLang="fr-FR" dirty="0"/>
+              <a:rPr lang="fr-FR" altLang="fr-FR" sz="2200" dirty="0"/>
               <a:t> A1y1 + A2y2 = A, for DDT, </a:t>
             </a:r>
             <a:r>
-              <a:rPr lang="fr-FR" altLang="fr-FR" dirty="0" err="1"/>
+              <a:rPr lang="fr-FR" altLang="fr-FR" sz="2200" dirty="0" err="1"/>
               <a:t>publish</a:t>
             </a:r>
             <a:r>
-              <a:rPr lang="fr-FR" altLang="fr-FR" dirty="0"/>
+              <a:rPr lang="fr-FR" altLang="fr-FR" sz="2200" dirty="0"/>
               <a:t> for </a:t>
             </a:r>
             <a:r>
-              <a:rPr lang="fr-FR" altLang="fr-FR" dirty="0" err="1"/>
+              <a:rPr lang="fr-FR" altLang="fr-FR" sz="2200" dirty="0" err="1"/>
               <a:t>Agg</a:t>
             </a:r>
             <a:r>
-              <a:rPr lang="fr-FR" altLang="fr-FR" dirty="0"/>
+              <a:rPr lang="fr-FR" altLang="fr-FR" sz="2200" dirty="0"/>
               <a:t>.</a:t>
             </a:r>
           </a:p>
@@ -8996,30 +9240,30 @@
               </a:tabLst>
             </a:pPr>
             <a:r>
-              <a:rPr lang="fr-FR" altLang="fr-FR" dirty="0"/>
+              <a:rPr lang="fr-FR" altLang="fr-FR" sz="2200" dirty="0"/>
               <a:t>Support </a:t>
             </a:r>
             <a:r>
-              <a:rPr lang="fr-FR" altLang="fr-FR" dirty="0" err="1"/>
+              <a:rPr lang="fr-FR" altLang="fr-FR" sz="2200" dirty="0" err="1"/>
               <a:t>Differentially</a:t>
             </a:r>
             <a:r>
-              <a:rPr lang="fr-FR" altLang="fr-FR" dirty="0"/>
+              <a:rPr lang="fr-FR" altLang="fr-FR" sz="2200" dirty="0"/>
               <a:t> </a:t>
             </a:r>
             <a:r>
-              <a:rPr lang="fr-FR" altLang="fr-FR" dirty="0" err="1"/>
+              <a:rPr lang="fr-FR" altLang="fr-FR" sz="2200" dirty="0" err="1"/>
               <a:t>private</a:t>
             </a:r>
             <a:r>
-              <a:rPr lang="fr-FR" altLang="fr-FR" dirty="0"/>
+              <a:rPr lang="fr-FR" altLang="fr-FR" sz="2200" dirty="0"/>
               <a:t> </a:t>
             </a:r>
             <a:r>
-              <a:rPr lang="fr-FR" altLang="fr-FR" dirty="0" err="1"/>
+              <a:rPr lang="fr-FR" altLang="fr-FR" sz="2200" dirty="0" err="1"/>
               <a:t>queries</a:t>
             </a:r>
-            <a:endParaRPr lang="fr-FR" altLang="fr-FR" dirty="0"/>
+            <a:endParaRPr lang="fr-FR" altLang="fr-FR" sz="2200" dirty="0"/>
           </a:p>
           <a:p>
             <a:pPr indent="-325438">
@@ -9051,34 +9295,64 @@
               </a:tabLst>
             </a:pPr>
             <a:r>
-              <a:rPr lang="fr-FR" altLang="fr-FR" dirty="0" err="1"/>
+              <a:rPr lang="fr-FR" altLang="fr-FR" sz="2200" dirty="0" err="1"/>
               <a:t>Confidentiality</a:t>
             </a:r>
             <a:r>
-              <a:rPr lang="fr-FR" altLang="fr-FR" dirty="0"/>
+              <a:rPr lang="fr-FR" altLang="fr-FR" sz="2200" dirty="0"/>
               <a:t>, </a:t>
             </a:r>
             <a:r>
-              <a:rPr lang="fr-FR" altLang="fr-FR" dirty="0" err="1"/>
+              <a:rPr lang="fr-FR" altLang="fr-FR" sz="2200" dirty="0" err="1"/>
               <a:t>Unlikability,Corectness</a:t>
             </a:r>
             <a:r>
-              <a:rPr lang="fr-FR" altLang="fr-FR" dirty="0"/>
+              <a:rPr lang="fr-FR" altLang="fr-FR" sz="2200" dirty="0"/>
               <a:t>, </a:t>
             </a:r>
-            <a:r>
-              <a:rPr lang="fr-FR" altLang="fr-FR" dirty="0" err="1"/>
+          </a:p>
+          <a:p>
+            <a:pPr indent="-325438">
+              <a:buClrTx/>
+              <a:buFontTx/>
+              <a:buNone/>
+              <a:tabLst>
+                <a:tab pos="342900" algn="l"/>
+                <a:tab pos="447675" algn="l"/>
+                <a:tab pos="896938" algn="l"/>
+                <a:tab pos="1346200" algn="l"/>
+                <a:tab pos="1795463" algn="l"/>
+                <a:tab pos="2244725" algn="l"/>
+                <a:tab pos="2693988" algn="l"/>
+                <a:tab pos="3143250" algn="l"/>
+                <a:tab pos="3592513" algn="l"/>
+                <a:tab pos="4041775" algn="l"/>
+                <a:tab pos="4491038" algn="l"/>
+                <a:tab pos="4940300" algn="l"/>
+                <a:tab pos="5389563" algn="l"/>
+                <a:tab pos="5838825" algn="l"/>
+                <a:tab pos="6288088" algn="l"/>
+                <a:tab pos="6737350" algn="l"/>
+                <a:tab pos="7186613" algn="l"/>
+                <a:tab pos="7635875" algn="l"/>
+                <a:tab pos="8085138" algn="l"/>
+                <a:tab pos="8534400" algn="l"/>
+                <a:tab pos="8983663" algn="l"/>
+              </a:tabLst>
+            </a:pPr>
+            <a:r>
+              <a:rPr lang="fr-FR" altLang="fr-FR" sz="2200" dirty="0" err="1"/>
               <a:t>differential</a:t>
             </a:r>
             <a:r>
-              <a:rPr lang="fr-FR" altLang="fr-FR" dirty="0"/>
+              <a:rPr lang="fr-FR" altLang="fr-FR" sz="2200" dirty="0"/>
               <a:t> </a:t>
             </a:r>
             <a:r>
-              <a:rPr lang="fr-FR" altLang="fr-FR" dirty="0" err="1"/>
+              <a:rPr lang="fr-FR" altLang="fr-FR" sz="2200" dirty="0" err="1"/>
               <a:t>privacy</a:t>
             </a:r>
-            <a:endParaRPr lang="fr-FR" altLang="fr-FR" dirty="0"/>
+            <a:endParaRPr lang="fr-FR" altLang="fr-FR" sz="2200" dirty="0"/>
           </a:p>
           <a:p>
             <a:endParaRPr lang="fr-FR" dirty="0"/>
@@ -9256,8 +9530,8 @@
           </a:p>
         </p:txBody>
       </p:sp>
-      <mc:AlternateContent xmlns:mc="http://schemas.openxmlformats.org/markup-compatibility/2006">
-        <mc:Choice xmlns:a14="http://schemas.microsoft.com/office/drawing/2010/main" Requires="a14">
+      <mc:AlternateContent xmlns:mc="http://schemas.openxmlformats.org/markup-compatibility/2006" xmlns:a14="http://schemas.microsoft.com/office/drawing/2010/main">
+        <mc:Choice Requires="a14">
           <p:sp>
             <p:nvSpPr>
               <p:cNvPr id="3" name="Espace réservé du contenu 2">
@@ -10555,7 +10829,7 @@
             </p:txBody>
           </p:sp>
         </mc:Choice>
-        <mc:Fallback>
+        <mc:Fallback xmlns="">
           <p:sp>
             <p:nvSpPr>
               <p:cNvPr id="3" name="Espace réservé du contenu 2">
@@ -10599,8 +10873,8 @@
           </p:sp>
         </mc:Fallback>
       </mc:AlternateContent>
-      <mc:AlternateContent xmlns:mc="http://schemas.openxmlformats.org/markup-compatibility/2006">
-        <mc:Choice xmlns:a14="http://schemas.microsoft.com/office/drawing/2010/main" Requires="a14">
+      <mc:AlternateContent xmlns:mc="http://schemas.openxmlformats.org/markup-compatibility/2006" xmlns:a14="http://schemas.microsoft.com/office/drawing/2010/main">
+        <mc:Choice Requires="a14">
           <p:sp>
             <p:nvSpPr>
               <p:cNvPr id="5" name="ZoneTexte 4">
@@ -10629,6 +10903,7 @@
               </a:bodyPr>
               <a:lstStyle/>
               <a:p>
+                <a:pPr/>
                 <a14:m>
                   <m:oMathPara xmlns:m="http://schemas.openxmlformats.org/officeDocument/2006/math">
                     <m:oMathParaPr>
@@ -10673,7 +10948,7 @@
             </p:txBody>
           </p:sp>
         </mc:Choice>
-        <mc:Fallback>
+        <mc:Fallback xmlns="">
           <p:sp>
             <p:nvSpPr>
               <p:cNvPr id="5" name="ZoneTexte 4">

</xml_diff>

<commit_message>
cleaner repo and replace image, add midterm presentation feedback
</commit_message>
<xml_diff>
--- a/doc/Présentation.pptx
+++ b/doc/Présentation.pptx
@@ -209,7 +209,7 @@
           <a:p>
             <a:fld id="{257196CA-1AA5-48F7-AC5A-81C2542B9768}" type="datetimeFigureOut">
               <a:rPr lang="fr-FR" smtClean="0"/>
-              <a:t>27/11/2017</a:t>
+              <a:t>28/11/2017</a:t>
             </a:fld>
             <a:endParaRPr lang="fr-FR"/>
           </a:p>
@@ -739,7 +739,7 @@
           <a:effectLst/>
           <a:extLst>
             <a:ext uri="{91240B29-F687-4f45-9708-019B960494DF}">
-              <a14:hiddenLine xmlns="" xmlns:a14="http://schemas.microsoft.com/office/drawing/2010/main" w="9525">
+              <a14:hiddenLine xmlns:a14="http://schemas.microsoft.com/office/drawing/2010/main" xmlns="" w="9525">
                 <a:solidFill>
                   <a:srgbClr val="000000"/>
                 </a:solidFill>
@@ -929,7 +929,7 @@
           <a:p>
             <a:fld id="{2B6BFBFE-4A06-478C-99C2-EFA224401716}" type="datetime1">
               <a:rPr lang="en-US" smtClean="0"/>
-              <a:t>11/27/2017</a:t>
+              <a:t>11/28/2017</a:t>
             </a:fld>
             <a:endParaRPr lang="en-US"/>
           </a:p>
@@ -1241,7 +1241,7 @@
           <a:p>
             <a:fld id="{672A8A5A-C101-4AB5-827A-8796DD8317EF}" type="datetime1">
               <a:rPr lang="en-US" smtClean="0"/>
-              <a:t>11/27/2017</a:t>
+              <a:t>11/28/2017</a:t>
             </a:fld>
             <a:endParaRPr lang="en-US"/>
           </a:p>
@@ -1724,7 +1724,7 @@
           <a:p>
             <a:fld id="{20823F57-F983-4054-910D-69A08DC992A1}" type="datetime1">
               <a:rPr lang="en-US" smtClean="0"/>
-              <a:t>11/27/2017</a:t>
+              <a:t>11/28/2017</a:t>
             </a:fld>
             <a:endParaRPr lang="en-US"/>
           </a:p>
@@ -2088,7 +2088,7 @@
           <a:p>
             <a:fld id="{EC3827D1-58DD-4440-95C2-10AD3D075167}" type="datetime1">
               <a:rPr lang="en-US" smtClean="0"/>
-              <a:t>11/27/2017</a:t>
+              <a:t>11/28/2017</a:t>
             </a:fld>
             <a:endParaRPr lang="en-US"/>
           </a:p>
@@ -2239,7 +2239,7 @@
           <a:ln/>
           <a:extLst>
             <a:ext uri="{91240B29-F687-4f45-9708-019B960494DF}">
-              <a14:hiddenLine xmlns="" xmlns:a14="http://schemas.microsoft.com/office/drawing/2010/main" w="9525">
+              <a14:hiddenLine xmlns:a14="http://schemas.microsoft.com/office/drawing/2010/main" xmlns="" w="9525">
                 <a:solidFill>
                   <a:srgbClr val="000000"/>
                 </a:solidFill>
@@ -2355,7 +2355,7 @@
           <a:p>
             <a:fld id="{04393047-5A64-421A-A2F4-F924199C43A2}" type="datetime1">
               <a:rPr lang="en-US" smtClean="0"/>
-              <a:t>11/27/2017</a:t>
+              <a:t>11/28/2017</a:t>
             </a:fld>
             <a:endParaRPr lang="en-US"/>
           </a:p>
@@ -2508,7 +2508,7 @@
           <a:ln/>
           <a:extLst>
             <a:ext uri="{91240B29-F687-4f45-9708-019B960494DF}">
-              <a14:hiddenLine xmlns="" xmlns:a14="http://schemas.microsoft.com/office/drawing/2010/main" w="9525">
+              <a14:hiddenLine xmlns:a14="http://schemas.microsoft.com/office/drawing/2010/main" xmlns="" w="9525">
                 <a:solidFill>
                   <a:srgbClr val="000000"/>
                 </a:solidFill>
@@ -2634,7 +2634,7 @@
           <a:p>
             <a:fld id="{BAF7D709-4636-4904-8A29-2E395C04A691}" type="datetime1">
               <a:rPr lang="en-US" smtClean="0"/>
-              <a:t>11/27/2017</a:t>
+              <a:t>11/28/2017</a:t>
             </a:fld>
             <a:endParaRPr lang="en-US"/>
           </a:p>
@@ -2785,7 +2785,7 @@
           <a:ln/>
           <a:extLst>
             <a:ext uri="{91240B29-F687-4f45-9708-019B960494DF}">
-              <a14:hiddenLine xmlns="" xmlns:a14="http://schemas.microsoft.com/office/drawing/2010/main" w="9525">
+              <a14:hiddenLine xmlns:a14="http://schemas.microsoft.com/office/drawing/2010/main" xmlns="" w="9525">
                 <a:solidFill>
                   <a:srgbClr val="000000"/>
                 </a:solidFill>
@@ -2911,7 +2911,7 @@
           <a:p>
             <a:fld id="{8F85DFDC-DD8C-4C2A-9815-7D703A8707AA}" type="datetime1">
               <a:rPr lang="en-US" smtClean="0"/>
-              <a:t>11/27/2017</a:t>
+              <a:t>11/28/2017</a:t>
             </a:fld>
             <a:endParaRPr lang="en-US"/>
           </a:p>
@@ -3249,7 +3249,7 @@
           <a:p>
             <a:fld id="{3CE5F090-9396-4646-8F3D-B20AB09A48E9}" type="datetime1">
               <a:rPr lang="en-US" smtClean="0"/>
-              <a:t>11/27/2017</a:t>
+              <a:t>11/28/2017</a:t>
             </a:fld>
             <a:endParaRPr lang="en-US"/>
           </a:p>
@@ -3400,7 +3400,7 @@
           <a:ln/>
           <a:extLst>
             <a:ext uri="{91240B29-F687-4f45-9708-019B960494DF}">
-              <a14:hiddenLine xmlns="" xmlns:a14="http://schemas.microsoft.com/office/drawing/2010/main" w="9525">
+              <a14:hiddenLine xmlns:a14="http://schemas.microsoft.com/office/drawing/2010/main" xmlns="" w="9525">
                 <a:solidFill>
                   <a:srgbClr val="000000"/>
                 </a:solidFill>
@@ -3581,7 +3581,7 @@
           <a:p>
             <a:fld id="{B0F7C1AA-15D5-43A3-AD85-A242740ECF29}" type="datetime1">
               <a:rPr lang="en-US" smtClean="0"/>
-              <a:t>11/27/2017</a:t>
+              <a:t>11/28/2017</a:t>
             </a:fld>
             <a:endParaRPr lang="en-US"/>
           </a:p>
@@ -3732,7 +3732,7 @@
           <a:ln/>
           <a:extLst>
             <a:ext uri="{91240B29-F687-4f45-9708-019B960494DF}">
-              <a14:hiddenLine xmlns="" xmlns:a14="http://schemas.microsoft.com/office/drawing/2010/main" w="9525">
+              <a14:hiddenLine xmlns:a14="http://schemas.microsoft.com/office/drawing/2010/main" xmlns="" w="9525">
                 <a:solidFill>
                   <a:srgbClr val="000000"/>
                 </a:solidFill>
@@ -4051,7 +4051,7 @@
           <a:p>
             <a:fld id="{C2A7AA46-CB1A-46BA-810F-159ED7B75238}" type="datetime1">
               <a:rPr lang="en-US" smtClean="0"/>
-              <a:t>11/27/2017</a:t>
+              <a:t>11/28/2017</a:t>
             </a:fld>
             <a:endParaRPr lang="en-US"/>
           </a:p>
@@ -4202,7 +4202,7 @@
           <a:ln/>
           <a:extLst>
             <a:ext uri="{91240B29-F687-4f45-9708-019B960494DF}">
-              <a14:hiddenLine xmlns="" xmlns:a14="http://schemas.microsoft.com/office/drawing/2010/main" w="9525">
+              <a14:hiddenLine xmlns:a14="http://schemas.microsoft.com/office/drawing/2010/main" xmlns="" w="9525">
                 <a:solidFill>
                   <a:srgbClr val="000000"/>
                 </a:solidFill>
@@ -4267,7 +4267,7 @@
           <a:p>
             <a:fld id="{633518B6-1485-4E26-8C16-EF4A5ABED950}" type="datetime1">
               <a:rPr lang="en-US" smtClean="0"/>
-              <a:t>11/27/2017</a:t>
+              <a:t>11/28/2017</a:t>
             </a:fld>
             <a:endParaRPr lang="en-US"/>
           </a:p>
@@ -4358,7 +4358,7 @@
           <a:p>
             <a:fld id="{BAF87255-8F5A-4D3C-B239-2DE1947C77BB}" type="datetime1">
               <a:rPr lang="en-US" smtClean="0"/>
-              <a:t>11/27/2017</a:t>
+              <a:t>11/28/2017</a:t>
             </a:fld>
             <a:endParaRPr lang="en-US"/>
           </a:p>
@@ -4622,7 +4622,7 @@
           <a:ln/>
           <a:extLst>
             <a:ext uri="{91240B29-F687-4f45-9708-019B960494DF}">
-              <a14:hiddenLine xmlns="" xmlns:a14="http://schemas.microsoft.com/office/drawing/2010/main" w="9525">
+              <a14:hiddenLine xmlns:a14="http://schemas.microsoft.com/office/drawing/2010/main" xmlns="" w="9525">
                 <a:solidFill>
                   <a:srgbClr val="000000"/>
                 </a:solidFill>
@@ -4819,7 +4819,7 @@
           <a:p>
             <a:fld id="{22C3A4CD-12A5-4E72-A214-0F82D7FB2064}" type="datetime1">
               <a:rPr lang="en-US" smtClean="0"/>
-              <a:t>11/27/2017</a:t>
+              <a:t>11/28/2017</a:t>
             </a:fld>
             <a:endParaRPr lang="en-US"/>
           </a:p>
@@ -5126,7 +5126,7 @@
           <a:p>
             <a:fld id="{7021C23C-E00B-40DA-B56C-8237DE13945F}" type="datetime1">
               <a:rPr lang="en-US" smtClean="0"/>
-              <a:t>11/27/2017</a:t>
+              <a:t>11/28/2017</a:t>
             </a:fld>
             <a:endParaRPr lang="en-US"/>
           </a:p>
@@ -5390,7 +5390,7 @@
           <a:p>
             <a:fld id="{142C0FFA-6909-4280-B768-CE28430A3E68}" type="datetime1">
               <a:rPr lang="en-US" smtClean="0"/>
-              <a:t>11/27/2017</a:t>
+              <a:t>11/28/2017</a:t>
             </a:fld>
             <a:endParaRPr lang="en-US"/>
           </a:p>
@@ -5892,50 +5892,42 @@
           <a:p>
             <a:pPr algn="ctr"/>
             <a:r>
-              <a:rPr lang="en-US" sz="3000"/>
+              <a:rPr lang="en-US" sz="3000" dirty="0"/>
               <a:t>Midterm presentation :</a:t>
             </a:r>
-            <a:endParaRPr lang="fr-FR" sz="3000"/>
+            <a:endParaRPr lang="fr-FR" sz="3000" dirty="0"/>
           </a:p>
           <a:p>
             <a:pPr algn="ctr"/>
             <a:r>
-              <a:rPr lang="en-US" sz="3000"/>
-              <a:t>27th November 2017</a:t>
-            </a:r>
-          </a:p>
-          <a:p>
-            <a:r>
-              <a:rPr lang="en-US" sz="3000"/>
-              <a:t>Max </a:t>
-            </a:r>
-            <a:r>
-              <a:rPr lang="en-US" sz="3000" err="1"/>
-              <a:t>Premi</a:t>
-            </a:r>
-            <a:r>
-              <a:rPr lang="en-US" sz="3000"/>
-              <a:t>, Master Semester Project (12 credits)</a:t>
-            </a:r>
-          </a:p>
-          <a:p>
-            <a:r>
-              <a:rPr lang="en-US" sz="3000"/>
+              <a:rPr lang="en-US" sz="3000" dirty="0"/>
+              <a:t>28th November 2017</a:t>
+            </a:r>
+          </a:p>
+          <a:p>
+            <a:r>
+              <a:rPr lang="en-US" sz="3000" dirty="0"/>
+              <a:t>Max Premi, Master Semester Project (12 credits)</a:t>
+            </a:r>
+          </a:p>
+          <a:p>
+            <a:r>
+              <a:rPr lang="en-US" sz="3000" dirty="0"/>
               <a:t>David </a:t>
             </a:r>
             <a:r>
-              <a:rPr lang="en-US" sz="3000" err="1"/>
+              <a:rPr lang="en-US" sz="3000" dirty="0" err="1"/>
               <a:t>Froelicher</a:t>
             </a:r>
             <a:r>
-              <a:rPr lang="en-US" sz="3000"/>
-              <a:t>, Juan Ramon Troncoso-</a:t>
-            </a:r>
-            <a:r>
-              <a:rPr lang="en-US" sz="3000" err="1"/>
-              <a:t>Pastoriza</a:t>
-            </a:r>
-            <a:endParaRPr lang="en-US" sz="3000"/>
+              <a:rPr lang="en-US" sz="3000" dirty="0"/>
+              <a:t>, Juan Ramon </a:t>
+            </a:r>
+            <a:r>
+              <a:rPr lang="en-US" sz="3000" dirty="0" err="1"/>
+              <a:t>Troncoso-Pastoriza</a:t>
+            </a:r>
+            <a:endParaRPr lang="en-US" sz="3000" dirty="0"/>
           </a:p>
         </p:txBody>
       </p:sp>
@@ -6041,11 +6033,15 @@
             </a:r>
             <a:r>
               <a:rPr lang="fr-FR" sz="2600" dirty="0" err="1"/>
-              <a:t>Privacy-preserving</a:t>
+              <a:t>Privacy-Preserving</a:t>
             </a:r>
             <a:r>
               <a:rPr lang="fr-FR" sz="2600" dirty="0"/>
-              <a:t> data sharing system</a:t>
+              <a:t> data sharing </a:t>
+            </a:r>
+            <a:r>
+              <a:rPr lang="fr-FR" sz="2600" dirty="0" err="1"/>
+              <a:t>systems</a:t>
             </a:r>
             <a:endParaRPr lang="fr-FR" dirty="0"/>
           </a:p>
@@ -6516,7 +6512,15 @@
             </a:r>
             <a:r>
               <a:rPr lang="fr-FR" sz="2200" dirty="0"/>
-              <a:t> data in the Data Providers</a:t>
+              <a:t> data </a:t>
+            </a:r>
+            <a:r>
+              <a:rPr lang="fr-FR" sz="2200" dirty="0" err="1"/>
+              <a:t>from</a:t>
+            </a:r>
+            <a:r>
+              <a:rPr lang="fr-FR" sz="2200" dirty="0"/>
+              <a:t> the Data Providers</a:t>
             </a:r>
             <a:endParaRPr lang="en-US" sz="2200" dirty="0"/>
           </a:p>
@@ -7149,7 +7153,7 @@
             </a:r>
             <a:r>
               <a:rPr lang="fr-FR" sz="2200" dirty="0"/>
-              <a:t> </a:t>
+              <a:t> and Input validation  </a:t>
             </a:r>
             <a:r>
               <a:rPr lang="fr-FR" sz="2200" dirty="0" err="1"/>
@@ -7157,15 +7161,19 @@
             </a:r>
             <a:r>
               <a:rPr lang="fr-FR" sz="2200" dirty="0"/>
-              <a:t> by </a:t>
+              <a:t> </a:t>
+            </a:r>
+            <a:r>
+              <a:rPr lang="fr-FR" sz="2200" u="sng" dirty="0" err="1"/>
+              <a:t>SNIP</a:t>
             </a:r>
             <a:r>
               <a:rPr lang="fr-FR" sz="2200" dirty="0" err="1"/>
-              <a:t>SNIPs</a:t>
+              <a:t>s</a:t>
             </a:r>
             <a:r>
               <a:rPr lang="fr-FR" sz="2200" dirty="0"/>
-              <a:t> proof and Proof for input validation</a:t>
+              <a:t> proof</a:t>
             </a:r>
           </a:p>
         </p:txBody>
@@ -7650,7 +7658,7 @@
             <a:pPr lvl="1"/>
             <a:r>
               <a:rPr lang="fr-FR" sz="2200" dirty="0"/>
-              <a:t>Server </a:t>
+              <a:t>Servers </a:t>
             </a:r>
             <a:r>
               <a:rPr lang="fr-FR" sz="2200" dirty="0" err="1"/>

</xml_diff>